<commit_message>
Created 10CV splits, started training
</commit_message>
<xml_diff>
--- a/pregunta.pptx
+++ b/pregunta.pptx
@@ -21,6 +21,16 @@
     <p:sldId id="271" r:id="rId15"/>
     <p:sldId id="273" r:id="rId16"/>
     <p:sldId id="272" r:id="rId17"/>
+    <p:sldId id="274" r:id="rId18"/>
+    <p:sldId id="277" r:id="rId19"/>
+    <p:sldId id="275" r:id="rId20"/>
+    <p:sldId id="276" r:id="rId21"/>
+    <p:sldId id="281" r:id="rId22"/>
+    <p:sldId id="282" r:id="rId23"/>
+    <p:sldId id="279" r:id="rId24"/>
+    <p:sldId id="283" r:id="rId25"/>
+    <p:sldId id="280" r:id="rId26"/>
+    <p:sldId id="278" r:id="rId27"/>
   </p:sldIdLst>
   <p:sldSz cx="12192000" cy="6858000"/>
   <p:notesSz cx="6858000" cy="9144000"/>
@@ -274,7 +284,7 @@
           <a:p>
             <a:fld id="{E816971E-1CC9-4B1B-B84A-56D45306C128}" type="datetimeFigureOut">
               <a:rPr lang="es-ES" smtClean="0"/>
-              <a:t>06/05/2022</a:t>
+              <a:t>11/05/2022</a:t>
             </a:fld>
             <a:endParaRPr lang="es-ES"/>
           </a:p>
@@ -444,7 +454,7 @@
           <a:p>
             <a:fld id="{E816971E-1CC9-4B1B-B84A-56D45306C128}" type="datetimeFigureOut">
               <a:rPr lang="es-ES" smtClean="0"/>
-              <a:t>06/05/2022</a:t>
+              <a:t>11/05/2022</a:t>
             </a:fld>
             <a:endParaRPr lang="es-ES"/>
           </a:p>
@@ -624,7 +634,7 @@
           <a:p>
             <a:fld id="{E816971E-1CC9-4B1B-B84A-56D45306C128}" type="datetimeFigureOut">
               <a:rPr lang="es-ES" smtClean="0"/>
-              <a:t>06/05/2022</a:t>
+              <a:t>11/05/2022</a:t>
             </a:fld>
             <a:endParaRPr lang="es-ES"/>
           </a:p>
@@ -794,7 +804,7 @@
           <a:p>
             <a:fld id="{E816971E-1CC9-4B1B-B84A-56D45306C128}" type="datetimeFigureOut">
               <a:rPr lang="es-ES" smtClean="0"/>
-              <a:t>06/05/2022</a:t>
+              <a:t>11/05/2022</a:t>
             </a:fld>
             <a:endParaRPr lang="es-ES"/>
           </a:p>
@@ -1040,7 +1050,7 @@
           <a:p>
             <a:fld id="{E816971E-1CC9-4B1B-B84A-56D45306C128}" type="datetimeFigureOut">
               <a:rPr lang="es-ES" smtClean="0"/>
-              <a:t>06/05/2022</a:t>
+              <a:t>11/05/2022</a:t>
             </a:fld>
             <a:endParaRPr lang="es-ES"/>
           </a:p>
@@ -1272,7 +1282,7 @@
           <a:p>
             <a:fld id="{E816971E-1CC9-4B1B-B84A-56D45306C128}" type="datetimeFigureOut">
               <a:rPr lang="es-ES" smtClean="0"/>
-              <a:t>06/05/2022</a:t>
+              <a:t>11/05/2022</a:t>
             </a:fld>
             <a:endParaRPr lang="es-ES"/>
           </a:p>
@@ -1639,7 +1649,7 @@
           <a:p>
             <a:fld id="{E816971E-1CC9-4B1B-B84A-56D45306C128}" type="datetimeFigureOut">
               <a:rPr lang="es-ES" smtClean="0"/>
-              <a:t>06/05/2022</a:t>
+              <a:t>11/05/2022</a:t>
             </a:fld>
             <a:endParaRPr lang="es-ES"/>
           </a:p>
@@ -1757,7 +1767,7 @@
           <a:p>
             <a:fld id="{E816971E-1CC9-4B1B-B84A-56D45306C128}" type="datetimeFigureOut">
               <a:rPr lang="es-ES" smtClean="0"/>
-              <a:t>06/05/2022</a:t>
+              <a:t>11/05/2022</a:t>
             </a:fld>
             <a:endParaRPr lang="es-ES"/>
           </a:p>
@@ -1852,7 +1862,7 @@
           <a:p>
             <a:fld id="{E816971E-1CC9-4B1B-B84A-56D45306C128}" type="datetimeFigureOut">
               <a:rPr lang="es-ES" smtClean="0"/>
-              <a:t>06/05/2022</a:t>
+              <a:t>11/05/2022</a:t>
             </a:fld>
             <a:endParaRPr lang="es-ES"/>
           </a:p>
@@ -2129,7 +2139,7 @@
           <a:p>
             <a:fld id="{E816971E-1CC9-4B1B-B84A-56D45306C128}" type="datetimeFigureOut">
               <a:rPr lang="es-ES" smtClean="0"/>
-              <a:t>06/05/2022</a:t>
+              <a:t>11/05/2022</a:t>
             </a:fld>
             <a:endParaRPr lang="es-ES"/>
           </a:p>
@@ -2382,7 +2392,7 @@
           <a:p>
             <a:fld id="{E816971E-1CC9-4B1B-B84A-56D45306C128}" type="datetimeFigureOut">
               <a:rPr lang="es-ES" smtClean="0"/>
-              <a:t>06/05/2022</a:t>
+              <a:t>11/05/2022</a:t>
             </a:fld>
             <a:endParaRPr lang="es-ES"/>
           </a:p>
@@ -2595,7 +2605,7 @@
           <a:p>
             <a:fld id="{E816971E-1CC9-4B1B-B84A-56D45306C128}" type="datetimeFigureOut">
               <a:rPr lang="es-ES" smtClean="0"/>
-              <a:t>06/05/2022</a:t>
+              <a:t>11/05/2022</a:t>
             </a:fld>
             <a:endParaRPr lang="es-ES"/>
           </a:p>
@@ -4060,6 +4070,490 @@
 </p:sld>
 </file>
 
+<file path=ppt/slides/slide17.xml><?xml version="1.0" encoding="utf-8"?>
+<p:sld xmlns:a="http://schemas.openxmlformats.org/drawingml/2006/main" xmlns:r="http://schemas.openxmlformats.org/officeDocument/2006/relationships" xmlns:p="http://schemas.openxmlformats.org/presentationml/2006/main">
+  <p:cSld>
+    <p:spTree>
+      <p:nvGrpSpPr>
+        <p:cNvPr id="1" name=""/>
+        <p:cNvGrpSpPr/>
+        <p:nvPr/>
+      </p:nvGrpSpPr>
+      <p:grpSpPr>
+        <a:xfrm>
+          <a:off x="0" y="0"/>
+          <a:ext cx="0" cy="0"/>
+          <a:chOff x="0" y="0"/>
+          <a:chExt cx="0" cy="0"/>
+        </a:xfrm>
+      </p:grpSpPr>
+      <p:sp>
+        <p:nvSpPr>
+          <p:cNvPr id="2" name="Título 1"/>
+          <p:cNvSpPr>
+            <a:spLocks noGrp="1"/>
+          </p:cNvSpPr>
+          <p:nvPr>
+            <p:ph type="ctrTitle"/>
+          </p:nvPr>
+        </p:nvSpPr>
+        <p:spPr>
+          <a:xfrm>
+            <a:off x="1524000" y="1122363"/>
+            <a:ext cx="9144000" cy="496125"/>
+          </a:xfrm>
+        </p:spPr>
+        <p:txBody>
+          <a:bodyPr>
+            <a:normAutofit fontScale="90000"/>
+          </a:bodyPr>
+          <a:lstStyle/>
+          <a:p>
+            <a:r>
+              <a:rPr lang="es-ES" dirty="0"/>
+              <a:t>Fusión de datos </a:t>
+            </a:r>
+            <a:r>
+              <a:rPr lang="es-ES" dirty="0" smtClean="0"/>
+              <a:t>heterogéneos: </a:t>
+            </a:r>
+            <a:endParaRPr lang="es-ES" dirty="0"/>
+          </a:p>
+        </p:txBody>
+      </p:sp>
+      <p:sp>
+        <p:nvSpPr>
+          <p:cNvPr id="3" name="Subtítulo 2"/>
+          <p:cNvSpPr>
+            <a:spLocks noGrp="1"/>
+          </p:cNvSpPr>
+          <p:nvPr>
+            <p:ph type="subTitle" idx="1"/>
+          </p:nvPr>
+        </p:nvSpPr>
+        <p:spPr>
+          <a:xfrm>
+            <a:off x="1524000" y="1755648"/>
+            <a:ext cx="9144000" cy="3502152"/>
+          </a:xfrm>
+        </p:spPr>
+        <p:txBody>
+          <a:bodyPr>
+            <a:normAutofit/>
+          </a:bodyPr>
+          <a:lstStyle/>
+          <a:p>
+            <a:endParaRPr lang="es-ES" dirty="0" smtClean="0"/>
+          </a:p>
+          <a:p>
+            <a:r>
+              <a:rPr lang="es-ES" dirty="0" smtClean="0"/>
+              <a:t>13/05/22</a:t>
+            </a:r>
+            <a:endParaRPr lang="es-ES" dirty="0"/>
+          </a:p>
+        </p:txBody>
+      </p:sp>
+    </p:spTree>
+    <p:extLst>
+      <p:ext uri="{BB962C8B-B14F-4D97-AF65-F5344CB8AC3E}">
+        <p14:creationId xmlns:p14="http://schemas.microsoft.com/office/powerpoint/2010/main" val="3135489623"/>
+      </p:ext>
+    </p:extLst>
+  </p:cSld>
+  <p:clrMapOvr>
+    <a:masterClrMapping/>
+  </p:clrMapOvr>
+</p:sld>
+</file>
+
+<file path=ppt/slides/slide18.xml><?xml version="1.0" encoding="utf-8"?>
+<p:sld xmlns:a="http://schemas.openxmlformats.org/drawingml/2006/main" xmlns:r="http://schemas.openxmlformats.org/officeDocument/2006/relationships" xmlns:p="http://schemas.openxmlformats.org/presentationml/2006/main">
+  <p:cSld>
+    <p:spTree>
+      <p:nvGrpSpPr>
+        <p:cNvPr id="1" name=""/>
+        <p:cNvGrpSpPr/>
+        <p:nvPr/>
+      </p:nvGrpSpPr>
+      <p:grpSpPr>
+        <a:xfrm>
+          <a:off x="0" y="0"/>
+          <a:ext cx="0" cy="0"/>
+          <a:chOff x="0" y="0"/>
+          <a:chExt cx="0" cy="0"/>
+        </a:xfrm>
+      </p:grpSpPr>
+      <p:sp>
+        <p:nvSpPr>
+          <p:cNvPr id="2" name="Título 1"/>
+          <p:cNvSpPr>
+            <a:spLocks noGrp="1"/>
+          </p:cNvSpPr>
+          <p:nvPr>
+            <p:ph type="title"/>
+          </p:nvPr>
+        </p:nvSpPr>
+        <p:spPr/>
+        <p:txBody>
+          <a:bodyPr/>
+          <a:lstStyle/>
+          <a:p>
+            <a:r>
+              <a:rPr lang="es-ES" dirty="0" smtClean="0"/>
+              <a:t>Fusión de información</a:t>
+            </a:r>
+            <a:endParaRPr lang="es-ES" u="sng" dirty="0"/>
+          </a:p>
+        </p:txBody>
+      </p:sp>
+      <p:sp>
+        <p:nvSpPr>
+          <p:cNvPr id="3" name="Marcador de contenido 2"/>
+          <p:cNvSpPr>
+            <a:spLocks noGrp="1"/>
+          </p:cNvSpPr>
+          <p:nvPr>
+            <p:ph idx="1"/>
+          </p:nvPr>
+        </p:nvSpPr>
+        <p:spPr/>
+        <p:txBody>
+          <a:bodyPr>
+            <a:normAutofit/>
+          </a:bodyPr>
+          <a:lstStyle/>
+          <a:p>
+            <a:r>
+              <a:rPr lang="es-ES" dirty="0" smtClean="0"/>
+              <a:t>Estrategias de late fusión</a:t>
+            </a:r>
+          </a:p>
+          <a:p>
+            <a:pPr marL="0" indent="0">
+              <a:buNone/>
+            </a:pPr>
+            <a:r>
+              <a:rPr lang="es-ES" dirty="0" smtClean="0"/>
+              <a:t>-Sistemas por votos, ponderados o no</a:t>
+            </a:r>
+          </a:p>
+          <a:p>
+            <a:pPr marL="0" indent="0">
+              <a:buNone/>
+            </a:pPr>
+            <a:endParaRPr lang="es-ES" dirty="0"/>
+          </a:p>
+          <a:p>
+            <a:pPr marL="0" indent="0">
+              <a:buNone/>
+            </a:pPr>
+            <a:r>
+              <a:rPr lang="es-ES" dirty="0" smtClean="0"/>
+              <a:t>-Sistemas por promedios de probabilidad, ponderados o no</a:t>
+            </a:r>
+          </a:p>
+          <a:p>
+            <a:pPr marL="0" indent="0">
+              <a:buNone/>
+            </a:pPr>
+            <a:endParaRPr lang="es-ES" dirty="0"/>
+          </a:p>
+          <a:p>
+            <a:pPr marL="0" indent="0">
+              <a:buNone/>
+            </a:pPr>
+            <a:r>
+              <a:rPr lang="es-ES" dirty="0" smtClean="0"/>
+              <a:t>Paco hizo un sistema de promedios ponderados</a:t>
+            </a:r>
+          </a:p>
+        </p:txBody>
+      </p:sp>
+    </p:spTree>
+    <p:extLst>
+      <p:ext uri="{BB962C8B-B14F-4D97-AF65-F5344CB8AC3E}">
+        <p14:creationId xmlns:p14="http://schemas.microsoft.com/office/powerpoint/2010/main" val="1561775961"/>
+      </p:ext>
+    </p:extLst>
+  </p:cSld>
+  <p:clrMapOvr>
+    <a:masterClrMapping/>
+  </p:clrMapOvr>
+</p:sld>
+</file>
+
+<file path=ppt/slides/slide19.xml><?xml version="1.0" encoding="utf-8"?>
+<p:sld xmlns:a="http://schemas.openxmlformats.org/drawingml/2006/main" xmlns:r="http://schemas.openxmlformats.org/officeDocument/2006/relationships" xmlns:p="http://schemas.openxmlformats.org/presentationml/2006/main">
+  <p:cSld>
+    <p:spTree>
+      <p:nvGrpSpPr>
+        <p:cNvPr id="1" name=""/>
+        <p:cNvGrpSpPr/>
+        <p:nvPr/>
+      </p:nvGrpSpPr>
+      <p:grpSpPr>
+        <a:xfrm>
+          <a:off x="0" y="0"/>
+          <a:ext cx="0" cy="0"/>
+          <a:chOff x="0" y="0"/>
+          <a:chExt cx="0" cy="0"/>
+        </a:xfrm>
+      </p:grpSpPr>
+      <p:sp>
+        <p:nvSpPr>
+          <p:cNvPr id="2" name="Título 1"/>
+          <p:cNvSpPr>
+            <a:spLocks noGrp="1"/>
+          </p:cNvSpPr>
+          <p:nvPr>
+            <p:ph type="title"/>
+          </p:nvPr>
+        </p:nvSpPr>
+        <p:spPr/>
+        <p:txBody>
+          <a:bodyPr/>
+          <a:lstStyle/>
+          <a:p>
+            <a:r>
+              <a:rPr lang="es-ES" dirty="0" smtClean="0"/>
+              <a:t>Fusión de información</a:t>
+            </a:r>
+            <a:endParaRPr lang="es-ES" u="sng" dirty="0"/>
+          </a:p>
+        </p:txBody>
+      </p:sp>
+      <p:sp>
+        <p:nvSpPr>
+          <p:cNvPr id="3" name="Marcador de contenido 2"/>
+          <p:cNvSpPr>
+            <a:spLocks noGrp="1"/>
+          </p:cNvSpPr>
+          <p:nvPr>
+            <p:ph idx="1"/>
+          </p:nvPr>
+        </p:nvSpPr>
+        <p:spPr/>
+        <p:txBody>
+          <a:bodyPr>
+            <a:normAutofit fontScale="70000" lnSpcReduction="20000"/>
+          </a:bodyPr>
+          <a:lstStyle/>
+          <a:p>
+            <a:r>
+              <a:rPr lang="es-ES" dirty="0" err="1" smtClean="0"/>
+              <a:t>Feature</a:t>
+            </a:r>
+            <a:r>
+              <a:rPr lang="es-ES" dirty="0" smtClean="0"/>
+              <a:t> </a:t>
+            </a:r>
+            <a:r>
+              <a:rPr lang="es-ES" dirty="0" err="1" smtClean="0"/>
+              <a:t>level</a:t>
+            </a:r>
+            <a:r>
+              <a:rPr lang="es-ES" dirty="0" smtClean="0"/>
+              <a:t> </a:t>
+            </a:r>
+            <a:r>
+              <a:rPr lang="es-ES" dirty="0" err="1" smtClean="0"/>
+              <a:t>fusion</a:t>
+            </a:r>
+            <a:r>
+              <a:rPr lang="es-ES" dirty="0" smtClean="0"/>
+              <a:t>, fusionar las </a:t>
+            </a:r>
+            <a:r>
+              <a:rPr lang="es-ES" dirty="0" err="1" smtClean="0"/>
+              <a:t>features</a:t>
+            </a:r>
+            <a:r>
+              <a:rPr lang="es-ES" dirty="0" smtClean="0"/>
+              <a:t> y añadir capas lineales finales y volver a entrenar.</a:t>
+            </a:r>
+          </a:p>
+          <a:p>
+            <a:pPr>
+              <a:buFontTx/>
+              <a:buChar char="-"/>
+            </a:pPr>
+            <a:r>
+              <a:rPr lang="es-ES" dirty="0" smtClean="0"/>
+              <a:t>Problema: Introducir los datos </a:t>
+            </a:r>
+            <a:r>
+              <a:rPr lang="es-ES" dirty="0" smtClean="0"/>
+              <a:t>al modelo, </a:t>
+            </a:r>
+            <a:r>
+              <a:rPr lang="es-ES" dirty="0" smtClean="0"/>
+              <a:t>al ser heterogéneos habría que juntar todos los datos en un set.</a:t>
+            </a:r>
+          </a:p>
+          <a:p>
+            <a:pPr>
+              <a:buFontTx/>
+              <a:buChar char="-"/>
+            </a:pPr>
+            <a:r>
+              <a:rPr lang="es-ES" dirty="0" smtClean="0"/>
+              <a:t>Solución: una vez entrenados todos los modelos utilizarlos para </a:t>
+            </a:r>
+            <a:r>
+              <a:rPr lang="es-ES" dirty="0" err="1" smtClean="0"/>
+              <a:t>feature</a:t>
+            </a:r>
+            <a:r>
+              <a:rPr lang="es-ES" dirty="0" smtClean="0"/>
+              <a:t> </a:t>
+            </a:r>
+            <a:r>
+              <a:rPr lang="es-ES" dirty="0" err="1" smtClean="0"/>
+              <a:t>extration</a:t>
+            </a:r>
+            <a:r>
+              <a:rPr lang="es-ES" dirty="0" smtClean="0"/>
+              <a:t> y crear un nuevo set de </a:t>
+            </a:r>
+            <a:r>
+              <a:rPr lang="es-ES" dirty="0" err="1" smtClean="0"/>
+              <a:t>features</a:t>
+            </a:r>
+            <a:r>
+              <a:rPr lang="es-ES" dirty="0" smtClean="0"/>
+              <a:t>.</a:t>
+            </a:r>
+          </a:p>
+          <a:p>
+            <a:pPr marL="0" indent="0">
+              <a:buNone/>
+            </a:pPr>
+            <a:r>
+              <a:rPr lang="es-ES" dirty="0" smtClean="0"/>
+              <a:t>   Utilizar esos </a:t>
+            </a:r>
+            <a:r>
+              <a:rPr lang="es-ES" dirty="0" err="1" smtClean="0"/>
+              <a:t>features</a:t>
+            </a:r>
+            <a:r>
+              <a:rPr lang="es-ES" dirty="0" smtClean="0"/>
+              <a:t> como nuevo set</a:t>
+            </a:r>
+          </a:p>
+          <a:p>
+            <a:pPr>
+              <a:buFontTx/>
+              <a:buChar char="-"/>
+            </a:pPr>
+            <a:r>
+              <a:rPr lang="es-ES" dirty="0" smtClean="0"/>
+              <a:t>Problema: </a:t>
+            </a:r>
+            <a:r>
+              <a:rPr lang="es-ES" dirty="0" err="1" smtClean="0"/>
+              <a:t>Explainability</a:t>
+            </a:r>
+            <a:endParaRPr lang="es-ES" dirty="0" smtClean="0"/>
+          </a:p>
+          <a:p>
+            <a:pPr marL="0" indent="0">
+              <a:buNone/>
+            </a:pPr>
+            <a:endParaRPr lang="es-ES" dirty="0" smtClean="0"/>
+          </a:p>
+          <a:p>
+            <a:pPr>
+              <a:buFontTx/>
+              <a:buChar char="-"/>
+            </a:pPr>
+            <a:r>
+              <a:rPr lang="es-ES" dirty="0">
+                <a:hlinkClick r:id="rId2"/>
+              </a:rPr>
+              <a:t>https://</a:t>
+            </a:r>
+            <a:r>
+              <a:rPr lang="es-ES" dirty="0" smtClean="0">
+                <a:hlinkClick r:id="rId2"/>
+              </a:rPr>
+              <a:t>ieeexplore.ieee.org/abstract/document/8396165</a:t>
+            </a:r>
+            <a:endParaRPr lang="es-ES" dirty="0" smtClean="0"/>
+          </a:p>
+          <a:p>
+            <a:pPr>
+              <a:buFontTx/>
+              <a:buChar char="-"/>
+            </a:pPr>
+            <a:r>
+              <a:rPr lang="es-ES" dirty="0">
+                <a:hlinkClick r:id="rId3"/>
+              </a:rPr>
+              <a:t>https://</a:t>
+            </a:r>
+            <a:r>
+              <a:rPr lang="es-ES" dirty="0" smtClean="0">
+                <a:hlinkClick r:id="rId3"/>
+              </a:rPr>
+              <a:t>link.springer.com/chapter/10.1007/978-3-030-88163-4_29</a:t>
+            </a:r>
+            <a:endParaRPr lang="es-ES" dirty="0" smtClean="0"/>
+          </a:p>
+          <a:p>
+            <a:pPr>
+              <a:buFontTx/>
+              <a:buChar char="-"/>
+            </a:pPr>
+            <a:r>
+              <a:rPr lang="es-ES" dirty="0" smtClean="0"/>
+              <a:t>Paco: CNV y </a:t>
+            </a:r>
+            <a:r>
+              <a:rPr lang="es-ES" dirty="0" err="1" smtClean="0"/>
+              <a:t>RNASeq</a:t>
+            </a:r>
+            <a:endParaRPr lang="es-ES" dirty="0" smtClean="0"/>
+          </a:p>
+          <a:p>
+            <a:pPr marL="0" indent="0">
+              <a:buNone/>
+            </a:pPr>
+            <a:endParaRPr lang="es-ES" dirty="0" smtClean="0"/>
+          </a:p>
+          <a:p>
+            <a:pPr marL="0" indent="0">
+              <a:buNone/>
+            </a:pPr>
+            <a:r>
+              <a:rPr lang="es-ES" dirty="0" smtClean="0"/>
+              <a:t>Esto lo he visto para distintas redes, </a:t>
+            </a:r>
+            <a:r>
+              <a:rPr lang="es-ES" dirty="0" err="1" smtClean="0"/>
+              <a:t>stackeadas</a:t>
+            </a:r>
+            <a:r>
+              <a:rPr lang="es-ES" dirty="0" smtClean="0"/>
+              <a:t>, pero no distintos datos</a:t>
+            </a:r>
+          </a:p>
+        </p:txBody>
+      </p:sp>
+    </p:spTree>
+    <p:extLst>
+      <p:ext uri="{BB962C8B-B14F-4D97-AF65-F5344CB8AC3E}">
+        <p14:creationId xmlns:p14="http://schemas.microsoft.com/office/powerpoint/2010/main" val="3705930689"/>
+      </p:ext>
+    </p:extLst>
+  </p:cSld>
+  <p:clrMapOvr>
+    <a:masterClrMapping/>
+  </p:clrMapOvr>
+</p:sld>
+</file>
+
 <file path=ppt/slides/slide2.xml><?xml version="1.0" encoding="utf-8"?>
 <p:sld xmlns:a="http://schemas.openxmlformats.org/drawingml/2006/main" xmlns:r="http://schemas.openxmlformats.org/officeDocument/2006/relationships" xmlns:p="http://schemas.openxmlformats.org/presentationml/2006/main">
   <p:cSld>
@@ -4195,6 +4689,1004 @@
     <p:extLst>
       <p:ext uri="{BB962C8B-B14F-4D97-AF65-F5344CB8AC3E}">
         <p14:creationId xmlns:p14="http://schemas.microsoft.com/office/powerpoint/2010/main" val="3669087406"/>
+      </p:ext>
+    </p:extLst>
+  </p:cSld>
+  <p:clrMapOvr>
+    <a:masterClrMapping/>
+  </p:clrMapOvr>
+</p:sld>
+</file>
+
+<file path=ppt/slides/slide20.xml><?xml version="1.0" encoding="utf-8"?>
+<p:sld xmlns:a="http://schemas.openxmlformats.org/drawingml/2006/main" xmlns:r="http://schemas.openxmlformats.org/officeDocument/2006/relationships" xmlns:p="http://schemas.openxmlformats.org/presentationml/2006/main">
+  <p:cSld>
+    <p:spTree>
+      <p:nvGrpSpPr>
+        <p:cNvPr id="1" name=""/>
+        <p:cNvGrpSpPr/>
+        <p:nvPr/>
+      </p:nvGrpSpPr>
+      <p:grpSpPr>
+        <a:xfrm>
+          <a:off x="0" y="0"/>
+          <a:ext cx="0" cy="0"/>
+          <a:chOff x="0" y="0"/>
+          <a:chExt cx="0" cy="0"/>
+        </a:xfrm>
+      </p:grpSpPr>
+      <p:sp>
+        <p:nvSpPr>
+          <p:cNvPr id="2" name="Título 1"/>
+          <p:cNvSpPr>
+            <a:spLocks noGrp="1"/>
+          </p:cNvSpPr>
+          <p:nvPr>
+            <p:ph type="title"/>
+          </p:nvPr>
+        </p:nvSpPr>
+        <p:spPr/>
+        <p:txBody>
+          <a:bodyPr/>
+          <a:lstStyle/>
+          <a:p>
+            <a:r>
+              <a:rPr lang="es-ES" dirty="0" smtClean="0"/>
+              <a:t>Fusión de información</a:t>
+            </a:r>
+            <a:endParaRPr lang="es-ES" dirty="0"/>
+          </a:p>
+        </p:txBody>
+      </p:sp>
+      <p:sp>
+        <p:nvSpPr>
+          <p:cNvPr id="3" name="Marcador de contenido 2"/>
+          <p:cNvSpPr>
+            <a:spLocks noGrp="1"/>
+          </p:cNvSpPr>
+          <p:nvPr>
+            <p:ph idx="1"/>
+          </p:nvPr>
+        </p:nvSpPr>
+        <p:spPr/>
+        <p:txBody>
+          <a:bodyPr>
+            <a:normAutofit/>
+          </a:bodyPr>
+          <a:lstStyle/>
+          <a:p>
+            <a:endParaRPr lang="es-ES" dirty="0"/>
+          </a:p>
+          <a:p>
+            <a:endParaRPr lang="es-ES" dirty="0"/>
+          </a:p>
+          <a:p>
+            <a:r>
+              <a:rPr lang="es-ES" dirty="0" smtClean="0"/>
+              <a:t>Hay que tener cuidado de separar el test set antes del </a:t>
+            </a:r>
+            <a:r>
+              <a:rPr lang="es-ES" dirty="0" err="1" smtClean="0"/>
+              <a:t>feature</a:t>
+            </a:r>
+            <a:r>
+              <a:rPr lang="es-ES" dirty="0" smtClean="0"/>
+              <a:t> </a:t>
+            </a:r>
+            <a:r>
+              <a:rPr lang="es-ES" dirty="0" err="1" smtClean="0"/>
+              <a:t>extraction</a:t>
+            </a:r>
+            <a:r>
+              <a:rPr lang="es-ES" dirty="0"/>
+              <a:t>.</a:t>
+            </a:r>
+            <a:endParaRPr lang="es-ES" dirty="0" smtClean="0"/>
+          </a:p>
+        </p:txBody>
+      </p:sp>
+    </p:spTree>
+    <p:extLst>
+      <p:ext uri="{BB962C8B-B14F-4D97-AF65-F5344CB8AC3E}">
+        <p14:creationId xmlns:p14="http://schemas.microsoft.com/office/powerpoint/2010/main" val="1809913109"/>
+      </p:ext>
+    </p:extLst>
+  </p:cSld>
+  <p:clrMapOvr>
+    <a:masterClrMapping/>
+  </p:clrMapOvr>
+</p:sld>
+</file>
+
+<file path=ppt/slides/slide21.xml><?xml version="1.0" encoding="utf-8"?>
+<p:sld xmlns:a="http://schemas.openxmlformats.org/drawingml/2006/main" xmlns:r="http://schemas.openxmlformats.org/officeDocument/2006/relationships" xmlns:p="http://schemas.openxmlformats.org/presentationml/2006/main">
+  <p:cSld>
+    <p:spTree>
+      <p:nvGrpSpPr>
+        <p:cNvPr id="1" name=""/>
+        <p:cNvGrpSpPr/>
+        <p:nvPr/>
+      </p:nvGrpSpPr>
+      <p:grpSpPr>
+        <a:xfrm>
+          <a:off x="0" y="0"/>
+          <a:ext cx="0" cy="0"/>
+          <a:chOff x="0" y="0"/>
+          <a:chExt cx="0" cy="0"/>
+        </a:xfrm>
+      </p:grpSpPr>
+      <p:sp>
+        <p:nvSpPr>
+          <p:cNvPr id="2" name="Título 1"/>
+          <p:cNvSpPr>
+            <a:spLocks noGrp="1"/>
+          </p:cNvSpPr>
+          <p:nvPr>
+            <p:ph type="title"/>
+          </p:nvPr>
+        </p:nvSpPr>
+        <p:spPr/>
+        <p:txBody>
+          <a:bodyPr/>
+          <a:lstStyle/>
+          <a:p>
+            <a:r>
+              <a:rPr lang="es-ES" dirty="0" smtClean="0"/>
+              <a:t>Clasificación binaria</a:t>
+            </a:r>
+            <a:endParaRPr lang="es-ES" dirty="0"/>
+          </a:p>
+        </p:txBody>
+      </p:sp>
+      <p:sp>
+        <p:nvSpPr>
+          <p:cNvPr id="3" name="Marcador de contenido 2"/>
+          <p:cNvSpPr>
+            <a:spLocks noGrp="1"/>
+          </p:cNvSpPr>
+          <p:nvPr>
+            <p:ph idx="1"/>
+          </p:nvPr>
+        </p:nvSpPr>
+        <p:spPr>
+          <a:xfrm>
+            <a:off x="838200" y="1825625"/>
+            <a:ext cx="5719354" cy="4351338"/>
+          </a:xfrm>
+        </p:spPr>
+        <p:txBody>
+          <a:bodyPr/>
+          <a:lstStyle/>
+          <a:p>
+            <a:r>
+              <a:rPr lang="es-ES" dirty="0" smtClean="0"/>
+              <a:t>TGCA PAAD tiene distintas localizaciones, pero se considera una misma enfermedad</a:t>
+            </a:r>
+          </a:p>
+          <a:p>
+            <a:pPr marL="0" indent="0">
+              <a:buNone/>
+            </a:pPr>
+            <a:endParaRPr lang="es-ES" dirty="0" smtClean="0"/>
+          </a:p>
+          <a:p>
+            <a:r>
+              <a:rPr lang="es-ES" dirty="0" smtClean="0"/>
+              <a:t>Clasificador </a:t>
+            </a:r>
+            <a:r>
+              <a:rPr lang="es-ES" dirty="0" smtClean="0"/>
+              <a:t>binario</a:t>
+            </a:r>
+          </a:p>
+          <a:p>
+            <a:endParaRPr lang="es-ES" dirty="0"/>
+          </a:p>
+          <a:p>
+            <a:r>
+              <a:rPr lang="es-ES" dirty="0" smtClean="0"/>
+              <a:t>Normalizado conforme a </a:t>
+            </a:r>
+            <a:r>
+              <a:rPr lang="es-ES" dirty="0" err="1" smtClean="0"/>
+              <a:t>imagenet</a:t>
+            </a:r>
+            <a:endParaRPr lang="es-ES" dirty="0"/>
+          </a:p>
+        </p:txBody>
+      </p:sp>
+      <p:pic>
+        <p:nvPicPr>
+          <p:cNvPr id="4" name="Imagen 3"/>
+          <p:cNvPicPr>
+            <a:picLocks noChangeAspect="1"/>
+          </p:cNvPicPr>
+          <p:nvPr/>
+        </p:nvPicPr>
+        <p:blipFill>
+          <a:blip r:embed="rId2">
+            <a:extLst>
+              <a:ext uri="{28A0092B-C50C-407E-A947-70E740481C1C}">
+                <a14:useLocalDpi xmlns:a14="http://schemas.microsoft.com/office/drawing/2010/main" val="0"/>
+              </a:ext>
+            </a:extLst>
+          </a:blip>
+          <a:stretch>
+            <a:fillRect/>
+          </a:stretch>
+        </p:blipFill>
+        <p:spPr>
+          <a:xfrm>
+            <a:off x="6993163" y="1825625"/>
+            <a:ext cx="3796757" cy="3581339"/>
+          </a:xfrm>
+          <a:prstGeom prst="rect">
+            <a:avLst/>
+          </a:prstGeom>
+        </p:spPr>
+      </p:pic>
+    </p:spTree>
+    <p:extLst>
+      <p:ext uri="{BB962C8B-B14F-4D97-AF65-F5344CB8AC3E}">
+        <p14:creationId xmlns:p14="http://schemas.microsoft.com/office/powerpoint/2010/main" val="1545325220"/>
+      </p:ext>
+    </p:extLst>
+  </p:cSld>
+  <p:clrMapOvr>
+    <a:masterClrMapping/>
+  </p:clrMapOvr>
+</p:sld>
+</file>
+
+<file path=ppt/slides/slide22.xml><?xml version="1.0" encoding="utf-8"?>
+<p:sld xmlns:a="http://schemas.openxmlformats.org/drawingml/2006/main" xmlns:r="http://schemas.openxmlformats.org/officeDocument/2006/relationships" xmlns:p="http://schemas.openxmlformats.org/presentationml/2006/main">
+  <p:cSld>
+    <p:spTree>
+      <p:nvGrpSpPr>
+        <p:cNvPr id="1" name=""/>
+        <p:cNvGrpSpPr/>
+        <p:nvPr/>
+      </p:nvGrpSpPr>
+      <p:grpSpPr>
+        <a:xfrm>
+          <a:off x="0" y="0"/>
+          <a:ext cx="0" cy="0"/>
+          <a:chOff x="0" y="0"/>
+          <a:chExt cx="0" cy="0"/>
+        </a:xfrm>
+      </p:grpSpPr>
+      <p:sp>
+        <p:nvSpPr>
+          <p:cNvPr id="2" name="Título 1"/>
+          <p:cNvSpPr>
+            <a:spLocks noGrp="1"/>
+          </p:cNvSpPr>
+          <p:nvPr>
+            <p:ph type="title"/>
+          </p:nvPr>
+        </p:nvSpPr>
+        <p:spPr/>
+        <p:txBody>
+          <a:bodyPr/>
+          <a:lstStyle/>
+          <a:p>
+            <a:r>
+              <a:rPr lang="es-ES" dirty="0" smtClean="0"/>
+              <a:t>Clasificación binaria</a:t>
+            </a:r>
+            <a:endParaRPr lang="es-ES" dirty="0"/>
+          </a:p>
+        </p:txBody>
+      </p:sp>
+      <p:sp>
+        <p:nvSpPr>
+          <p:cNvPr id="3" name="Marcador de contenido 2"/>
+          <p:cNvSpPr>
+            <a:spLocks noGrp="1"/>
+          </p:cNvSpPr>
+          <p:nvPr>
+            <p:ph idx="1"/>
+          </p:nvPr>
+        </p:nvSpPr>
+        <p:spPr>
+          <a:xfrm>
+            <a:off x="5159828" y="1690688"/>
+            <a:ext cx="6193971" cy="4473212"/>
+          </a:xfrm>
+        </p:spPr>
+        <p:txBody>
+          <a:bodyPr/>
+          <a:lstStyle/>
+          <a:p>
+            <a:endParaRPr lang="es-ES" dirty="0" smtClean="0"/>
+          </a:p>
+          <a:p>
+            <a:endParaRPr lang="es-ES" dirty="0"/>
+          </a:p>
+          <a:p>
+            <a:r>
+              <a:rPr lang="es-ES" dirty="0" smtClean="0"/>
+              <a:t>5164 </a:t>
+            </a:r>
+            <a:r>
+              <a:rPr lang="es-ES" dirty="0" err="1"/>
+              <a:t>Patches</a:t>
+            </a:r>
+            <a:r>
+              <a:rPr lang="es-ES" dirty="0"/>
+              <a:t> de 300x300</a:t>
+            </a:r>
+          </a:p>
+          <a:p>
+            <a:r>
+              <a:rPr lang="es-ES" dirty="0"/>
+              <a:t>87% Positivos</a:t>
+            </a:r>
+          </a:p>
+          <a:p>
+            <a:r>
+              <a:rPr lang="es-ES" dirty="0"/>
+              <a:t>700 para </a:t>
+            </a:r>
+            <a:r>
+              <a:rPr lang="es-ES" dirty="0" err="1"/>
+              <a:t>validation</a:t>
+            </a:r>
+            <a:endParaRPr lang="es-ES" dirty="0"/>
+          </a:p>
+        </p:txBody>
+      </p:sp>
+      <p:pic>
+        <p:nvPicPr>
+          <p:cNvPr id="8" name="Imagen 7"/>
+          <p:cNvPicPr>
+            <a:picLocks noChangeAspect="1"/>
+          </p:cNvPicPr>
+          <p:nvPr/>
+        </p:nvPicPr>
+        <p:blipFill>
+          <a:blip r:embed="rId2">
+            <a:extLst>
+              <a:ext uri="{28A0092B-C50C-407E-A947-70E740481C1C}">
+                <a14:useLocalDpi xmlns:a14="http://schemas.microsoft.com/office/drawing/2010/main" val="0"/>
+              </a:ext>
+            </a:extLst>
+          </a:blip>
+          <a:stretch>
+            <a:fillRect/>
+          </a:stretch>
+        </p:blipFill>
+        <p:spPr>
+          <a:xfrm>
+            <a:off x="321732" y="2352691"/>
+            <a:ext cx="4838095" cy="3149206"/>
+          </a:xfrm>
+          <a:prstGeom prst="rect">
+            <a:avLst/>
+          </a:prstGeom>
+        </p:spPr>
+      </p:pic>
+    </p:spTree>
+    <p:extLst>
+      <p:ext uri="{BB962C8B-B14F-4D97-AF65-F5344CB8AC3E}">
+        <p14:creationId xmlns:p14="http://schemas.microsoft.com/office/powerpoint/2010/main" val="1260024071"/>
+      </p:ext>
+    </p:extLst>
+  </p:cSld>
+  <p:clrMapOvr>
+    <a:masterClrMapping/>
+  </p:clrMapOvr>
+</p:sld>
+</file>
+
+<file path=ppt/slides/slide23.xml><?xml version="1.0" encoding="utf-8"?>
+<p:sld xmlns:a="http://schemas.openxmlformats.org/drawingml/2006/main" xmlns:r="http://schemas.openxmlformats.org/officeDocument/2006/relationships" xmlns:p="http://schemas.openxmlformats.org/presentationml/2006/main">
+  <p:cSld>
+    <p:spTree>
+      <p:nvGrpSpPr>
+        <p:cNvPr id="1" name=""/>
+        <p:cNvGrpSpPr/>
+        <p:nvPr/>
+      </p:nvGrpSpPr>
+      <p:grpSpPr>
+        <a:xfrm>
+          <a:off x="0" y="0"/>
+          <a:ext cx="0" cy="0"/>
+          <a:chOff x="0" y="0"/>
+          <a:chExt cx="0" cy="0"/>
+        </a:xfrm>
+      </p:grpSpPr>
+      <p:sp>
+        <p:nvSpPr>
+          <p:cNvPr id="2" name="Título 1"/>
+          <p:cNvSpPr>
+            <a:spLocks noGrp="1"/>
+          </p:cNvSpPr>
+          <p:nvPr>
+            <p:ph type="title"/>
+          </p:nvPr>
+        </p:nvSpPr>
+        <p:spPr/>
+        <p:txBody>
+          <a:bodyPr/>
+          <a:lstStyle/>
+          <a:p>
+            <a:r>
+              <a:rPr lang="es-ES" dirty="0" smtClean="0"/>
+              <a:t>Pruebas entrenamiento </a:t>
+            </a:r>
+            <a:r>
+              <a:rPr lang="es-ES" dirty="0" err="1" smtClean="0"/>
+              <a:t>patch-wise</a:t>
+            </a:r>
+            <a:endParaRPr lang="es-ES" dirty="0"/>
+          </a:p>
+        </p:txBody>
+      </p:sp>
+      <p:sp>
+        <p:nvSpPr>
+          <p:cNvPr id="3" name="Marcador de contenido 2"/>
+          <p:cNvSpPr>
+            <a:spLocks noGrp="1"/>
+          </p:cNvSpPr>
+          <p:nvPr>
+            <p:ph idx="1"/>
+          </p:nvPr>
+        </p:nvSpPr>
+        <p:spPr>
+          <a:xfrm>
+            <a:off x="5199017" y="1825625"/>
+            <a:ext cx="6154782" cy="4300855"/>
+          </a:xfrm>
+        </p:spPr>
+        <p:txBody>
+          <a:bodyPr/>
+          <a:lstStyle/>
+          <a:p>
+            <a:pPr marL="0" indent="0">
+              <a:buNone/>
+            </a:pPr>
+            <a:r>
+              <a:rPr lang="es-ES" dirty="0" smtClean="0"/>
+              <a:t>Resnet18: Solo las ultimas dos capas FC</a:t>
+            </a:r>
+          </a:p>
+          <a:p>
+            <a:pPr marL="0" indent="0">
+              <a:buNone/>
+            </a:pPr>
+            <a:r>
+              <a:rPr lang="es-ES" dirty="0" err="1" smtClean="0"/>
+              <a:t>Lr.scheduler</a:t>
+            </a:r>
+            <a:endParaRPr lang="es-ES" dirty="0"/>
+          </a:p>
+          <a:p>
+            <a:pPr marL="0" indent="0">
+              <a:buNone/>
+            </a:pPr>
+            <a:r>
+              <a:rPr lang="es-ES" dirty="0" smtClean="0"/>
+              <a:t>Xavier </a:t>
+            </a:r>
+            <a:r>
+              <a:rPr lang="es-ES" dirty="0" err="1" smtClean="0"/>
+              <a:t>weight</a:t>
+            </a:r>
+            <a:r>
+              <a:rPr lang="es-ES" dirty="0" smtClean="0"/>
+              <a:t> </a:t>
+            </a:r>
+            <a:r>
+              <a:rPr lang="es-ES" dirty="0" err="1" smtClean="0"/>
+              <a:t>init</a:t>
+            </a:r>
+            <a:endParaRPr lang="es-ES" dirty="0" smtClean="0"/>
+          </a:p>
+          <a:p>
+            <a:pPr marL="0" indent="0">
+              <a:buNone/>
+            </a:pPr>
+            <a:endParaRPr lang="es-ES" dirty="0"/>
+          </a:p>
+          <a:p>
+            <a:r>
+              <a:rPr lang="es-ES" dirty="0" smtClean="0"/>
+              <a:t>ACC: 0.935</a:t>
+            </a:r>
+          </a:p>
+          <a:p>
+            <a:r>
+              <a:rPr lang="es-ES" dirty="0" smtClean="0"/>
+              <a:t>VAL_ACC: 0.958</a:t>
+            </a:r>
+          </a:p>
+          <a:p>
+            <a:pPr marL="0" indent="0">
+              <a:buNone/>
+            </a:pPr>
+            <a:endParaRPr lang="es-ES" dirty="0" smtClean="0"/>
+          </a:p>
+          <a:p>
+            <a:pPr marL="0" indent="0">
+              <a:buNone/>
+            </a:pPr>
+            <a:r>
+              <a:rPr lang="es-ES" dirty="0" smtClean="0"/>
+              <a:t>PRUEBA (VAL SET NO REPRESENTATIVO)</a:t>
+            </a:r>
+            <a:endParaRPr lang="es-ES" dirty="0"/>
+          </a:p>
+          <a:p>
+            <a:pPr marL="0" indent="0">
+              <a:buNone/>
+            </a:pPr>
+            <a:endParaRPr lang="es-ES" dirty="0"/>
+          </a:p>
+        </p:txBody>
+      </p:sp>
+      <p:graphicFrame>
+        <p:nvGraphicFramePr>
+          <p:cNvPr id="4" name="Objeto 3"/>
+          <p:cNvGraphicFramePr>
+            <a:graphicFrameLocks noChangeAspect="1"/>
+          </p:cNvGraphicFramePr>
+          <p:nvPr>
+            <p:extLst>
+              <p:ext uri="{D42A27DB-BD31-4B8C-83A1-F6EECF244321}">
+                <p14:modId xmlns:p14="http://schemas.microsoft.com/office/powerpoint/2010/main" val="978447593"/>
+              </p:ext>
+            </p:extLst>
+          </p:nvPr>
+        </p:nvGraphicFramePr>
+        <p:xfrm>
+          <a:off x="838199" y="1600994"/>
+          <a:ext cx="4138749" cy="4800600"/>
+        </p:xfrm>
+        <a:graphic>
+          <a:graphicData uri="http://schemas.openxmlformats.org/presentationml/2006/ole">
+            <mc:AlternateContent xmlns:mc="http://schemas.openxmlformats.org/markup-compatibility/2006">
+              <mc:Choice xmlns:v="urn:schemas-microsoft-com:vml" Requires="v">
+                <p:oleObj spid="_x0000_s2060" name="Acrobat Document" r:id="rId3" imgW="3428684" imgH="4800600" progId="AcroExch.Document.7">
+                  <p:embed/>
+                </p:oleObj>
+              </mc:Choice>
+              <mc:Fallback>
+                <p:oleObj name="Acrobat Document" r:id="rId3" imgW="3428684" imgH="4800600" progId="AcroExch.Document.7">
+                  <p:embed/>
+                  <p:pic>
+                    <p:nvPicPr>
+                      <p:cNvPr id="0" name=""/>
+                      <p:cNvPicPr/>
+                      <p:nvPr/>
+                    </p:nvPicPr>
+                    <p:blipFill>
+                      <a:blip r:embed="rId4"/>
+                      <a:stretch>
+                        <a:fillRect/>
+                      </a:stretch>
+                    </p:blipFill>
+                    <p:spPr>
+                      <a:xfrm>
+                        <a:off x="838199" y="1600994"/>
+                        <a:ext cx="4138749" cy="4800600"/>
+                      </a:xfrm>
+                      <a:prstGeom prst="rect">
+                        <a:avLst/>
+                      </a:prstGeom>
+                    </p:spPr>
+                  </p:pic>
+                </p:oleObj>
+              </mc:Fallback>
+            </mc:AlternateContent>
+          </a:graphicData>
+        </a:graphic>
+      </p:graphicFrame>
+    </p:spTree>
+    <p:extLst>
+      <p:ext uri="{BB962C8B-B14F-4D97-AF65-F5344CB8AC3E}">
+        <p14:creationId xmlns:p14="http://schemas.microsoft.com/office/powerpoint/2010/main" val="3569511653"/>
+      </p:ext>
+    </p:extLst>
+  </p:cSld>
+  <p:clrMapOvr>
+    <a:masterClrMapping/>
+  </p:clrMapOvr>
+</p:sld>
+</file>
+
+<file path=ppt/slides/slide24.xml><?xml version="1.0" encoding="utf-8"?>
+<p:sld xmlns:a="http://schemas.openxmlformats.org/drawingml/2006/main" xmlns:r="http://schemas.openxmlformats.org/officeDocument/2006/relationships" xmlns:p="http://schemas.openxmlformats.org/presentationml/2006/main">
+  <p:cSld>
+    <p:spTree>
+      <p:nvGrpSpPr>
+        <p:cNvPr id="1" name=""/>
+        <p:cNvGrpSpPr/>
+        <p:nvPr/>
+      </p:nvGrpSpPr>
+      <p:grpSpPr>
+        <a:xfrm>
+          <a:off x="0" y="0"/>
+          <a:ext cx="0" cy="0"/>
+          <a:chOff x="0" y="0"/>
+          <a:chExt cx="0" cy="0"/>
+        </a:xfrm>
+      </p:grpSpPr>
+      <p:sp>
+        <p:nvSpPr>
+          <p:cNvPr id="2" name="Título 1"/>
+          <p:cNvSpPr>
+            <a:spLocks noGrp="1"/>
+          </p:cNvSpPr>
+          <p:nvPr>
+            <p:ph type="title"/>
+          </p:nvPr>
+        </p:nvSpPr>
+        <p:spPr/>
+        <p:txBody>
+          <a:bodyPr/>
+          <a:lstStyle/>
+          <a:p>
+            <a:r>
+              <a:rPr lang="es-ES" dirty="0" smtClean="0"/>
+              <a:t>Pruebas entrenamiento </a:t>
+            </a:r>
+            <a:r>
+              <a:rPr lang="es-ES" dirty="0" err="1" smtClean="0"/>
+              <a:t>patch-wise</a:t>
+            </a:r>
+            <a:endParaRPr lang="es-ES" dirty="0"/>
+          </a:p>
+        </p:txBody>
+      </p:sp>
+      <p:sp>
+        <p:nvSpPr>
+          <p:cNvPr id="3" name="Marcador de contenido 2"/>
+          <p:cNvSpPr>
+            <a:spLocks noGrp="1"/>
+          </p:cNvSpPr>
+          <p:nvPr>
+            <p:ph idx="1"/>
+          </p:nvPr>
+        </p:nvSpPr>
+        <p:spPr>
+          <a:xfrm>
+            <a:off x="5199017" y="1825625"/>
+            <a:ext cx="6154782" cy="4300855"/>
+          </a:xfrm>
+        </p:spPr>
+        <p:txBody>
+          <a:bodyPr/>
+          <a:lstStyle/>
+          <a:p>
+            <a:pPr marL="0" indent="0">
+              <a:buNone/>
+            </a:pPr>
+            <a:r>
+              <a:rPr lang="es-ES" dirty="0" smtClean="0"/>
+              <a:t>7601 </a:t>
+            </a:r>
+            <a:r>
+              <a:rPr lang="es-ES" dirty="0" err="1" smtClean="0"/>
+              <a:t>Patches</a:t>
+            </a:r>
+            <a:endParaRPr lang="es-ES" dirty="0"/>
+          </a:p>
+          <a:p>
+            <a:pPr marL="0" indent="0">
+              <a:buNone/>
+            </a:pPr>
+            <a:endParaRPr lang="es-ES" dirty="0"/>
+          </a:p>
+          <a:p>
+            <a:r>
+              <a:rPr lang="es-ES" dirty="0" smtClean="0"/>
+              <a:t>ACC: </a:t>
+            </a:r>
+            <a:r>
+              <a:rPr lang="es-ES" dirty="0" smtClean="0"/>
+              <a:t>0.984</a:t>
+            </a:r>
+            <a:endParaRPr lang="es-ES" dirty="0" smtClean="0"/>
+          </a:p>
+          <a:p>
+            <a:r>
+              <a:rPr lang="es-ES" dirty="0" smtClean="0"/>
+              <a:t>VAL_ACC: </a:t>
+            </a:r>
+            <a:r>
+              <a:rPr lang="es-ES" dirty="0" smtClean="0"/>
+              <a:t>0.955</a:t>
+            </a:r>
+          </a:p>
+          <a:p>
+            <a:endParaRPr lang="es-ES" dirty="0"/>
+          </a:p>
+          <a:p>
+            <a:pPr marL="0" indent="0">
+              <a:buNone/>
+            </a:pPr>
+            <a:r>
+              <a:rPr lang="es-ES" dirty="0" smtClean="0"/>
+              <a:t>Ahora si están las curvas bien posicionadas, val set representativo</a:t>
+            </a:r>
+            <a:endParaRPr lang="es-ES" dirty="0" smtClean="0"/>
+          </a:p>
+          <a:p>
+            <a:pPr marL="0" indent="0">
+              <a:buNone/>
+            </a:pPr>
+            <a:endParaRPr lang="es-ES" dirty="0" smtClean="0"/>
+          </a:p>
+          <a:p>
+            <a:pPr marL="0" indent="0">
+              <a:buNone/>
+            </a:pPr>
+            <a:endParaRPr lang="es-ES" dirty="0" smtClean="0"/>
+          </a:p>
+        </p:txBody>
+      </p:sp>
+      <p:pic>
+        <p:nvPicPr>
+          <p:cNvPr id="6" name="Imagen 5"/>
+          <p:cNvPicPr>
+            <a:picLocks noChangeAspect="1"/>
+          </p:cNvPicPr>
+          <p:nvPr/>
+        </p:nvPicPr>
+        <p:blipFill>
+          <a:blip r:embed="rId2">
+            <a:extLst>
+              <a:ext uri="{28A0092B-C50C-407E-A947-70E740481C1C}">
+                <a14:useLocalDpi xmlns:a14="http://schemas.microsoft.com/office/drawing/2010/main" val="0"/>
+              </a:ext>
+            </a:extLst>
+          </a:blip>
+          <a:stretch>
+            <a:fillRect/>
+          </a:stretch>
+        </p:blipFill>
+        <p:spPr>
+          <a:xfrm>
+            <a:off x="1190070" y="1446494"/>
+            <a:ext cx="3677945" cy="4679986"/>
+          </a:xfrm>
+          <a:prstGeom prst="rect">
+            <a:avLst/>
+          </a:prstGeom>
+        </p:spPr>
+      </p:pic>
+    </p:spTree>
+    <p:extLst>
+      <p:ext uri="{BB962C8B-B14F-4D97-AF65-F5344CB8AC3E}">
+        <p14:creationId xmlns:p14="http://schemas.microsoft.com/office/powerpoint/2010/main" val="2708840371"/>
+      </p:ext>
+    </p:extLst>
+  </p:cSld>
+  <p:clrMapOvr>
+    <a:masterClrMapping/>
+  </p:clrMapOvr>
+</p:sld>
+</file>
+
+<file path=ppt/slides/slide25.xml><?xml version="1.0" encoding="utf-8"?>
+<p:sld xmlns:a="http://schemas.openxmlformats.org/drawingml/2006/main" xmlns:r="http://schemas.openxmlformats.org/officeDocument/2006/relationships" xmlns:p="http://schemas.openxmlformats.org/presentationml/2006/main">
+  <p:cSld>
+    <p:spTree>
+      <p:nvGrpSpPr>
+        <p:cNvPr id="1" name=""/>
+        <p:cNvGrpSpPr/>
+        <p:nvPr/>
+      </p:nvGrpSpPr>
+      <p:grpSpPr>
+        <a:xfrm>
+          <a:off x="0" y="0"/>
+          <a:ext cx="0" cy="0"/>
+          <a:chOff x="0" y="0"/>
+          <a:chExt cx="0" cy="0"/>
+        </a:xfrm>
+      </p:grpSpPr>
+      <p:sp>
+        <p:nvSpPr>
+          <p:cNvPr id="2" name="Título 1"/>
+          <p:cNvSpPr>
+            <a:spLocks noGrp="1"/>
+          </p:cNvSpPr>
+          <p:nvPr>
+            <p:ph type="title"/>
+          </p:nvPr>
+        </p:nvSpPr>
+        <p:spPr/>
+        <p:txBody>
+          <a:bodyPr/>
+          <a:lstStyle/>
+          <a:p>
+            <a:r>
+              <a:rPr lang="es-ES" dirty="0" smtClean="0"/>
+              <a:t>Entrenamiento </a:t>
+            </a:r>
+            <a:r>
+              <a:rPr lang="es-ES" dirty="0" err="1" smtClean="0"/>
+              <a:t>patch-wise</a:t>
+            </a:r>
+            <a:endParaRPr lang="es-ES" dirty="0"/>
+          </a:p>
+        </p:txBody>
+      </p:sp>
+      <p:sp>
+        <p:nvSpPr>
+          <p:cNvPr id="3" name="Marcador de contenido 2"/>
+          <p:cNvSpPr>
+            <a:spLocks noGrp="1"/>
+          </p:cNvSpPr>
+          <p:nvPr>
+            <p:ph idx="1"/>
+          </p:nvPr>
+        </p:nvSpPr>
+        <p:spPr>
+          <a:xfrm>
+            <a:off x="838200" y="1825625"/>
+            <a:ext cx="10515599" cy="4261666"/>
+          </a:xfrm>
+        </p:spPr>
+        <p:txBody>
+          <a:bodyPr/>
+          <a:lstStyle/>
+          <a:p>
+            <a:r>
+              <a:rPr lang="es-ES" dirty="0" smtClean="0"/>
+              <a:t>Resultados de este ejemplo irrelevantes. Pero ya esta funcionando el entrenamiento.</a:t>
+            </a:r>
+          </a:p>
+          <a:p>
+            <a:endParaRPr lang="es-ES" dirty="0"/>
+          </a:p>
+          <a:p>
+            <a:r>
+              <a:rPr lang="es-ES" dirty="0" err="1" smtClean="0"/>
+              <a:t>Validation</a:t>
+            </a:r>
+            <a:r>
+              <a:rPr lang="es-ES" dirty="0" smtClean="0"/>
+              <a:t> curve por debajo de training. Debido a </a:t>
+            </a:r>
+            <a:r>
+              <a:rPr lang="es-ES" dirty="0" err="1" smtClean="0"/>
+              <a:t>dropout</a:t>
+            </a:r>
+            <a:r>
+              <a:rPr lang="es-ES" dirty="0"/>
+              <a:t> </a:t>
+            </a:r>
+            <a:r>
+              <a:rPr lang="es-ES" dirty="0" err="1" smtClean="0"/>
+              <a:t>layers</a:t>
+            </a:r>
+            <a:r>
+              <a:rPr lang="es-ES" dirty="0" smtClean="0"/>
+              <a:t>??? </a:t>
+            </a:r>
+            <a:r>
+              <a:rPr lang="es-ES" dirty="0" smtClean="0"/>
+              <a:t>Y por coger un </a:t>
+            </a:r>
+            <a:r>
+              <a:rPr lang="es-ES" dirty="0" err="1" smtClean="0"/>
+              <a:t>validation</a:t>
+            </a:r>
+            <a:r>
+              <a:rPr lang="es-ES" dirty="0" smtClean="0"/>
+              <a:t> set no representativo</a:t>
+            </a:r>
+          </a:p>
+          <a:p>
+            <a:endParaRPr lang="es-ES" dirty="0"/>
+          </a:p>
+          <a:p>
+            <a:r>
+              <a:rPr lang="es-ES" dirty="0" smtClean="0"/>
+              <a:t>Curvas no muy estables =&gt; 10 CV</a:t>
+            </a:r>
+            <a:endParaRPr lang="es-ES" dirty="0" smtClean="0"/>
+          </a:p>
+        </p:txBody>
+      </p:sp>
+    </p:spTree>
+    <p:extLst>
+      <p:ext uri="{BB962C8B-B14F-4D97-AF65-F5344CB8AC3E}">
+        <p14:creationId xmlns:p14="http://schemas.microsoft.com/office/powerpoint/2010/main" val="686019735"/>
+      </p:ext>
+    </p:extLst>
+  </p:cSld>
+  <p:clrMapOvr>
+    <a:masterClrMapping/>
+  </p:clrMapOvr>
+</p:sld>
+</file>
+
+<file path=ppt/slides/slide26.xml><?xml version="1.0" encoding="utf-8"?>
+<p:sld xmlns:a="http://schemas.openxmlformats.org/drawingml/2006/main" xmlns:r="http://schemas.openxmlformats.org/officeDocument/2006/relationships" xmlns:p="http://schemas.openxmlformats.org/presentationml/2006/main">
+  <p:cSld>
+    <p:spTree>
+      <p:nvGrpSpPr>
+        <p:cNvPr id="1" name=""/>
+        <p:cNvGrpSpPr/>
+        <p:nvPr/>
+      </p:nvGrpSpPr>
+      <p:grpSpPr>
+        <a:xfrm>
+          <a:off x="0" y="0"/>
+          <a:ext cx="0" cy="0"/>
+          <a:chOff x="0" y="0"/>
+          <a:chExt cx="0" cy="0"/>
+        </a:xfrm>
+      </p:grpSpPr>
+      <p:sp>
+        <p:nvSpPr>
+          <p:cNvPr id="2" name="Título 1"/>
+          <p:cNvSpPr>
+            <a:spLocks noGrp="1"/>
+          </p:cNvSpPr>
+          <p:nvPr>
+            <p:ph type="title"/>
+          </p:nvPr>
+        </p:nvSpPr>
+        <p:spPr/>
+        <p:txBody>
+          <a:bodyPr/>
+          <a:lstStyle/>
+          <a:p>
+            <a:r>
+              <a:rPr lang="es-ES" dirty="0" smtClean="0"/>
+              <a:t>10 CV</a:t>
+            </a:r>
+            <a:endParaRPr lang="es-ES" dirty="0"/>
+          </a:p>
+        </p:txBody>
+      </p:sp>
+      <p:sp>
+        <p:nvSpPr>
+          <p:cNvPr id="3" name="Marcador de contenido 2"/>
+          <p:cNvSpPr>
+            <a:spLocks noGrp="1"/>
+          </p:cNvSpPr>
+          <p:nvPr>
+            <p:ph idx="1"/>
+          </p:nvPr>
+        </p:nvSpPr>
+        <p:spPr/>
+        <p:txBody>
+          <a:bodyPr/>
+          <a:lstStyle/>
+          <a:p>
+            <a:pPr marL="0" indent="0">
+              <a:buNone/>
+            </a:pPr>
+            <a:endParaRPr lang="es-ES" dirty="0" smtClean="0"/>
+          </a:p>
+          <a:p>
+            <a:r>
+              <a:rPr lang="es-ES" dirty="0" smtClean="0"/>
+              <a:t>En cuyo caso sería entrenar 10 modelos y hacer 10 </a:t>
+            </a:r>
+            <a:r>
+              <a:rPr lang="es-ES" dirty="0" err="1" smtClean="0"/>
+              <a:t>tests</a:t>
+            </a:r>
+            <a:r>
+              <a:rPr lang="es-ES" dirty="0" smtClean="0"/>
+              <a:t> y luego sacar la media a los resultados en el test.</a:t>
+            </a:r>
+          </a:p>
+          <a:p>
+            <a:endParaRPr lang="es-ES" dirty="0"/>
+          </a:p>
+        </p:txBody>
+      </p:sp>
+    </p:spTree>
+    <p:extLst>
+      <p:ext uri="{BB962C8B-B14F-4D97-AF65-F5344CB8AC3E}">
+        <p14:creationId xmlns:p14="http://schemas.microsoft.com/office/powerpoint/2010/main" val="1012395413"/>
       </p:ext>
     </p:extLst>
   </p:cSld>
@@ -4615,7 +6107,7 @@
     <p:controls>
       <mc:AlternateContent xmlns:mc="http://schemas.openxmlformats.org/markup-compatibility/2006">
         <mc:Choice xmlns:v="urn:schemas-microsoft-com:vml" Requires="v">
-          <p:control spid="1091" name="HTMLCheckbox1" r:id="rId2" imgW="257040" imgH="304920"/>
+          <p:control spid="1171" name="HTMLCheckbox1" r:id="rId2" imgW="257040" imgH="304920"/>
         </mc:Choice>
         <mc:Fallback>
           <p:control name="HTMLCheckbox1" r:id="rId2" imgW="257040" imgH="304920">
@@ -4667,7 +6159,7 @@
       </mc:AlternateContent>
       <mc:AlternateContent xmlns:mc="http://schemas.openxmlformats.org/markup-compatibility/2006">
         <mc:Choice xmlns:v="urn:schemas-microsoft-com:vml" Requires="v">
-          <p:control spid="1092" name="HTMLCheckbox2" r:id="rId3" imgW="257040" imgH="304920"/>
+          <p:control spid="1172" name="HTMLCheckbox2" r:id="rId3" imgW="257040" imgH="304920"/>
         </mc:Choice>
         <mc:Fallback>
           <p:control name="HTMLCheckbox2" r:id="rId3" imgW="257040" imgH="304920">
@@ -4719,7 +6211,7 @@
       </mc:AlternateContent>
       <mc:AlternateContent xmlns:mc="http://schemas.openxmlformats.org/markup-compatibility/2006">
         <mc:Choice xmlns:v="urn:schemas-microsoft-com:vml" Requires="v">
-          <p:control spid="1093" name="HTMLCheckbox3" r:id="rId4" imgW="257040" imgH="304920"/>
+          <p:control spid="1173" name="HTMLCheckbox3" r:id="rId4" imgW="257040" imgH="304920"/>
         </mc:Choice>
         <mc:Fallback>
           <p:control name="HTMLCheckbox3" r:id="rId4" imgW="257040" imgH="304920">
@@ -4771,7 +6263,7 @@
       </mc:AlternateContent>
       <mc:AlternateContent xmlns:mc="http://schemas.openxmlformats.org/markup-compatibility/2006">
         <mc:Choice xmlns:v="urn:schemas-microsoft-com:vml" Requires="v">
-          <p:control spid="1094" name="HTMLCheckbox4" r:id="rId5" imgW="257040" imgH="304920"/>
+          <p:control spid="1174" name="HTMLCheckbox4" r:id="rId5" imgW="257040" imgH="304920"/>
         </mc:Choice>
         <mc:Fallback>
           <p:control name="HTMLCheckbox4" r:id="rId5" imgW="257040" imgH="304920">

</xml_diff>

<commit_message>
Testing 10CV with bigger sets
</commit_message>
<xml_diff>
--- a/pregunta.pptx
+++ b/pregunta.pptx
@@ -24,13 +24,15 @@
     <p:sldId id="274" r:id="rId18"/>
     <p:sldId id="277" r:id="rId19"/>
     <p:sldId id="275" r:id="rId20"/>
-    <p:sldId id="276" r:id="rId21"/>
-    <p:sldId id="281" r:id="rId22"/>
-    <p:sldId id="282" r:id="rId23"/>
-    <p:sldId id="279" r:id="rId24"/>
-    <p:sldId id="283" r:id="rId25"/>
-    <p:sldId id="280" r:id="rId26"/>
-    <p:sldId id="278" r:id="rId27"/>
+    <p:sldId id="285" r:id="rId21"/>
+    <p:sldId id="286" r:id="rId22"/>
+    <p:sldId id="281" r:id="rId23"/>
+    <p:sldId id="282" r:id="rId24"/>
+    <p:sldId id="279" r:id="rId25"/>
+    <p:sldId id="283" r:id="rId26"/>
+    <p:sldId id="280" r:id="rId27"/>
+    <p:sldId id="278" r:id="rId28"/>
+    <p:sldId id="284" r:id="rId29"/>
   </p:sldIdLst>
   <p:sldSz cx="12192000" cy="6858000"/>
   <p:notesSz cx="6858000" cy="9144000"/>
@@ -284,7 +286,7 @@
           <a:p>
             <a:fld id="{E816971E-1CC9-4B1B-B84A-56D45306C128}" type="datetimeFigureOut">
               <a:rPr lang="es-ES" smtClean="0"/>
-              <a:t>11/05/2022</a:t>
+              <a:t>13/05/2022</a:t>
             </a:fld>
             <a:endParaRPr lang="es-ES"/>
           </a:p>
@@ -454,7 +456,7 @@
           <a:p>
             <a:fld id="{E816971E-1CC9-4B1B-B84A-56D45306C128}" type="datetimeFigureOut">
               <a:rPr lang="es-ES" smtClean="0"/>
-              <a:t>11/05/2022</a:t>
+              <a:t>13/05/2022</a:t>
             </a:fld>
             <a:endParaRPr lang="es-ES"/>
           </a:p>
@@ -634,7 +636,7 @@
           <a:p>
             <a:fld id="{E816971E-1CC9-4B1B-B84A-56D45306C128}" type="datetimeFigureOut">
               <a:rPr lang="es-ES" smtClean="0"/>
-              <a:t>11/05/2022</a:t>
+              <a:t>13/05/2022</a:t>
             </a:fld>
             <a:endParaRPr lang="es-ES"/>
           </a:p>
@@ -804,7 +806,7 @@
           <a:p>
             <a:fld id="{E816971E-1CC9-4B1B-B84A-56D45306C128}" type="datetimeFigureOut">
               <a:rPr lang="es-ES" smtClean="0"/>
-              <a:t>11/05/2022</a:t>
+              <a:t>13/05/2022</a:t>
             </a:fld>
             <a:endParaRPr lang="es-ES"/>
           </a:p>
@@ -1050,7 +1052,7 @@
           <a:p>
             <a:fld id="{E816971E-1CC9-4B1B-B84A-56D45306C128}" type="datetimeFigureOut">
               <a:rPr lang="es-ES" smtClean="0"/>
-              <a:t>11/05/2022</a:t>
+              <a:t>13/05/2022</a:t>
             </a:fld>
             <a:endParaRPr lang="es-ES"/>
           </a:p>
@@ -1282,7 +1284,7 @@
           <a:p>
             <a:fld id="{E816971E-1CC9-4B1B-B84A-56D45306C128}" type="datetimeFigureOut">
               <a:rPr lang="es-ES" smtClean="0"/>
-              <a:t>11/05/2022</a:t>
+              <a:t>13/05/2022</a:t>
             </a:fld>
             <a:endParaRPr lang="es-ES"/>
           </a:p>
@@ -1649,7 +1651,7 @@
           <a:p>
             <a:fld id="{E816971E-1CC9-4B1B-B84A-56D45306C128}" type="datetimeFigureOut">
               <a:rPr lang="es-ES" smtClean="0"/>
-              <a:t>11/05/2022</a:t>
+              <a:t>13/05/2022</a:t>
             </a:fld>
             <a:endParaRPr lang="es-ES"/>
           </a:p>
@@ -1767,7 +1769,7 @@
           <a:p>
             <a:fld id="{E816971E-1CC9-4B1B-B84A-56D45306C128}" type="datetimeFigureOut">
               <a:rPr lang="es-ES" smtClean="0"/>
-              <a:t>11/05/2022</a:t>
+              <a:t>13/05/2022</a:t>
             </a:fld>
             <a:endParaRPr lang="es-ES"/>
           </a:p>
@@ -1862,7 +1864,7 @@
           <a:p>
             <a:fld id="{E816971E-1CC9-4B1B-B84A-56D45306C128}" type="datetimeFigureOut">
               <a:rPr lang="es-ES" smtClean="0"/>
-              <a:t>11/05/2022</a:t>
+              <a:t>13/05/2022</a:t>
             </a:fld>
             <a:endParaRPr lang="es-ES"/>
           </a:p>
@@ -2139,7 +2141,7 @@
           <a:p>
             <a:fld id="{E816971E-1CC9-4B1B-B84A-56D45306C128}" type="datetimeFigureOut">
               <a:rPr lang="es-ES" smtClean="0"/>
-              <a:t>11/05/2022</a:t>
+              <a:t>13/05/2022</a:t>
             </a:fld>
             <a:endParaRPr lang="es-ES"/>
           </a:p>
@@ -2392,7 +2394,7 @@
           <a:p>
             <a:fld id="{E816971E-1CC9-4B1B-B84A-56D45306C128}" type="datetimeFigureOut">
               <a:rPr lang="es-ES" smtClean="0"/>
-              <a:t>11/05/2022</a:t>
+              <a:t>13/05/2022</a:t>
             </a:fld>
             <a:endParaRPr lang="es-ES"/>
           </a:p>
@@ -2605,7 +2607,7 @@
           <a:p>
             <a:fld id="{E816971E-1CC9-4B1B-B84A-56D45306C128}" type="datetimeFigureOut">
               <a:rPr lang="es-ES" smtClean="0"/>
-              <a:t>11/05/2022</a:t>
+              <a:t>13/05/2022</a:t>
             </a:fld>
             <a:endParaRPr lang="es-ES"/>
           </a:p>
@@ -4336,7 +4338,7 @@
         <p:spPr/>
         <p:txBody>
           <a:bodyPr>
-            <a:normAutofit fontScale="70000" lnSpcReduction="20000"/>
+            <a:normAutofit fontScale="92500" lnSpcReduction="20000"/>
           </a:bodyPr>
           <a:lstStyle/>
           <a:p>
@@ -4372,6 +4374,12 @@
               <a:rPr lang="es-ES" dirty="0" smtClean="0"/>
               <a:t> y añadir capas lineales finales y volver a entrenar.</a:t>
             </a:r>
+          </a:p>
+          <a:p>
+            <a:pPr marL="0" indent="0">
+              <a:buNone/>
+            </a:pPr>
+            <a:endParaRPr lang="es-ES" dirty="0" smtClean="0"/>
           </a:p>
           <a:p>
             <a:pPr>
@@ -4380,16 +4388,31 @@
             </a:pPr>
             <a:r>
               <a:rPr lang="es-ES" dirty="0" smtClean="0"/>
-              <a:t>Problema: Introducir los datos </a:t>
-            </a:r>
-            <a:r>
-              <a:rPr lang="es-ES" dirty="0" smtClean="0"/>
-              <a:t>al modelo, </a:t>
-            </a:r>
-            <a:r>
-              <a:rPr lang="es-ES" dirty="0" smtClean="0"/>
-              <a:t>al ser heterogéneos habría que juntar todos los datos en un set.</a:t>
-            </a:r>
+              <a:t>Problema: </a:t>
+            </a:r>
+            <a:r>
+              <a:rPr lang="es-ES" dirty="0" err="1" smtClean="0"/>
+              <a:t>Dimensionalidad</a:t>
+            </a:r>
+            <a:r>
+              <a:rPr lang="es-ES" dirty="0" smtClean="0"/>
+              <a:t> de las </a:t>
+            </a:r>
+            <a:r>
+              <a:rPr lang="es-ES" dirty="0" err="1" smtClean="0"/>
+              <a:t>features</a:t>
+            </a:r>
+            <a:r>
+              <a:rPr lang="es-ES" dirty="0"/>
+              <a:t>.</a:t>
+            </a:r>
+            <a:endParaRPr lang="es-ES" dirty="0" smtClean="0"/>
+          </a:p>
+          <a:p>
+            <a:pPr marL="0" indent="0">
+              <a:buNone/>
+            </a:pPr>
+            <a:endParaRPr lang="es-ES" dirty="0" smtClean="0"/>
           </a:p>
           <a:p>
             <a:pPr>
@@ -4397,50 +4420,18 @@
               <a:buChar char="-"/>
             </a:pPr>
             <a:r>
-              <a:rPr lang="es-ES" dirty="0" smtClean="0"/>
-              <a:t>Solución: una vez entrenados todos los modelos utilizarlos para </a:t>
-            </a:r>
-            <a:r>
-              <a:rPr lang="es-ES" dirty="0" err="1" smtClean="0"/>
-              <a:t>feature</a:t>
-            </a:r>
-            <a:r>
-              <a:rPr lang="es-ES" dirty="0" smtClean="0"/>
-              <a:t> </a:t>
-            </a:r>
-            <a:r>
-              <a:rPr lang="es-ES" dirty="0" err="1" smtClean="0"/>
-              <a:t>extration</a:t>
-            </a:r>
-            <a:r>
-              <a:rPr lang="es-ES" dirty="0" smtClean="0"/>
-              <a:t> y crear un nuevo set de </a:t>
-            </a:r>
-            <a:r>
-              <a:rPr lang="es-ES" dirty="0" err="1" smtClean="0"/>
-              <a:t>features</a:t>
-            </a:r>
-            <a:r>
-              <a:rPr lang="es-ES" dirty="0" smtClean="0"/>
-              <a:t>.</a:t>
-            </a:r>
-          </a:p>
-          <a:p>
-            <a:pPr marL="0" indent="0">
-              <a:buNone/>
-            </a:pPr>
-            <a:r>
-              <a:rPr lang="es-ES" dirty="0" smtClean="0"/>
-              <a:t>   Utilizar esos </a:t>
-            </a:r>
-            <a:r>
-              <a:rPr lang="es-ES" dirty="0" err="1" smtClean="0"/>
-              <a:t>features</a:t>
-            </a:r>
-            <a:r>
-              <a:rPr lang="es-ES" dirty="0" smtClean="0"/>
-              <a:t> como nuevo set</a:t>
-            </a:r>
+              <a:rPr lang="es-ES" dirty="0">
+                <a:hlinkClick r:id="rId2"/>
+              </a:rPr>
+              <a:t>https://</a:t>
+            </a:r>
+            <a:r>
+              <a:rPr lang="es-ES" dirty="0" smtClean="0">
+                <a:hlinkClick r:id="rId2"/>
+              </a:rPr>
+              <a:t>ieeexplore.ieee.org/abstract/document/8396165</a:t>
+            </a:r>
+            <a:endParaRPr lang="es-ES" dirty="0" smtClean="0"/>
           </a:p>
           <a:p>
             <a:pPr>
@@ -4448,19 +4439,17 @@
               <a:buChar char="-"/>
             </a:pPr>
             <a:r>
-              <a:rPr lang="es-ES" dirty="0" smtClean="0"/>
-              <a:t>Problema: </a:t>
-            </a:r>
-            <a:r>
-              <a:rPr lang="es-ES" dirty="0" err="1" smtClean="0"/>
-              <a:t>Explainability</a:t>
-            </a:r>
-            <a:endParaRPr lang="es-ES" dirty="0" smtClean="0"/>
-          </a:p>
-          <a:p>
-            <a:pPr marL="0" indent="0">
-              <a:buNone/>
-            </a:pPr>
+              <a:rPr lang="es-ES" dirty="0">
+                <a:hlinkClick r:id="rId3"/>
+              </a:rPr>
+              <a:t>https://</a:t>
+            </a:r>
+            <a:r>
+              <a:rPr lang="es-ES" dirty="0" smtClean="0">
+                <a:hlinkClick r:id="rId3"/>
+              </a:rPr>
+              <a:t>link.springer.com/chapter/10.1007/978-3-030-88163-4_29</a:t>
+            </a:r>
             <a:endParaRPr lang="es-ES" dirty="0" smtClean="0"/>
           </a:p>
           <a:p>
@@ -4469,65 +4458,28 @@
               <a:buChar char="-"/>
             </a:pPr>
             <a:r>
-              <a:rPr lang="es-ES" dirty="0">
-                <a:hlinkClick r:id="rId2"/>
-              </a:rPr>
-              <a:t>https://</a:t>
-            </a:r>
-            <a:r>
-              <a:rPr lang="es-ES" dirty="0" smtClean="0">
-                <a:hlinkClick r:id="rId2"/>
-              </a:rPr>
-              <a:t>ieeexplore.ieee.org/abstract/document/8396165</a:t>
-            </a:r>
-            <a:endParaRPr lang="es-ES" dirty="0" smtClean="0"/>
+              <a:rPr lang="es-ES" dirty="0" smtClean="0"/>
+              <a:t>Paco: CNV y </a:t>
+            </a:r>
+            <a:r>
+              <a:rPr lang="es-ES" dirty="0" err="1" smtClean="0"/>
+              <a:t>RNASeq</a:t>
+            </a:r>
+            <a:endParaRPr lang="es-ES" dirty="0"/>
           </a:p>
           <a:p>
             <a:pPr>
               <a:buFontTx/>
               <a:buChar char="-"/>
             </a:pPr>
-            <a:r>
-              <a:rPr lang="es-ES" dirty="0">
-                <a:hlinkClick r:id="rId3"/>
-              </a:rPr>
-              <a:t>https://</a:t>
-            </a:r>
-            <a:r>
-              <a:rPr lang="es-ES" dirty="0" smtClean="0">
-                <a:hlinkClick r:id="rId3"/>
-              </a:rPr>
-              <a:t>link.springer.com/chapter/10.1007/978-3-030-88163-4_29</a:t>
-            </a:r>
             <a:endParaRPr lang="es-ES" dirty="0" smtClean="0"/>
           </a:p>
           <a:p>
-            <a:pPr>
-              <a:buFontTx/>
-              <a:buChar char="-"/>
+            <a:pPr marL="0" indent="0">
+              <a:buNone/>
             </a:pPr>
             <a:r>
               <a:rPr lang="es-ES" dirty="0" smtClean="0"/>
-              <a:t>Paco: CNV y </a:t>
-            </a:r>
-            <a:r>
-              <a:rPr lang="es-ES" dirty="0" err="1" smtClean="0"/>
-              <a:t>RNASeq</a:t>
-            </a:r>
-            <a:endParaRPr lang="es-ES" dirty="0" smtClean="0"/>
-          </a:p>
-          <a:p>
-            <a:pPr marL="0" indent="0">
-              <a:buNone/>
-            </a:pPr>
-            <a:endParaRPr lang="es-ES" dirty="0" smtClean="0"/>
-          </a:p>
-          <a:p>
-            <a:pPr marL="0" indent="0">
-              <a:buNone/>
-            </a:pPr>
-            <a:r>
-              <a:rPr lang="es-ES" dirty="0" smtClean="0"/>
               <a:t>Esto lo he visto para distintas redes, </a:t>
             </a:r>
             <a:r>
@@ -4536,7 +4488,7 @@
             </a:r>
             <a:r>
               <a:rPr lang="es-ES" dirty="0" smtClean="0"/>
-              <a:t>, pero no distintos datos</a:t>
+              <a:t>, pero no distintos datos. Usado en prognosis</a:t>
             </a:r>
           </a:p>
         </p:txBody>
@@ -4731,8 +4683,16 @@
           <a:lstStyle/>
           <a:p>
             <a:r>
-              <a:rPr lang="es-ES" dirty="0" smtClean="0"/>
-              <a:t>Fusión de información</a:t>
+              <a:rPr lang="es-ES" dirty="0" err="1" smtClean="0"/>
+              <a:t>Early</a:t>
+            </a:r>
+            <a:r>
+              <a:rPr lang="es-ES" dirty="0" smtClean="0"/>
+              <a:t> </a:t>
+            </a:r>
+            <a:r>
+              <a:rPr lang="es-ES" dirty="0" err="1" smtClean="0"/>
+              <a:t>fusion</a:t>
             </a:r>
             <a:endParaRPr lang="es-ES" dirty="0"/>
           </a:p>
@@ -4751,44 +4711,64 @@
         <p:spPr/>
         <p:txBody>
           <a:bodyPr>
-            <a:normAutofit/>
+            <a:normAutofit fontScale="85000" lnSpcReduction="20000"/>
           </a:bodyPr>
           <a:lstStyle/>
           <a:p>
-            <a:endParaRPr lang="es-ES" dirty="0"/>
-          </a:p>
-          <a:p>
-            <a:endParaRPr lang="es-ES" dirty="0"/>
-          </a:p>
-          <a:p>
-            <a:r>
-              <a:rPr lang="es-ES" dirty="0" smtClean="0"/>
-              <a:t>Hay que tener cuidado de separar el test set antes del </a:t>
-            </a:r>
-            <a:r>
-              <a:rPr lang="es-ES" dirty="0" err="1" smtClean="0"/>
-              <a:t>feature</a:t>
-            </a:r>
-            <a:r>
-              <a:rPr lang="es-ES" dirty="0" smtClean="0"/>
-              <a:t> </a:t>
-            </a:r>
-            <a:r>
-              <a:rPr lang="es-ES" dirty="0" err="1" smtClean="0"/>
-              <a:t>extraction</a:t>
+            <a:r>
+              <a:rPr lang="en-US" dirty="0" smtClean="0"/>
+              <a:t>“</a:t>
+            </a:r>
+            <a:r>
+              <a:rPr lang="en-US" dirty="0"/>
+              <a:t> We also performed experiments using early fusion approaches, in which obtained features from both RNA-</a:t>
+            </a:r>
+            <a:r>
+              <a:rPr lang="en-US" dirty="0" err="1"/>
+              <a:t>Seq</a:t>
+            </a:r>
+            <a:r>
+              <a:rPr lang="en-US" dirty="0"/>
+              <a:t> and WSIs data types were concatenated and fed to a classifier performing the final prediction. Under this last scheme, the straightforward features extracted for each data type (gene expression on one side, and accumulation -average sum- of the features extracted from the CNN for the different tiles of an image) was observed to decrease the performance of the fusion classification model. This decrease in the performance in comparison to the late fusion model may be due to the difference between the dimensionality of the features obtained from each data type, since a feature vector of size 512 is obtained in the case of the WSI and a feature vector of size between 3 and 10 genes is obtained in the case of </a:t>
+            </a:r>
+            <a:r>
+              <a:rPr lang="en-US" dirty="0" smtClean="0"/>
+              <a:t>RNA-</a:t>
+            </a:r>
+            <a:r>
+              <a:rPr lang="en-US" dirty="0" err="1" smtClean="0"/>
+              <a:t>Seq</a:t>
+            </a:r>
+            <a:r>
+              <a:rPr lang="en-US" dirty="0" smtClean="0"/>
+              <a:t>”</a:t>
+            </a:r>
+          </a:p>
+          <a:p>
+            <a:pPr marL="0" indent="0">
+              <a:buNone/>
+            </a:pPr>
+            <a:endParaRPr lang="en-US" dirty="0" smtClean="0"/>
+          </a:p>
+          <a:p>
+            <a:pPr marL="0" indent="0">
+              <a:buNone/>
+            </a:pPr>
+            <a:r>
+              <a:rPr lang="es-ES" dirty="0" smtClean="0"/>
+              <a:t>https</a:t>
             </a:r>
             <a:r>
               <a:rPr lang="es-ES" dirty="0"/>
-              <a:t>.</a:t>
-            </a:r>
-            <a:endParaRPr lang="es-ES" dirty="0" smtClean="0"/>
+              <a:t>://bmcbioinformatics.biomedcentral.com/articles/10.1186/s12859-021-04376-1</a:t>
+            </a:r>
           </a:p>
         </p:txBody>
       </p:sp>
     </p:spTree>
     <p:extLst>
       <p:ext uri="{BB962C8B-B14F-4D97-AF65-F5344CB8AC3E}">
-        <p14:creationId xmlns:p14="http://schemas.microsoft.com/office/powerpoint/2010/main" val="1809913109"/>
+        <p14:creationId xmlns:p14="http://schemas.microsoft.com/office/powerpoint/2010/main" val="907433349"/>
       </p:ext>
     </p:extLst>
   </p:cSld>
@@ -4831,6 +4811,147 @@
           <a:lstStyle/>
           <a:p>
             <a:r>
+              <a:rPr lang="es-ES" dirty="0" err="1" smtClean="0"/>
+              <a:t>Early</a:t>
+            </a:r>
+            <a:r>
+              <a:rPr lang="es-ES" dirty="0" smtClean="0"/>
+              <a:t> </a:t>
+            </a:r>
+            <a:r>
+              <a:rPr lang="es-ES" dirty="0" err="1" smtClean="0"/>
+              <a:t>fusion</a:t>
+            </a:r>
+            <a:endParaRPr lang="es-ES" dirty="0"/>
+          </a:p>
+        </p:txBody>
+      </p:sp>
+      <p:sp>
+        <p:nvSpPr>
+          <p:cNvPr id="3" name="Marcador de contenido 2"/>
+          <p:cNvSpPr>
+            <a:spLocks noGrp="1"/>
+          </p:cNvSpPr>
+          <p:nvPr>
+            <p:ph idx="1"/>
+          </p:nvPr>
+        </p:nvSpPr>
+        <p:spPr/>
+        <p:txBody>
+          <a:bodyPr/>
+          <a:lstStyle/>
+          <a:p>
+            <a:r>
+              <a:rPr lang="es-ES" dirty="0" smtClean="0"/>
+              <a:t>Se me ocurre si quizá se puede sacar un vector de </a:t>
+            </a:r>
+            <a:r>
+              <a:rPr lang="es-ES" dirty="0" err="1" smtClean="0"/>
+              <a:t>features</a:t>
+            </a:r>
+            <a:r>
+              <a:rPr lang="es-ES" dirty="0" smtClean="0"/>
+              <a:t> de los datos </a:t>
+            </a:r>
+            <a:r>
+              <a:rPr lang="es-ES" dirty="0" err="1" smtClean="0"/>
+              <a:t>ómicos</a:t>
+            </a:r>
+            <a:r>
+              <a:rPr lang="es-ES" dirty="0" smtClean="0"/>
+              <a:t>, o incluso un tensor haciendo alguna transformación para concatenarlo a las </a:t>
+            </a:r>
+            <a:r>
+              <a:rPr lang="es-ES" dirty="0" err="1" smtClean="0"/>
+              <a:t>features</a:t>
+            </a:r>
+            <a:r>
+              <a:rPr lang="es-ES" dirty="0" smtClean="0"/>
+              <a:t> de la CNN.</a:t>
+            </a:r>
+          </a:p>
+          <a:p>
+            <a:pPr marL="0" indent="0">
+              <a:buNone/>
+            </a:pPr>
+            <a:endParaRPr lang="es-ES" dirty="0" smtClean="0"/>
+          </a:p>
+          <a:p>
+            <a:endParaRPr lang="es-ES" dirty="0"/>
+          </a:p>
+          <a:p>
+            <a:r>
+              <a:rPr lang="es-ES" dirty="0"/>
+              <a:t>Hay que tener cuidado de separar el test set antes del </a:t>
+            </a:r>
+            <a:r>
+              <a:rPr lang="es-ES" dirty="0" err="1"/>
+              <a:t>feature</a:t>
+            </a:r>
+            <a:r>
+              <a:rPr lang="es-ES" dirty="0"/>
+              <a:t> </a:t>
+            </a:r>
+            <a:r>
+              <a:rPr lang="es-ES" dirty="0" err="1"/>
+              <a:t>extraction</a:t>
+            </a:r>
+            <a:r>
+              <a:rPr lang="es-ES" dirty="0"/>
+              <a:t>.</a:t>
+            </a:r>
+          </a:p>
+          <a:p>
+            <a:endParaRPr lang="es-ES" dirty="0"/>
+          </a:p>
+        </p:txBody>
+      </p:sp>
+    </p:spTree>
+    <p:extLst>
+      <p:ext uri="{BB962C8B-B14F-4D97-AF65-F5344CB8AC3E}">
+        <p14:creationId xmlns:p14="http://schemas.microsoft.com/office/powerpoint/2010/main" val="4000647601"/>
+      </p:ext>
+    </p:extLst>
+  </p:cSld>
+  <p:clrMapOvr>
+    <a:masterClrMapping/>
+  </p:clrMapOvr>
+</p:sld>
+</file>
+
+<file path=ppt/slides/slide22.xml><?xml version="1.0" encoding="utf-8"?>
+<p:sld xmlns:a="http://schemas.openxmlformats.org/drawingml/2006/main" xmlns:r="http://schemas.openxmlformats.org/officeDocument/2006/relationships" xmlns:p="http://schemas.openxmlformats.org/presentationml/2006/main">
+  <p:cSld>
+    <p:spTree>
+      <p:nvGrpSpPr>
+        <p:cNvPr id="1" name=""/>
+        <p:cNvGrpSpPr/>
+        <p:nvPr/>
+      </p:nvGrpSpPr>
+      <p:grpSpPr>
+        <a:xfrm>
+          <a:off x="0" y="0"/>
+          <a:ext cx="0" cy="0"/>
+          <a:chOff x="0" y="0"/>
+          <a:chExt cx="0" cy="0"/>
+        </a:xfrm>
+      </p:grpSpPr>
+      <p:sp>
+        <p:nvSpPr>
+          <p:cNvPr id="2" name="Título 1"/>
+          <p:cNvSpPr>
+            <a:spLocks noGrp="1"/>
+          </p:cNvSpPr>
+          <p:nvPr>
+            <p:ph type="title"/>
+          </p:nvPr>
+        </p:nvSpPr>
+        <p:spPr/>
+        <p:txBody>
+          <a:bodyPr/>
+          <a:lstStyle/>
+          <a:p>
+            <a:r>
               <a:rPr lang="es-ES" dirty="0" smtClean="0"/>
               <a:t>Clasificación binaria</a:t>
             </a:r>
@@ -4872,11 +4993,7 @@
           <a:p>
             <a:r>
               <a:rPr lang="es-ES" dirty="0" smtClean="0"/>
-              <a:t>Clasificador </a:t>
-            </a:r>
-            <a:r>
-              <a:rPr lang="es-ES" dirty="0" smtClean="0"/>
-              <a:t>binario</a:t>
+              <a:t>Clasificador binario</a:t>
             </a:r>
           </a:p>
           <a:p>
@@ -4938,7 +5055,7 @@
 </p:sld>
 </file>
 
-<file path=ppt/slides/slide22.xml><?xml version="1.0" encoding="utf-8"?>
+<file path=ppt/slides/slide23.xml><?xml version="1.0" encoding="utf-8"?>
 <p:sld xmlns:a="http://schemas.openxmlformats.org/drawingml/2006/main" xmlns:r="http://schemas.openxmlformats.org/officeDocument/2006/relationships" xmlns:p="http://schemas.openxmlformats.org/presentationml/2006/main">
   <p:cSld>
     <p:spTree>
@@ -4971,8 +5088,12 @@
           <a:lstStyle/>
           <a:p>
             <a:r>
-              <a:rPr lang="es-ES" dirty="0" smtClean="0"/>
-              <a:t>Clasificación binaria</a:t>
+              <a:rPr lang="es-ES" dirty="0"/>
+              <a:t>Pruebas entrenamiento </a:t>
+            </a:r>
+            <a:r>
+              <a:rPr lang="es-ES" dirty="0" err="1"/>
+              <a:t>patch-wise</a:t>
             </a:r>
             <a:endParaRPr lang="es-ES" dirty="0"/>
           </a:p>
@@ -5079,7 +5200,7 @@
 </p:sld>
 </file>
 
-<file path=ppt/slides/slide23.xml><?xml version="1.0" encoding="utf-8"?>
+<file path=ppt/slides/slide24.xml><?xml version="1.0" encoding="utf-8"?>
 <p:sld xmlns:a="http://schemas.openxmlformats.org/drawingml/2006/main" xmlns:r="http://schemas.openxmlformats.org/officeDocument/2006/relationships" xmlns:p="http://schemas.openxmlformats.org/presentationml/2006/main">
   <p:cSld>
     <p:spTree>
@@ -5234,20 +5355,20 @@
           <p:nvPr>
             <p:extLst>
               <p:ext uri="{D42A27DB-BD31-4B8C-83A1-F6EECF244321}">
-                <p14:modId xmlns:p14="http://schemas.microsoft.com/office/powerpoint/2010/main" val="978447593"/>
+                <p14:modId xmlns:p14="http://schemas.microsoft.com/office/powerpoint/2010/main" val="1400791853"/>
               </p:ext>
             </p:extLst>
           </p:nvPr>
         </p:nvGraphicFramePr>
         <p:xfrm>
-          <a:off x="838199" y="1600994"/>
-          <a:ext cx="4138749" cy="4800600"/>
+          <a:off x="838199" y="1423851"/>
+          <a:ext cx="4291470" cy="4977743"/>
         </p:xfrm>
         <a:graphic>
           <a:graphicData uri="http://schemas.openxmlformats.org/presentationml/2006/ole">
             <mc:AlternateContent xmlns:mc="http://schemas.openxmlformats.org/markup-compatibility/2006">
               <mc:Choice xmlns:v="urn:schemas-microsoft-com:vml" Requires="v">
-                <p:oleObj spid="_x0000_s2060" name="Acrobat Document" r:id="rId3" imgW="3428684" imgH="4800600" progId="AcroExch.Document.7">
+                <p:oleObj spid="_x0000_s2077" name="Acrobat Document" r:id="rId3" imgW="3428684" imgH="4800600" progId="AcroExch.Document.7">
                   <p:embed/>
                 </p:oleObj>
               </mc:Choice>
@@ -5268,8 +5389,8 @@
                     </p:blipFill>
                     <p:spPr>
                       <a:xfrm>
-                        <a:off x="838199" y="1600994"/>
-                        <a:ext cx="4138749" cy="4800600"/>
+                        <a:off x="838199" y="1423851"/>
+                        <a:ext cx="4291470" cy="4977743"/>
                       </a:xfrm>
                       <a:prstGeom prst="rect">
                         <a:avLst/>
@@ -5295,7 +5416,7 @@
 </p:sld>
 </file>
 
-<file path=ppt/slides/slide24.xml><?xml version="1.0" encoding="utf-8"?>
+<file path=ppt/slides/slide25.xml><?xml version="1.0" encoding="utf-8"?>
 <p:sld xmlns:a="http://schemas.openxmlformats.org/drawingml/2006/main" xmlns:r="http://schemas.openxmlformats.org/officeDocument/2006/relationships" xmlns:p="http://schemas.openxmlformats.org/presentationml/2006/main">
   <p:cSld>
     <p:spTree>
@@ -5381,22 +5502,13 @@
           <a:p>
             <a:r>
               <a:rPr lang="es-ES" dirty="0" smtClean="0"/>
-              <a:t>ACC: </a:t>
-            </a:r>
-            <a:r>
-              <a:rPr lang="es-ES" dirty="0" smtClean="0"/>
-              <a:t>0.984</a:t>
-            </a:r>
-            <a:endParaRPr lang="es-ES" dirty="0" smtClean="0"/>
-          </a:p>
-          <a:p>
-            <a:r>
-              <a:rPr lang="es-ES" dirty="0" smtClean="0"/>
-              <a:t>VAL_ACC: </a:t>
-            </a:r>
-            <a:r>
-              <a:rPr lang="es-ES" dirty="0" smtClean="0"/>
-              <a:t>0.955</a:t>
+              <a:t>ACC: 0.984</a:t>
+            </a:r>
+          </a:p>
+          <a:p>
+            <a:r>
+              <a:rPr lang="es-ES" dirty="0" smtClean="0"/>
+              <a:t>VAL_ACC: 0.955</a:t>
             </a:r>
           </a:p>
           <a:p>
@@ -5410,7 +5522,6 @@
               <a:rPr lang="es-ES" dirty="0" smtClean="0"/>
               <a:t>Ahora si están las curvas bien posicionadas, val set representativo</a:t>
             </a:r>
-            <a:endParaRPr lang="es-ES" dirty="0" smtClean="0"/>
           </a:p>
           <a:p>
             <a:pPr marL="0" indent="0">
@@ -5469,141 +5580,6 @@
 </p:sld>
 </file>
 
-<file path=ppt/slides/slide25.xml><?xml version="1.0" encoding="utf-8"?>
-<p:sld xmlns:a="http://schemas.openxmlformats.org/drawingml/2006/main" xmlns:r="http://schemas.openxmlformats.org/officeDocument/2006/relationships" xmlns:p="http://schemas.openxmlformats.org/presentationml/2006/main">
-  <p:cSld>
-    <p:spTree>
-      <p:nvGrpSpPr>
-        <p:cNvPr id="1" name=""/>
-        <p:cNvGrpSpPr/>
-        <p:nvPr/>
-      </p:nvGrpSpPr>
-      <p:grpSpPr>
-        <a:xfrm>
-          <a:off x="0" y="0"/>
-          <a:ext cx="0" cy="0"/>
-          <a:chOff x="0" y="0"/>
-          <a:chExt cx="0" cy="0"/>
-        </a:xfrm>
-      </p:grpSpPr>
-      <p:sp>
-        <p:nvSpPr>
-          <p:cNvPr id="2" name="Título 1"/>
-          <p:cNvSpPr>
-            <a:spLocks noGrp="1"/>
-          </p:cNvSpPr>
-          <p:nvPr>
-            <p:ph type="title"/>
-          </p:nvPr>
-        </p:nvSpPr>
-        <p:spPr/>
-        <p:txBody>
-          <a:bodyPr/>
-          <a:lstStyle/>
-          <a:p>
-            <a:r>
-              <a:rPr lang="es-ES" dirty="0" smtClean="0"/>
-              <a:t>Entrenamiento </a:t>
-            </a:r>
-            <a:r>
-              <a:rPr lang="es-ES" dirty="0" err="1" smtClean="0"/>
-              <a:t>patch-wise</a:t>
-            </a:r>
-            <a:endParaRPr lang="es-ES" dirty="0"/>
-          </a:p>
-        </p:txBody>
-      </p:sp>
-      <p:sp>
-        <p:nvSpPr>
-          <p:cNvPr id="3" name="Marcador de contenido 2"/>
-          <p:cNvSpPr>
-            <a:spLocks noGrp="1"/>
-          </p:cNvSpPr>
-          <p:nvPr>
-            <p:ph idx="1"/>
-          </p:nvPr>
-        </p:nvSpPr>
-        <p:spPr>
-          <a:xfrm>
-            <a:off x="838200" y="1825625"/>
-            <a:ext cx="10515599" cy="4261666"/>
-          </a:xfrm>
-        </p:spPr>
-        <p:txBody>
-          <a:bodyPr/>
-          <a:lstStyle/>
-          <a:p>
-            <a:r>
-              <a:rPr lang="es-ES" dirty="0" smtClean="0"/>
-              <a:t>Resultados de este ejemplo irrelevantes. Pero ya esta funcionando el entrenamiento.</a:t>
-            </a:r>
-          </a:p>
-          <a:p>
-            <a:endParaRPr lang="es-ES" dirty="0"/>
-          </a:p>
-          <a:p>
-            <a:r>
-              <a:rPr lang="es-ES" dirty="0" err="1" smtClean="0"/>
-              <a:t>Validation</a:t>
-            </a:r>
-            <a:r>
-              <a:rPr lang="es-ES" dirty="0" smtClean="0"/>
-              <a:t> curve por debajo de training. Debido a </a:t>
-            </a:r>
-            <a:r>
-              <a:rPr lang="es-ES" dirty="0" err="1" smtClean="0"/>
-              <a:t>dropout</a:t>
-            </a:r>
-            <a:r>
-              <a:rPr lang="es-ES" dirty="0"/>
-              <a:t> </a:t>
-            </a:r>
-            <a:r>
-              <a:rPr lang="es-ES" dirty="0" err="1" smtClean="0"/>
-              <a:t>layers</a:t>
-            </a:r>
-            <a:r>
-              <a:rPr lang="es-ES" dirty="0" smtClean="0"/>
-              <a:t>??? </a:t>
-            </a:r>
-            <a:r>
-              <a:rPr lang="es-ES" dirty="0" smtClean="0"/>
-              <a:t>Y por coger un </a:t>
-            </a:r>
-            <a:r>
-              <a:rPr lang="es-ES" dirty="0" err="1" smtClean="0"/>
-              <a:t>validation</a:t>
-            </a:r>
-            <a:r>
-              <a:rPr lang="es-ES" dirty="0" smtClean="0"/>
-              <a:t> set no representativo</a:t>
-            </a:r>
-          </a:p>
-          <a:p>
-            <a:endParaRPr lang="es-ES" dirty="0"/>
-          </a:p>
-          <a:p>
-            <a:r>
-              <a:rPr lang="es-ES" dirty="0" smtClean="0"/>
-              <a:t>Curvas no muy estables =&gt; 10 CV</a:t>
-            </a:r>
-            <a:endParaRPr lang="es-ES" dirty="0" smtClean="0"/>
-          </a:p>
-        </p:txBody>
-      </p:sp>
-    </p:spTree>
-    <p:extLst>
-      <p:ext uri="{BB962C8B-B14F-4D97-AF65-F5344CB8AC3E}">
-        <p14:creationId xmlns:p14="http://schemas.microsoft.com/office/powerpoint/2010/main" val="686019735"/>
-      </p:ext>
-    </p:extLst>
-  </p:cSld>
-  <p:clrMapOvr>
-    <a:masterClrMapping/>
-  </p:clrMapOvr>
-</p:sld>
-</file>
-
 <file path=ppt/slides/slide26.xml><?xml version="1.0" encoding="utf-8"?>
 <p:sld xmlns:a="http://schemas.openxmlformats.org/drawingml/2006/main" xmlns:r="http://schemas.openxmlformats.org/officeDocument/2006/relationships" xmlns:p="http://schemas.openxmlformats.org/presentationml/2006/main">
   <p:cSld>
@@ -5638,7 +5614,149 @@
           <a:p>
             <a:r>
               <a:rPr lang="es-ES" dirty="0" smtClean="0"/>
-              <a:t>10 CV</a:t>
+              <a:t>Entrenamiento </a:t>
+            </a:r>
+            <a:r>
+              <a:rPr lang="es-ES" dirty="0" err="1" smtClean="0"/>
+              <a:t>patch-wise</a:t>
+            </a:r>
+            <a:endParaRPr lang="es-ES" dirty="0"/>
+          </a:p>
+        </p:txBody>
+      </p:sp>
+      <p:sp>
+        <p:nvSpPr>
+          <p:cNvPr id="3" name="Marcador de contenido 2"/>
+          <p:cNvSpPr>
+            <a:spLocks noGrp="1"/>
+          </p:cNvSpPr>
+          <p:nvPr>
+            <p:ph idx="1"/>
+          </p:nvPr>
+        </p:nvSpPr>
+        <p:spPr>
+          <a:xfrm>
+            <a:off x="838200" y="1825625"/>
+            <a:ext cx="10515599" cy="4261666"/>
+          </a:xfrm>
+        </p:spPr>
+        <p:txBody>
+          <a:bodyPr>
+            <a:normAutofit lnSpcReduction="10000"/>
+          </a:bodyPr>
+          <a:lstStyle/>
+          <a:p>
+            <a:r>
+              <a:rPr lang="es-ES" dirty="0" smtClean="0"/>
+              <a:t>Resultados de este ejemplo irrelevantes. Pero ya esta funcionando el entrenamiento</a:t>
+            </a:r>
+            <a:endParaRPr lang="es-ES" dirty="0"/>
+          </a:p>
+          <a:p>
+            <a:endParaRPr lang="es-ES" dirty="0" smtClean="0"/>
+          </a:p>
+          <a:p>
+            <a:r>
+              <a:rPr lang="es-ES" dirty="0" smtClean="0"/>
+              <a:t>Las etiquetas estaban mal</a:t>
+            </a:r>
+          </a:p>
+          <a:p>
+            <a:endParaRPr lang="es-ES" dirty="0"/>
+          </a:p>
+          <a:p>
+            <a:r>
+              <a:rPr lang="es-ES" dirty="0" err="1" smtClean="0"/>
+              <a:t>Validation</a:t>
+            </a:r>
+            <a:r>
+              <a:rPr lang="es-ES" dirty="0" smtClean="0"/>
+              <a:t> curve por debajo de training. Debido a </a:t>
+            </a:r>
+            <a:r>
+              <a:rPr lang="es-ES" dirty="0" err="1" smtClean="0"/>
+              <a:t>dropout</a:t>
+            </a:r>
+            <a:r>
+              <a:rPr lang="es-ES" dirty="0"/>
+              <a:t> </a:t>
+            </a:r>
+            <a:r>
+              <a:rPr lang="es-ES" dirty="0" err="1" smtClean="0"/>
+              <a:t>layers</a:t>
+            </a:r>
+            <a:r>
+              <a:rPr lang="es-ES" dirty="0" smtClean="0"/>
+              <a:t>??? Y por coger un </a:t>
+            </a:r>
+            <a:r>
+              <a:rPr lang="es-ES" dirty="0" err="1" smtClean="0"/>
+              <a:t>validation</a:t>
+            </a:r>
+            <a:r>
+              <a:rPr lang="es-ES" dirty="0" smtClean="0"/>
+              <a:t> set no representativo</a:t>
+            </a:r>
+          </a:p>
+          <a:p>
+            <a:endParaRPr lang="es-ES" dirty="0"/>
+          </a:p>
+          <a:p>
+            <a:r>
+              <a:rPr lang="es-ES" dirty="0" smtClean="0"/>
+              <a:t>Curvas no muy estables =&gt; 10 CV</a:t>
+            </a:r>
+          </a:p>
+        </p:txBody>
+      </p:sp>
+    </p:spTree>
+    <p:extLst>
+      <p:ext uri="{BB962C8B-B14F-4D97-AF65-F5344CB8AC3E}">
+        <p14:creationId xmlns:p14="http://schemas.microsoft.com/office/powerpoint/2010/main" val="686019735"/>
+      </p:ext>
+    </p:extLst>
+  </p:cSld>
+  <p:clrMapOvr>
+    <a:masterClrMapping/>
+  </p:clrMapOvr>
+</p:sld>
+</file>
+
+<file path=ppt/slides/slide27.xml><?xml version="1.0" encoding="utf-8"?>
+<p:sld xmlns:a="http://schemas.openxmlformats.org/drawingml/2006/main" xmlns:r="http://schemas.openxmlformats.org/officeDocument/2006/relationships" xmlns:p="http://schemas.openxmlformats.org/presentationml/2006/main">
+  <p:cSld>
+    <p:spTree>
+      <p:nvGrpSpPr>
+        <p:cNvPr id="1" name=""/>
+        <p:cNvGrpSpPr/>
+        <p:nvPr/>
+      </p:nvGrpSpPr>
+      <p:grpSpPr>
+        <a:xfrm>
+          <a:off x="0" y="0"/>
+          <a:ext cx="0" cy="0"/>
+          <a:chOff x="0" y="0"/>
+          <a:chExt cx="0" cy="0"/>
+        </a:xfrm>
+      </p:grpSpPr>
+      <p:sp>
+        <p:nvSpPr>
+          <p:cNvPr id="2" name="Título 1"/>
+          <p:cNvSpPr>
+            <a:spLocks noGrp="1"/>
+          </p:cNvSpPr>
+          <p:nvPr>
+            <p:ph type="title"/>
+          </p:nvPr>
+        </p:nvSpPr>
+        <p:spPr/>
+        <p:txBody>
+          <a:bodyPr/>
+          <a:lstStyle/>
+          <a:p>
+            <a:r>
+              <a:rPr lang="es-ES" dirty="0" smtClean="0"/>
+              <a:t>10 CV Estratificado CASE WISE</a:t>
             </a:r>
             <a:endParaRPr lang="es-ES" dirty="0"/>
           </a:p>
@@ -5680,6 +5798,18 @@
           </a:p>
           <a:p>
             <a:endParaRPr lang="es-ES" dirty="0"/>
+          </a:p>
+          <a:p>
+            <a:r>
+              <a:rPr lang="es-ES" dirty="0" smtClean="0"/>
+              <a:t>Antes de sacar todos los datos limpios. 512x512 a magnificación X20</a:t>
+            </a:r>
+          </a:p>
+          <a:p>
+            <a:endParaRPr lang="es-ES" dirty="0"/>
+          </a:p>
+          <a:p>
+            <a:endParaRPr lang="es-ES" u="sng" dirty="0"/>
           </a:p>
         </p:txBody>
       </p:sp>
@@ -5687,6 +5817,219 @@
     <p:extLst>
       <p:ext uri="{BB962C8B-B14F-4D97-AF65-F5344CB8AC3E}">
         <p14:creationId xmlns:p14="http://schemas.microsoft.com/office/powerpoint/2010/main" val="1012395413"/>
+      </p:ext>
+    </p:extLst>
+  </p:cSld>
+  <p:clrMapOvr>
+    <a:masterClrMapping/>
+  </p:clrMapOvr>
+</p:sld>
+</file>
+
+<file path=ppt/slides/slide28.xml><?xml version="1.0" encoding="utf-8"?>
+<p:sld xmlns:a="http://schemas.openxmlformats.org/drawingml/2006/main" xmlns:r="http://schemas.openxmlformats.org/officeDocument/2006/relationships" xmlns:p="http://schemas.openxmlformats.org/presentationml/2006/main">
+  <p:cSld>
+    <p:spTree>
+      <p:nvGrpSpPr>
+        <p:cNvPr id="1" name=""/>
+        <p:cNvGrpSpPr/>
+        <p:nvPr/>
+      </p:nvGrpSpPr>
+      <p:grpSpPr>
+        <a:xfrm>
+          <a:off x="0" y="0"/>
+          <a:ext cx="0" cy="0"/>
+          <a:chOff x="0" y="0"/>
+          <a:chExt cx="0" cy="0"/>
+        </a:xfrm>
+      </p:grpSpPr>
+      <p:sp>
+        <p:nvSpPr>
+          <p:cNvPr id="2" name="Título 1"/>
+          <p:cNvSpPr>
+            <a:spLocks noGrp="1"/>
+          </p:cNvSpPr>
+          <p:nvPr>
+            <p:ph type="title"/>
+          </p:nvPr>
+        </p:nvSpPr>
+        <p:spPr/>
+        <p:txBody>
+          <a:bodyPr/>
+          <a:lstStyle/>
+          <a:p>
+            <a:r>
+              <a:rPr lang="es-ES" dirty="0" smtClean="0"/>
+              <a:t>Obtener el set de </a:t>
+            </a:r>
+            <a:r>
+              <a:rPr lang="es-ES" dirty="0" err="1" smtClean="0"/>
+              <a:t>patches</a:t>
+            </a:r>
+            <a:r>
+              <a:rPr lang="es-ES" dirty="0" smtClean="0"/>
+              <a:t> entero</a:t>
+            </a:r>
+            <a:endParaRPr lang="es-ES" dirty="0"/>
+          </a:p>
+        </p:txBody>
+      </p:sp>
+      <p:sp>
+        <p:nvSpPr>
+          <p:cNvPr id="3" name="Marcador de contenido 2"/>
+          <p:cNvSpPr>
+            <a:spLocks noGrp="1"/>
+          </p:cNvSpPr>
+          <p:nvPr>
+            <p:ph idx="1"/>
+          </p:nvPr>
+        </p:nvSpPr>
+        <p:spPr/>
+        <p:txBody>
+          <a:bodyPr>
+            <a:normAutofit fontScale="85000" lnSpcReduction="20000"/>
+          </a:bodyPr>
+          <a:lstStyle/>
+          <a:p>
+            <a:endParaRPr lang="es-ES" dirty="0"/>
+          </a:p>
+          <a:p>
+            <a:r>
+              <a:rPr lang="es-ES" dirty="0" smtClean="0"/>
+              <a:t>10 </a:t>
+            </a:r>
+            <a:r>
+              <a:rPr lang="es-ES" dirty="0"/>
+              <a:t>horas </a:t>
+            </a:r>
+            <a:r>
+              <a:rPr lang="es-ES" dirty="0" smtClean="0"/>
+              <a:t>todo </a:t>
+            </a:r>
+            <a:r>
+              <a:rPr lang="es-ES" dirty="0"/>
+              <a:t>el set </a:t>
+            </a:r>
+            <a:r>
+              <a:rPr lang="es-ES" dirty="0" smtClean="0"/>
+              <a:t>con </a:t>
+            </a:r>
+            <a:r>
+              <a:rPr lang="es-ES" dirty="0"/>
+              <a:t>magnificación </a:t>
+            </a:r>
+            <a:r>
+              <a:rPr lang="es-ES" dirty="0" smtClean="0"/>
+              <a:t>X10 y </a:t>
+            </a:r>
+            <a:r>
+              <a:rPr lang="es-ES" dirty="0" err="1" smtClean="0"/>
+              <a:t>patches</a:t>
+            </a:r>
+            <a:r>
+              <a:rPr lang="es-ES" dirty="0" smtClean="0"/>
+              <a:t> 300x300</a:t>
+            </a:r>
+          </a:p>
+          <a:p>
+            <a:endParaRPr lang="es-ES" dirty="0"/>
+          </a:p>
+          <a:p>
+            <a:r>
+              <a:rPr lang="es-ES" dirty="0" smtClean="0"/>
+              <a:t>??? horas </a:t>
+            </a:r>
+            <a:r>
+              <a:rPr lang="es-ES" dirty="0"/>
+              <a:t>todo el set con magnificación </a:t>
+            </a:r>
+            <a:r>
+              <a:rPr lang="es-ES" dirty="0" smtClean="0"/>
+              <a:t>X20 </a:t>
+            </a:r>
+            <a:r>
+              <a:rPr lang="es-ES" dirty="0"/>
+              <a:t>y </a:t>
+            </a:r>
+            <a:r>
+              <a:rPr lang="es-ES" dirty="0" err="1"/>
+              <a:t>patches</a:t>
+            </a:r>
+            <a:r>
+              <a:rPr lang="es-ES" dirty="0"/>
+              <a:t> </a:t>
+            </a:r>
+            <a:r>
+              <a:rPr lang="es-ES" dirty="0" smtClean="0"/>
+              <a:t>512x512</a:t>
+            </a:r>
+            <a:endParaRPr lang="es-ES" dirty="0"/>
+          </a:p>
+          <a:p>
+            <a:endParaRPr lang="es-ES" dirty="0" smtClean="0"/>
+          </a:p>
+          <a:p>
+            <a:r>
+              <a:rPr lang="es-ES" dirty="0" smtClean="0"/>
+              <a:t>Con un 10% de los datos el programa se congela</a:t>
+            </a:r>
+          </a:p>
+          <a:p>
+            <a:endParaRPr lang="es-ES" dirty="0"/>
+          </a:p>
+          <a:p>
+            <a:r>
+              <a:rPr lang="es-ES" dirty="0" smtClean="0"/>
+              <a:t>Idea: Coger </a:t>
+            </a:r>
+            <a:r>
+              <a:rPr lang="es-ES" dirty="0" err="1" smtClean="0"/>
+              <a:t>patches</a:t>
+            </a:r>
+            <a:r>
+              <a:rPr lang="es-ES" dirty="0" smtClean="0"/>
+              <a:t> aleatoriamente con una probabilidad del 5%</a:t>
+            </a:r>
+          </a:p>
+          <a:p>
+            <a:endParaRPr lang="es-ES" dirty="0" smtClean="0"/>
+          </a:p>
+          <a:p>
+            <a:r>
+              <a:rPr lang="es-ES" dirty="0" smtClean="0"/>
+              <a:t>Coger menos datos no acelera significativamente </a:t>
+            </a:r>
+          </a:p>
+          <a:p>
+            <a:pPr marL="0" indent="0">
+              <a:buNone/>
+            </a:pPr>
+            <a:r>
+              <a:rPr lang="es-ES" dirty="0" smtClean="0"/>
+              <a:t>- Tengo que optimizar – quitar foto 23? – </a:t>
+            </a:r>
+            <a:r>
+              <a:rPr lang="es-ES" smtClean="0"/>
+              <a:t>algo raro </a:t>
+            </a:r>
+            <a:r>
+              <a:rPr lang="es-ES" dirty="0" smtClean="0"/>
+              <a:t>pasa</a:t>
+            </a:r>
+            <a:endParaRPr lang="es-ES" dirty="0"/>
+          </a:p>
+          <a:p>
+            <a:endParaRPr lang="es-ES" dirty="0" smtClean="0"/>
+          </a:p>
+          <a:p>
+            <a:endParaRPr lang="es-ES" dirty="0"/>
+          </a:p>
+        </p:txBody>
+      </p:sp>
+    </p:spTree>
+    <p:extLst>
+      <p:ext uri="{BB962C8B-B14F-4D97-AF65-F5344CB8AC3E}">
+        <p14:creationId xmlns:p14="http://schemas.microsoft.com/office/powerpoint/2010/main" val="3799416918"/>
       </p:ext>
     </p:extLst>
   </p:cSld>
@@ -6107,7 +6450,7 @@
     <p:controls>
       <mc:AlternateContent xmlns:mc="http://schemas.openxmlformats.org/markup-compatibility/2006">
         <mc:Choice xmlns:v="urn:schemas-microsoft-com:vml" Requires="v">
-          <p:control spid="1171" name="HTMLCheckbox1" r:id="rId2" imgW="257040" imgH="304920"/>
+          <p:control spid="1239" name="HTMLCheckbox1" r:id="rId2" imgW="257040" imgH="304920"/>
         </mc:Choice>
         <mc:Fallback>
           <p:control name="HTMLCheckbox1" r:id="rId2" imgW="257040" imgH="304920">
@@ -6159,7 +6502,7 @@
       </mc:AlternateContent>
       <mc:AlternateContent xmlns:mc="http://schemas.openxmlformats.org/markup-compatibility/2006">
         <mc:Choice xmlns:v="urn:schemas-microsoft-com:vml" Requires="v">
-          <p:control spid="1172" name="HTMLCheckbox2" r:id="rId3" imgW="257040" imgH="304920"/>
+          <p:control spid="1240" name="HTMLCheckbox2" r:id="rId3" imgW="257040" imgH="304920"/>
         </mc:Choice>
         <mc:Fallback>
           <p:control name="HTMLCheckbox2" r:id="rId3" imgW="257040" imgH="304920">
@@ -6211,7 +6554,7 @@
       </mc:AlternateContent>
       <mc:AlternateContent xmlns:mc="http://schemas.openxmlformats.org/markup-compatibility/2006">
         <mc:Choice xmlns:v="urn:schemas-microsoft-com:vml" Requires="v">
-          <p:control spid="1173" name="HTMLCheckbox3" r:id="rId4" imgW="257040" imgH="304920"/>
+          <p:control spid="1241" name="HTMLCheckbox3" r:id="rId4" imgW="257040" imgH="304920"/>
         </mc:Choice>
         <mc:Fallback>
           <p:control name="HTMLCheckbox3" r:id="rId4" imgW="257040" imgH="304920">
@@ -6263,7 +6606,7 @@
       </mc:AlternateContent>
       <mc:AlternateContent xmlns:mc="http://schemas.openxmlformats.org/markup-compatibility/2006">
         <mc:Choice xmlns:v="urn:schemas-microsoft-com:vml" Requires="v">
-          <p:control spid="1174" name="HTMLCheckbox4" r:id="rId5" imgW="257040" imgH="304920"/>
+          <p:control spid="1242" name="HTMLCheckbox4" r:id="rId5" imgW="257040" imgH="304920"/>
         </mc:Choice>
         <mc:Fallback>
           <p:control name="HTMLCheckbox4" r:id="rId5" imgW="257040" imgH="304920">

</xml_diff>

<commit_message>
Testing memory allocation optimization
</commit_message>
<xml_diff>
--- a/pregunta.pptx
+++ b/pregunta.pptx
@@ -33,6 +33,11 @@
     <p:sldId id="280" r:id="rId27"/>
     <p:sldId id="278" r:id="rId28"/>
     <p:sldId id="284" r:id="rId29"/>
+    <p:sldId id="288" r:id="rId30"/>
+    <p:sldId id="290" r:id="rId31"/>
+    <p:sldId id="291" r:id="rId32"/>
+    <p:sldId id="292" r:id="rId33"/>
+    <p:sldId id="293" r:id="rId34"/>
   </p:sldIdLst>
   <p:sldSz cx="12192000" cy="6858000"/>
   <p:notesSz cx="6858000" cy="9144000"/>
@@ -286,7 +291,7 @@
           <a:p>
             <a:fld id="{E816971E-1CC9-4B1B-B84A-56D45306C128}" type="datetimeFigureOut">
               <a:rPr lang="es-ES" smtClean="0"/>
-              <a:t>13/05/2022</a:t>
+              <a:t>17/05/2022</a:t>
             </a:fld>
             <a:endParaRPr lang="es-ES"/>
           </a:p>
@@ -456,7 +461,7 @@
           <a:p>
             <a:fld id="{E816971E-1CC9-4B1B-B84A-56D45306C128}" type="datetimeFigureOut">
               <a:rPr lang="es-ES" smtClean="0"/>
-              <a:t>13/05/2022</a:t>
+              <a:t>17/05/2022</a:t>
             </a:fld>
             <a:endParaRPr lang="es-ES"/>
           </a:p>
@@ -636,7 +641,7 @@
           <a:p>
             <a:fld id="{E816971E-1CC9-4B1B-B84A-56D45306C128}" type="datetimeFigureOut">
               <a:rPr lang="es-ES" smtClean="0"/>
-              <a:t>13/05/2022</a:t>
+              <a:t>17/05/2022</a:t>
             </a:fld>
             <a:endParaRPr lang="es-ES"/>
           </a:p>
@@ -806,7 +811,7 @@
           <a:p>
             <a:fld id="{E816971E-1CC9-4B1B-B84A-56D45306C128}" type="datetimeFigureOut">
               <a:rPr lang="es-ES" smtClean="0"/>
-              <a:t>13/05/2022</a:t>
+              <a:t>17/05/2022</a:t>
             </a:fld>
             <a:endParaRPr lang="es-ES"/>
           </a:p>
@@ -1052,7 +1057,7 @@
           <a:p>
             <a:fld id="{E816971E-1CC9-4B1B-B84A-56D45306C128}" type="datetimeFigureOut">
               <a:rPr lang="es-ES" smtClean="0"/>
-              <a:t>13/05/2022</a:t>
+              <a:t>17/05/2022</a:t>
             </a:fld>
             <a:endParaRPr lang="es-ES"/>
           </a:p>
@@ -1284,7 +1289,7 @@
           <a:p>
             <a:fld id="{E816971E-1CC9-4B1B-B84A-56D45306C128}" type="datetimeFigureOut">
               <a:rPr lang="es-ES" smtClean="0"/>
-              <a:t>13/05/2022</a:t>
+              <a:t>17/05/2022</a:t>
             </a:fld>
             <a:endParaRPr lang="es-ES"/>
           </a:p>
@@ -1651,7 +1656,7 @@
           <a:p>
             <a:fld id="{E816971E-1CC9-4B1B-B84A-56D45306C128}" type="datetimeFigureOut">
               <a:rPr lang="es-ES" smtClean="0"/>
-              <a:t>13/05/2022</a:t>
+              <a:t>17/05/2022</a:t>
             </a:fld>
             <a:endParaRPr lang="es-ES"/>
           </a:p>
@@ -1769,7 +1774,7 @@
           <a:p>
             <a:fld id="{E816971E-1CC9-4B1B-B84A-56D45306C128}" type="datetimeFigureOut">
               <a:rPr lang="es-ES" smtClean="0"/>
-              <a:t>13/05/2022</a:t>
+              <a:t>17/05/2022</a:t>
             </a:fld>
             <a:endParaRPr lang="es-ES"/>
           </a:p>
@@ -1864,7 +1869,7 @@
           <a:p>
             <a:fld id="{E816971E-1CC9-4B1B-B84A-56D45306C128}" type="datetimeFigureOut">
               <a:rPr lang="es-ES" smtClean="0"/>
-              <a:t>13/05/2022</a:t>
+              <a:t>17/05/2022</a:t>
             </a:fld>
             <a:endParaRPr lang="es-ES"/>
           </a:p>
@@ -2141,7 +2146,7 @@
           <a:p>
             <a:fld id="{E816971E-1CC9-4B1B-B84A-56D45306C128}" type="datetimeFigureOut">
               <a:rPr lang="es-ES" smtClean="0"/>
-              <a:t>13/05/2022</a:t>
+              <a:t>17/05/2022</a:t>
             </a:fld>
             <a:endParaRPr lang="es-ES"/>
           </a:p>
@@ -2394,7 +2399,7 @@
           <a:p>
             <a:fld id="{E816971E-1CC9-4B1B-B84A-56D45306C128}" type="datetimeFigureOut">
               <a:rPr lang="es-ES" smtClean="0"/>
-              <a:t>13/05/2022</a:t>
+              <a:t>17/05/2022</a:t>
             </a:fld>
             <a:endParaRPr lang="es-ES"/>
           </a:p>
@@ -2607,7 +2612,7 @@
           <a:p>
             <a:fld id="{E816971E-1CC9-4B1B-B84A-56D45306C128}" type="datetimeFigureOut">
               <a:rPr lang="es-ES" smtClean="0"/>
-              <a:t>13/05/2022</a:t>
+              <a:t>17/05/2022</a:t>
             </a:fld>
             <a:endParaRPr lang="es-ES"/>
           </a:p>
@@ -5368,7 +5373,7 @@
           <a:graphicData uri="http://schemas.openxmlformats.org/presentationml/2006/ole">
             <mc:AlternateContent xmlns:mc="http://schemas.openxmlformats.org/markup-compatibility/2006">
               <mc:Choice xmlns:v="urn:schemas-microsoft-com:vml" Requires="v">
-                <p:oleObj spid="_x0000_s2077" name="Acrobat Document" r:id="rId3" imgW="3428684" imgH="4800600" progId="AcroExch.Document.7">
+                <p:oleObj spid="_x0000_s2084" name="Acrobat Document" r:id="rId3" imgW="3428684" imgH="4800600" progId="AcroExch.Document.7">
                   <p:embed/>
                 </p:oleObj>
               </mc:Choice>
@@ -6039,6 +6044,103 @@
 </p:sld>
 </file>
 
+<file path=ppt/slides/slide29.xml><?xml version="1.0" encoding="utf-8"?>
+<p:sld xmlns:a="http://schemas.openxmlformats.org/drawingml/2006/main" xmlns:r="http://schemas.openxmlformats.org/officeDocument/2006/relationships" xmlns:p="http://schemas.openxmlformats.org/presentationml/2006/main">
+  <p:cSld>
+    <p:spTree>
+      <p:nvGrpSpPr>
+        <p:cNvPr id="1" name=""/>
+        <p:cNvGrpSpPr/>
+        <p:nvPr/>
+      </p:nvGrpSpPr>
+      <p:grpSpPr>
+        <a:xfrm>
+          <a:off x="0" y="0"/>
+          <a:ext cx="0" cy="0"/>
+          <a:chOff x="0" y="0"/>
+          <a:chExt cx="0" cy="0"/>
+        </a:xfrm>
+      </p:grpSpPr>
+      <p:sp>
+        <p:nvSpPr>
+          <p:cNvPr id="2" name="Título 1"/>
+          <p:cNvSpPr>
+            <a:spLocks noGrp="1"/>
+          </p:cNvSpPr>
+          <p:nvPr>
+            <p:ph type="ctrTitle"/>
+          </p:nvPr>
+        </p:nvSpPr>
+        <p:spPr>
+          <a:xfrm>
+            <a:off x="1524000" y="1122363"/>
+            <a:ext cx="9144000" cy="496125"/>
+          </a:xfrm>
+        </p:spPr>
+        <p:txBody>
+          <a:bodyPr>
+            <a:normAutofit fontScale="90000"/>
+          </a:bodyPr>
+          <a:lstStyle/>
+          <a:p>
+            <a:r>
+              <a:rPr lang="es-ES" dirty="0"/>
+              <a:t>Fusión de datos </a:t>
+            </a:r>
+            <a:r>
+              <a:rPr lang="es-ES" dirty="0" smtClean="0"/>
+              <a:t>heterogéneos: </a:t>
+            </a:r>
+            <a:endParaRPr lang="es-ES" dirty="0"/>
+          </a:p>
+        </p:txBody>
+      </p:sp>
+      <p:sp>
+        <p:nvSpPr>
+          <p:cNvPr id="3" name="Subtítulo 2"/>
+          <p:cNvSpPr>
+            <a:spLocks noGrp="1"/>
+          </p:cNvSpPr>
+          <p:nvPr>
+            <p:ph type="subTitle" idx="1"/>
+          </p:nvPr>
+        </p:nvSpPr>
+        <p:spPr>
+          <a:xfrm>
+            <a:off x="1524000" y="1755648"/>
+            <a:ext cx="9144000" cy="3502152"/>
+          </a:xfrm>
+        </p:spPr>
+        <p:txBody>
+          <a:bodyPr>
+            <a:normAutofit/>
+          </a:bodyPr>
+          <a:lstStyle/>
+          <a:p>
+            <a:endParaRPr lang="es-ES" dirty="0" smtClean="0"/>
+          </a:p>
+          <a:p>
+            <a:r>
+              <a:rPr lang="es-ES" dirty="0" smtClean="0"/>
+              <a:t>30/05/22</a:t>
+            </a:r>
+            <a:endParaRPr lang="es-ES" dirty="0"/>
+          </a:p>
+        </p:txBody>
+      </p:sp>
+    </p:spTree>
+    <p:extLst>
+      <p:ext uri="{BB962C8B-B14F-4D97-AF65-F5344CB8AC3E}">
+        <p14:creationId xmlns:p14="http://schemas.microsoft.com/office/powerpoint/2010/main" val="1686969332"/>
+      </p:ext>
+    </p:extLst>
+  </p:cSld>
+  <p:clrMapOvr>
+    <a:masterClrMapping/>
+  </p:clrMapOvr>
+</p:sld>
+</file>
+
 <file path=ppt/slides/slide3.xml><?xml version="1.0" encoding="utf-8"?>
 <p:sld xmlns:a="http://schemas.openxmlformats.org/drawingml/2006/main" xmlns:r="http://schemas.openxmlformats.org/officeDocument/2006/relationships" xmlns:p="http://schemas.openxmlformats.org/presentationml/2006/main">
   <p:cSld>
@@ -6203,6 +6305,413 @@
     <p:extLst>
       <p:ext uri="{BB962C8B-B14F-4D97-AF65-F5344CB8AC3E}">
         <p14:creationId xmlns:p14="http://schemas.microsoft.com/office/powerpoint/2010/main" val="2180283873"/>
+      </p:ext>
+    </p:extLst>
+  </p:cSld>
+  <p:clrMapOvr>
+    <a:masterClrMapping/>
+  </p:clrMapOvr>
+</p:sld>
+</file>
+
+<file path=ppt/slides/slide30.xml><?xml version="1.0" encoding="utf-8"?>
+<p:sld xmlns:a="http://schemas.openxmlformats.org/drawingml/2006/main" xmlns:r="http://schemas.openxmlformats.org/officeDocument/2006/relationships" xmlns:p="http://schemas.openxmlformats.org/presentationml/2006/main">
+  <p:cSld>
+    <p:spTree>
+      <p:nvGrpSpPr>
+        <p:cNvPr id="1" name=""/>
+        <p:cNvGrpSpPr/>
+        <p:nvPr/>
+      </p:nvGrpSpPr>
+      <p:grpSpPr>
+        <a:xfrm>
+          <a:off x="0" y="0"/>
+          <a:ext cx="0" cy="0"/>
+          <a:chOff x="0" y="0"/>
+          <a:chExt cx="0" cy="0"/>
+        </a:xfrm>
+      </p:grpSpPr>
+      <p:sp>
+        <p:nvSpPr>
+          <p:cNvPr id="2" name="Título 1"/>
+          <p:cNvSpPr>
+            <a:spLocks noGrp="1"/>
+          </p:cNvSpPr>
+          <p:nvPr>
+            <p:ph type="title"/>
+          </p:nvPr>
+        </p:nvSpPr>
+        <p:spPr/>
+        <p:txBody>
+          <a:bodyPr/>
+          <a:lstStyle/>
+          <a:p>
+            <a:r>
+              <a:rPr lang="es-ES" dirty="0" err="1" smtClean="0"/>
+              <a:t>Probability</a:t>
+            </a:r>
+            <a:r>
+              <a:rPr lang="es-ES" dirty="0" smtClean="0"/>
+              <a:t> </a:t>
+            </a:r>
+            <a:r>
+              <a:rPr lang="es-ES" dirty="0" err="1" smtClean="0"/>
+              <a:t>fusion</a:t>
+            </a:r>
+            <a:r>
+              <a:rPr lang="es-ES" dirty="0" smtClean="0"/>
+              <a:t> usando F1 para los pesos</a:t>
+            </a:r>
+            <a:endParaRPr lang="es-ES" dirty="0"/>
+          </a:p>
+        </p:txBody>
+      </p:sp>
+      <p:sp>
+        <p:nvSpPr>
+          <p:cNvPr id="3" name="Marcador de contenido 2"/>
+          <p:cNvSpPr>
+            <a:spLocks noGrp="1"/>
+          </p:cNvSpPr>
+          <p:nvPr>
+            <p:ph idx="1"/>
+          </p:nvPr>
+        </p:nvSpPr>
+        <p:spPr/>
+        <p:txBody>
+          <a:bodyPr/>
+          <a:lstStyle/>
+          <a:p>
+            <a:pPr marL="0" indent="0">
+              <a:buNone/>
+            </a:pPr>
+            <a:r>
+              <a:rPr lang="es-ES" u="sng" smtClean="0"/>
+              <a:t>https</a:t>
+            </a:r>
+            <a:r>
+              <a:rPr lang="es-ES" u="sng" dirty="0"/>
+              <a:t>://ieeexplore.ieee.org/stamp/stamp.jsp?tp=&amp;arnumber=7930377</a:t>
+            </a:r>
+          </a:p>
+        </p:txBody>
+      </p:sp>
+    </p:spTree>
+    <p:extLst>
+      <p:ext uri="{BB962C8B-B14F-4D97-AF65-F5344CB8AC3E}">
+        <p14:creationId xmlns:p14="http://schemas.microsoft.com/office/powerpoint/2010/main" val="3658376566"/>
+      </p:ext>
+    </p:extLst>
+  </p:cSld>
+  <p:clrMapOvr>
+    <a:masterClrMapping/>
+  </p:clrMapOvr>
+</p:sld>
+</file>
+
+<file path=ppt/slides/slide31.xml><?xml version="1.0" encoding="utf-8"?>
+<p:sld xmlns:a="http://schemas.openxmlformats.org/drawingml/2006/main" xmlns:r="http://schemas.openxmlformats.org/officeDocument/2006/relationships" xmlns:p="http://schemas.openxmlformats.org/presentationml/2006/main">
+  <p:cSld>
+    <p:spTree>
+      <p:nvGrpSpPr>
+        <p:cNvPr id="1" name=""/>
+        <p:cNvGrpSpPr/>
+        <p:nvPr/>
+      </p:nvGrpSpPr>
+      <p:grpSpPr>
+        <a:xfrm>
+          <a:off x="0" y="0"/>
+          <a:ext cx="0" cy="0"/>
+          <a:chOff x="0" y="0"/>
+          <a:chExt cx="0" cy="0"/>
+        </a:xfrm>
+      </p:grpSpPr>
+      <p:sp>
+        <p:nvSpPr>
+          <p:cNvPr id="2" name="Título 1"/>
+          <p:cNvSpPr>
+            <a:spLocks noGrp="1"/>
+          </p:cNvSpPr>
+          <p:nvPr>
+            <p:ph type="title"/>
+          </p:nvPr>
+        </p:nvSpPr>
+        <p:spPr/>
+        <p:txBody>
+          <a:bodyPr/>
+          <a:lstStyle/>
+          <a:p>
+            <a:r>
+              <a:rPr lang="es-ES" dirty="0" smtClean="0"/>
+              <a:t>Probar</a:t>
+            </a:r>
+            <a:endParaRPr lang="es-ES" dirty="0"/>
+          </a:p>
+        </p:txBody>
+      </p:sp>
+      <p:sp>
+        <p:nvSpPr>
+          <p:cNvPr id="3" name="Marcador de contenido 2"/>
+          <p:cNvSpPr>
+            <a:spLocks noGrp="1"/>
+          </p:cNvSpPr>
+          <p:nvPr>
+            <p:ph idx="1"/>
+          </p:nvPr>
+        </p:nvSpPr>
+        <p:spPr/>
+        <p:txBody>
+          <a:bodyPr/>
+          <a:lstStyle/>
+          <a:p>
+            <a:r>
+              <a:rPr lang="es-ES" dirty="0" smtClean="0"/>
+              <a:t>Fine </a:t>
+            </a:r>
+            <a:r>
+              <a:rPr lang="es-ES" dirty="0" err="1" smtClean="0"/>
+              <a:t>tuning</a:t>
+            </a:r>
+            <a:endParaRPr lang="es-ES" dirty="0" smtClean="0"/>
+          </a:p>
+          <a:p>
+            <a:r>
+              <a:rPr lang="es-ES" dirty="0" smtClean="0"/>
+              <a:t>Usar más datos</a:t>
+            </a:r>
+            <a:endParaRPr lang="es-ES" dirty="0"/>
+          </a:p>
+        </p:txBody>
+      </p:sp>
+    </p:spTree>
+    <p:extLst>
+      <p:ext uri="{BB962C8B-B14F-4D97-AF65-F5344CB8AC3E}">
+        <p14:creationId xmlns:p14="http://schemas.microsoft.com/office/powerpoint/2010/main" val="3334366317"/>
+      </p:ext>
+    </p:extLst>
+  </p:cSld>
+  <p:clrMapOvr>
+    <a:masterClrMapping/>
+  </p:clrMapOvr>
+</p:sld>
+</file>
+
+<file path=ppt/slides/slide32.xml><?xml version="1.0" encoding="utf-8"?>
+<p:sld xmlns:a="http://schemas.openxmlformats.org/drawingml/2006/main" xmlns:r="http://schemas.openxmlformats.org/officeDocument/2006/relationships" xmlns:p="http://schemas.openxmlformats.org/presentationml/2006/main">
+  <p:cSld>
+    <p:spTree>
+      <p:nvGrpSpPr>
+        <p:cNvPr id="1" name=""/>
+        <p:cNvGrpSpPr/>
+        <p:nvPr/>
+      </p:nvGrpSpPr>
+      <p:grpSpPr>
+        <a:xfrm>
+          <a:off x="0" y="0"/>
+          <a:ext cx="0" cy="0"/>
+          <a:chOff x="0" y="0"/>
+          <a:chExt cx="0" cy="0"/>
+        </a:xfrm>
+      </p:grpSpPr>
+      <p:sp>
+        <p:nvSpPr>
+          <p:cNvPr id="2" name="Título 1"/>
+          <p:cNvSpPr>
+            <a:spLocks noGrp="1"/>
+          </p:cNvSpPr>
+          <p:nvPr>
+            <p:ph type="title"/>
+          </p:nvPr>
+        </p:nvSpPr>
+        <p:spPr/>
+        <p:txBody>
+          <a:bodyPr/>
+          <a:lstStyle/>
+          <a:p>
+            <a:endParaRPr lang="es-ES" dirty="0"/>
+          </a:p>
+        </p:txBody>
+      </p:sp>
+      <p:sp>
+        <p:nvSpPr>
+          <p:cNvPr id="3" name="Marcador de contenido 2"/>
+          <p:cNvSpPr>
+            <a:spLocks noGrp="1"/>
+          </p:cNvSpPr>
+          <p:nvPr>
+            <p:ph idx="1"/>
+          </p:nvPr>
+        </p:nvSpPr>
+        <p:spPr/>
+        <p:txBody>
+          <a:bodyPr/>
+          <a:lstStyle/>
+          <a:p>
+            <a:r>
+              <a:rPr lang="es-ES" dirty="0" smtClean="0"/>
+              <a:t>Entrenar con LR = 1e-4 las ultimas capas FC</a:t>
+            </a:r>
+          </a:p>
+          <a:p>
+            <a:endParaRPr lang="es-ES" dirty="0"/>
+          </a:p>
+          <a:p>
+            <a:r>
+              <a:rPr lang="es-ES" dirty="0" smtClean="0"/>
+              <a:t>Re entrenar todo con LR = 1e-5</a:t>
+            </a:r>
+          </a:p>
+          <a:p>
+            <a:endParaRPr lang="es-ES" dirty="0"/>
+          </a:p>
+          <a:p>
+            <a:r>
+              <a:rPr lang="es-ES" dirty="0" err="1" smtClean="0"/>
+              <a:t>Overfitting</a:t>
+            </a:r>
+            <a:r>
+              <a:rPr lang="es-ES" dirty="0" smtClean="0"/>
+              <a:t> por tener set pequeño</a:t>
+            </a:r>
+            <a:endParaRPr lang="es-ES" dirty="0"/>
+          </a:p>
+        </p:txBody>
+      </p:sp>
+      <p:pic>
+        <p:nvPicPr>
+          <p:cNvPr id="4" name="Imagen 3"/>
+          <p:cNvPicPr>
+            <a:picLocks noChangeAspect="1"/>
+          </p:cNvPicPr>
+          <p:nvPr/>
+        </p:nvPicPr>
+        <p:blipFill>
+          <a:blip r:embed="rId2">
+            <a:extLst>
+              <a:ext uri="{28A0092B-C50C-407E-A947-70E740481C1C}">
+                <a14:useLocalDpi xmlns:a14="http://schemas.microsoft.com/office/drawing/2010/main" val="0"/>
+              </a:ext>
+            </a:extLst>
+          </a:blip>
+          <a:stretch>
+            <a:fillRect/>
+          </a:stretch>
+        </p:blipFill>
+        <p:spPr>
+          <a:xfrm>
+            <a:off x="7588789" y="2063199"/>
+            <a:ext cx="3617777" cy="3876189"/>
+          </a:xfrm>
+          <a:prstGeom prst="rect">
+            <a:avLst/>
+          </a:prstGeom>
+        </p:spPr>
+      </p:pic>
+    </p:spTree>
+    <p:extLst>
+      <p:ext uri="{BB962C8B-B14F-4D97-AF65-F5344CB8AC3E}">
+        <p14:creationId xmlns:p14="http://schemas.microsoft.com/office/powerpoint/2010/main" val="3515420752"/>
+      </p:ext>
+    </p:extLst>
+  </p:cSld>
+  <p:clrMapOvr>
+    <a:masterClrMapping/>
+  </p:clrMapOvr>
+</p:sld>
+</file>
+
+<file path=ppt/slides/slide33.xml><?xml version="1.0" encoding="utf-8"?>
+<p:sld xmlns:a="http://schemas.openxmlformats.org/drawingml/2006/main" xmlns:r="http://schemas.openxmlformats.org/officeDocument/2006/relationships" xmlns:p="http://schemas.openxmlformats.org/presentationml/2006/main">
+  <p:cSld>
+    <p:spTree>
+      <p:nvGrpSpPr>
+        <p:cNvPr id="1" name=""/>
+        <p:cNvGrpSpPr/>
+        <p:nvPr/>
+      </p:nvGrpSpPr>
+      <p:grpSpPr>
+        <a:xfrm>
+          <a:off x="0" y="0"/>
+          <a:ext cx="0" cy="0"/>
+          <a:chOff x="0" y="0"/>
+          <a:chExt cx="0" cy="0"/>
+        </a:xfrm>
+      </p:grpSpPr>
+      <p:sp>
+        <p:nvSpPr>
+          <p:cNvPr id="2" name="Título 1"/>
+          <p:cNvSpPr>
+            <a:spLocks noGrp="1"/>
+          </p:cNvSpPr>
+          <p:nvPr>
+            <p:ph type="title"/>
+          </p:nvPr>
+        </p:nvSpPr>
+        <p:spPr/>
+        <p:txBody>
+          <a:bodyPr/>
+          <a:lstStyle/>
+          <a:p>
+            <a:endParaRPr lang="es-ES"/>
+          </a:p>
+        </p:txBody>
+      </p:sp>
+      <p:sp>
+        <p:nvSpPr>
+          <p:cNvPr id="3" name="Marcador de contenido 2"/>
+          <p:cNvSpPr>
+            <a:spLocks noGrp="1"/>
+          </p:cNvSpPr>
+          <p:nvPr>
+            <p:ph idx="1"/>
+          </p:nvPr>
+        </p:nvSpPr>
+        <p:spPr/>
+        <p:txBody>
+          <a:bodyPr/>
+          <a:lstStyle/>
+          <a:p>
+            <a:r>
+              <a:rPr lang="es-ES" dirty="0" smtClean="0"/>
+              <a:t>F1 = 0.9197</a:t>
+            </a:r>
+            <a:endParaRPr lang="es-ES" dirty="0"/>
+          </a:p>
+        </p:txBody>
+      </p:sp>
+      <p:pic>
+        <p:nvPicPr>
+          <p:cNvPr id="4" name="Imagen 3"/>
+          <p:cNvPicPr>
+            <a:picLocks noChangeAspect="1"/>
+          </p:cNvPicPr>
+          <p:nvPr/>
+        </p:nvPicPr>
+        <p:blipFill>
+          <a:blip r:embed="rId2">
+            <a:extLst>
+              <a:ext uri="{28A0092B-C50C-407E-A947-70E740481C1C}">
+                <a14:useLocalDpi xmlns:a14="http://schemas.microsoft.com/office/drawing/2010/main" val="0"/>
+              </a:ext>
+            </a:extLst>
+          </a:blip>
+          <a:stretch>
+            <a:fillRect/>
+          </a:stretch>
+        </p:blipFill>
+        <p:spPr>
+          <a:xfrm>
+            <a:off x="6864626" y="1956102"/>
+            <a:ext cx="4275679" cy="4581085"/>
+          </a:xfrm>
+          <a:prstGeom prst="rect">
+            <a:avLst/>
+          </a:prstGeom>
+        </p:spPr>
+      </p:pic>
+    </p:spTree>
+    <p:extLst>
+      <p:ext uri="{BB962C8B-B14F-4D97-AF65-F5344CB8AC3E}">
+        <p14:creationId xmlns:p14="http://schemas.microsoft.com/office/powerpoint/2010/main" val="1553794143"/>
       </p:ext>
     </p:extLst>
   </p:cSld>
@@ -6450,7 +6959,7 @@
     <p:controls>
       <mc:AlternateContent xmlns:mc="http://schemas.openxmlformats.org/markup-compatibility/2006">
         <mc:Choice xmlns:v="urn:schemas-microsoft-com:vml" Requires="v">
-          <p:control spid="1239" name="HTMLCheckbox1" r:id="rId2" imgW="257040" imgH="304920"/>
+          <p:control spid="1267" name="HTMLCheckbox1" r:id="rId2" imgW="257040" imgH="304920"/>
         </mc:Choice>
         <mc:Fallback>
           <p:control name="HTMLCheckbox1" r:id="rId2" imgW="257040" imgH="304920">
@@ -6502,7 +7011,7 @@
       </mc:AlternateContent>
       <mc:AlternateContent xmlns:mc="http://schemas.openxmlformats.org/markup-compatibility/2006">
         <mc:Choice xmlns:v="urn:schemas-microsoft-com:vml" Requires="v">
-          <p:control spid="1240" name="HTMLCheckbox2" r:id="rId3" imgW="257040" imgH="304920"/>
+          <p:control spid="1268" name="HTMLCheckbox2" r:id="rId3" imgW="257040" imgH="304920"/>
         </mc:Choice>
         <mc:Fallback>
           <p:control name="HTMLCheckbox2" r:id="rId3" imgW="257040" imgH="304920">
@@ -6554,7 +7063,7 @@
       </mc:AlternateContent>
       <mc:AlternateContent xmlns:mc="http://schemas.openxmlformats.org/markup-compatibility/2006">
         <mc:Choice xmlns:v="urn:schemas-microsoft-com:vml" Requires="v">
-          <p:control spid="1241" name="HTMLCheckbox3" r:id="rId4" imgW="257040" imgH="304920"/>
+          <p:control spid="1269" name="HTMLCheckbox3" r:id="rId4" imgW="257040" imgH="304920"/>
         </mc:Choice>
         <mc:Fallback>
           <p:control name="HTMLCheckbox3" r:id="rId4" imgW="257040" imgH="304920">
@@ -6606,7 +7115,7 @@
       </mc:AlternateContent>
       <mc:AlternateContent xmlns:mc="http://schemas.openxmlformats.org/markup-compatibility/2006">
         <mc:Choice xmlns:v="urn:schemas-microsoft-com:vml" Requires="v">
-          <p:control spid="1242" name="HTMLCheckbox4" r:id="rId5" imgW="257040" imgH="304920"/>
+          <p:control spid="1270" name="HTMLCheckbox4" r:id="rId5" imgW="257040" imgH="304920"/>
         </mc:Choice>
         <mc:Fallback>
           <p:control name="HTMLCheckbox4" r:id="rId5" imgW="257040" imgH="304920">

</xml_diff>

<commit_message>
Commit antes de la presentación
</commit_message>
<xml_diff>
--- a/pregunta.pptx
+++ b/pregunta.pptx
@@ -34,10 +34,11 @@
     <p:sldId id="278" r:id="rId28"/>
     <p:sldId id="284" r:id="rId29"/>
     <p:sldId id="288" r:id="rId30"/>
-    <p:sldId id="290" r:id="rId31"/>
-    <p:sldId id="291" r:id="rId32"/>
-    <p:sldId id="292" r:id="rId33"/>
-    <p:sldId id="293" r:id="rId34"/>
+    <p:sldId id="292" r:id="rId31"/>
+    <p:sldId id="293" r:id="rId32"/>
+    <p:sldId id="294" r:id="rId33"/>
+    <p:sldId id="295" r:id="rId34"/>
+    <p:sldId id="290" r:id="rId35"/>
   </p:sldIdLst>
   <p:sldSz cx="12192000" cy="6858000"/>
   <p:notesSz cx="6858000" cy="9144000"/>
@@ -291,7 +292,7 @@
           <a:p>
             <a:fld id="{E816971E-1CC9-4B1B-B84A-56D45306C128}" type="datetimeFigureOut">
               <a:rPr lang="es-ES" smtClean="0"/>
-              <a:t>17/05/2022</a:t>
+              <a:t>20/05/2022</a:t>
             </a:fld>
             <a:endParaRPr lang="es-ES"/>
           </a:p>
@@ -461,7 +462,7 @@
           <a:p>
             <a:fld id="{E816971E-1CC9-4B1B-B84A-56D45306C128}" type="datetimeFigureOut">
               <a:rPr lang="es-ES" smtClean="0"/>
-              <a:t>17/05/2022</a:t>
+              <a:t>20/05/2022</a:t>
             </a:fld>
             <a:endParaRPr lang="es-ES"/>
           </a:p>
@@ -641,7 +642,7 @@
           <a:p>
             <a:fld id="{E816971E-1CC9-4B1B-B84A-56D45306C128}" type="datetimeFigureOut">
               <a:rPr lang="es-ES" smtClean="0"/>
-              <a:t>17/05/2022</a:t>
+              <a:t>20/05/2022</a:t>
             </a:fld>
             <a:endParaRPr lang="es-ES"/>
           </a:p>
@@ -811,7 +812,7 @@
           <a:p>
             <a:fld id="{E816971E-1CC9-4B1B-B84A-56D45306C128}" type="datetimeFigureOut">
               <a:rPr lang="es-ES" smtClean="0"/>
-              <a:t>17/05/2022</a:t>
+              <a:t>20/05/2022</a:t>
             </a:fld>
             <a:endParaRPr lang="es-ES"/>
           </a:p>
@@ -1057,7 +1058,7 @@
           <a:p>
             <a:fld id="{E816971E-1CC9-4B1B-B84A-56D45306C128}" type="datetimeFigureOut">
               <a:rPr lang="es-ES" smtClean="0"/>
-              <a:t>17/05/2022</a:t>
+              <a:t>20/05/2022</a:t>
             </a:fld>
             <a:endParaRPr lang="es-ES"/>
           </a:p>
@@ -1289,7 +1290,7 @@
           <a:p>
             <a:fld id="{E816971E-1CC9-4B1B-B84A-56D45306C128}" type="datetimeFigureOut">
               <a:rPr lang="es-ES" smtClean="0"/>
-              <a:t>17/05/2022</a:t>
+              <a:t>20/05/2022</a:t>
             </a:fld>
             <a:endParaRPr lang="es-ES"/>
           </a:p>
@@ -1656,7 +1657,7 @@
           <a:p>
             <a:fld id="{E816971E-1CC9-4B1B-B84A-56D45306C128}" type="datetimeFigureOut">
               <a:rPr lang="es-ES" smtClean="0"/>
-              <a:t>17/05/2022</a:t>
+              <a:t>20/05/2022</a:t>
             </a:fld>
             <a:endParaRPr lang="es-ES"/>
           </a:p>
@@ -1774,7 +1775,7 @@
           <a:p>
             <a:fld id="{E816971E-1CC9-4B1B-B84A-56D45306C128}" type="datetimeFigureOut">
               <a:rPr lang="es-ES" smtClean="0"/>
-              <a:t>17/05/2022</a:t>
+              <a:t>20/05/2022</a:t>
             </a:fld>
             <a:endParaRPr lang="es-ES"/>
           </a:p>
@@ -1869,7 +1870,7 @@
           <a:p>
             <a:fld id="{E816971E-1CC9-4B1B-B84A-56D45306C128}" type="datetimeFigureOut">
               <a:rPr lang="es-ES" smtClean="0"/>
-              <a:t>17/05/2022</a:t>
+              <a:t>20/05/2022</a:t>
             </a:fld>
             <a:endParaRPr lang="es-ES"/>
           </a:p>
@@ -2146,7 +2147,7 @@
           <a:p>
             <a:fld id="{E816971E-1CC9-4B1B-B84A-56D45306C128}" type="datetimeFigureOut">
               <a:rPr lang="es-ES" smtClean="0"/>
-              <a:t>17/05/2022</a:t>
+              <a:t>20/05/2022</a:t>
             </a:fld>
             <a:endParaRPr lang="es-ES"/>
           </a:p>
@@ -2399,7 +2400,7 @@
           <a:p>
             <a:fld id="{E816971E-1CC9-4B1B-B84A-56D45306C128}" type="datetimeFigureOut">
               <a:rPr lang="es-ES" smtClean="0"/>
-              <a:t>17/05/2022</a:t>
+              <a:t>20/05/2022</a:t>
             </a:fld>
             <a:endParaRPr lang="es-ES"/>
           </a:p>
@@ -2612,7 +2613,7 @@
           <a:p>
             <a:fld id="{E816971E-1CC9-4B1B-B84A-56D45306C128}" type="datetimeFigureOut">
               <a:rPr lang="es-ES" smtClean="0"/>
-              <a:t>17/05/2022</a:t>
+              <a:t>20/05/2022</a:t>
             </a:fld>
             <a:endParaRPr lang="es-ES"/>
           </a:p>
@@ -5373,7 +5374,7 @@
           <a:graphicData uri="http://schemas.openxmlformats.org/presentationml/2006/ole">
             <mc:AlternateContent xmlns:mc="http://schemas.openxmlformats.org/markup-compatibility/2006">
               <mc:Choice xmlns:v="urn:schemas-microsoft-com:vml" Requires="v">
-                <p:oleObj spid="_x0000_s2084" name="Acrobat Document" r:id="rId3" imgW="3428684" imgH="4800600" progId="AcroExch.Document.7">
+                <p:oleObj spid="_x0000_s2089" name="Acrobat Document" r:id="rId3" imgW="3428684" imgH="4800600" progId="AcroExch.Document.7">
                   <p:embed/>
                 </p:oleObj>
               </mc:Choice>
@@ -6347,186 +6348,17 @@
           <a:lstStyle/>
           <a:p>
             <a:r>
-              <a:rPr lang="es-ES" dirty="0" err="1" smtClean="0"/>
-              <a:t>Probability</a:t>
-            </a:r>
-            <a:r>
-              <a:rPr lang="es-ES" dirty="0" smtClean="0"/>
-              <a:t> </a:t>
-            </a:r>
-            <a:r>
-              <a:rPr lang="es-ES" dirty="0" err="1" smtClean="0"/>
-              <a:t>fusion</a:t>
-            </a:r>
-            <a:r>
-              <a:rPr lang="es-ES" dirty="0" smtClean="0"/>
-              <a:t> usando F1 para los pesos</a:t>
-            </a:r>
-            <a:endParaRPr lang="es-ES" dirty="0"/>
-          </a:p>
-        </p:txBody>
-      </p:sp>
-      <p:sp>
-        <p:nvSpPr>
-          <p:cNvPr id="3" name="Marcador de contenido 2"/>
-          <p:cNvSpPr>
-            <a:spLocks noGrp="1"/>
-          </p:cNvSpPr>
-          <p:nvPr>
-            <p:ph idx="1"/>
-          </p:nvPr>
-        </p:nvSpPr>
-        <p:spPr/>
-        <p:txBody>
-          <a:bodyPr/>
-          <a:lstStyle/>
-          <a:p>
-            <a:pPr marL="0" indent="0">
-              <a:buNone/>
-            </a:pPr>
-            <a:r>
-              <a:rPr lang="es-ES" u="sng" smtClean="0"/>
-              <a:t>https</a:t>
-            </a:r>
-            <a:r>
-              <a:rPr lang="es-ES" u="sng" dirty="0"/>
-              <a:t>://ieeexplore.ieee.org/stamp/stamp.jsp?tp=&amp;arnumber=7930377</a:t>
-            </a:r>
-          </a:p>
-        </p:txBody>
-      </p:sp>
-    </p:spTree>
-    <p:extLst>
-      <p:ext uri="{BB962C8B-B14F-4D97-AF65-F5344CB8AC3E}">
-        <p14:creationId xmlns:p14="http://schemas.microsoft.com/office/powerpoint/2010/main" val="3658376566"/>
-      </p:ext>
-    </p:extLst>
-  </p:cSld>
-  <p:clrMapOvr>
-    <a:masterClrMapping/>
-  </p:clrMapOvr>
-</p:sld>
-</file>
-
-<file path=ppt/slides/slide31.xml><?xml version="1.0" encoding="utf-8"?>
-<p:sld xmlns:a="http://schemas.openxmlformats.org/drawingml/2006/main" xmlns:r="http://schemas.openxmlformats.org/officeDocument/2006/relationships" xmlns:p="http://schemas.openxmlformats.org/presentationml/2006/main">
-  <p:cSld>
-    <p:spTree>
-      <p:nvGrpSpPr>
-        <p:cNvPr id="1" name=""/>
-        <p:cNvGrpSpPr/>
-        <p:nvPr/>
-      </p:nvGrpSpPr>
-      <p:grpSpPr>
-        <a:xfrm>
-          <a:off x="0" y="0"/>
-          <a:ext cx="0" cy="0"/>
-          <a:chOff x="0" y="0"/>
-          <a:chExt cx="0" cy="0"/>
-        </a:xfrm>
-      </p:grpSpPr>
-      <p:sp>
-        <p:nvSpPr>
-          <p:cNvPr id="2" name="Título 1"/>
-          <p:cNvSpPr>
-            <a:spLocks noGrp="1"/>
-          </p:cNvSpPr>
-          <p:nvPr>
-            <p:ph type="title"/>
-          </p:nvPr>
-        </p:nvSpPr>
-        <p:spPr/>
-        <p:txBody>
-          <a:bodyPr/>
-          <a:lstStyle/>
-          <a:p>
-            <a:r>
-              <a:rPr lang="es-ES" dirty="0" smtClean="0"/>
-              <a:t>Probar</a:t>
-            </a:r>
-            <a:endParaRPr lang="es-ES" dirty="0"/>
-          </a:p>
-        </p:txBody>
-      </p:sp>
-      <p:sp>
-        <p:nvSpPr>
-          <p:cNvPr id="3" name="Marcador de contenido 2"/>
-          <p:cNvSpPr>
-            <a:spLocks noGrp="1"/>
-          </p:cNvSpPr>
-          <p:nvPr>
-            <p:ph idx="1"/>
-          </p:nvPr>
-        </p:nvSpPr>
-        <p:spPr/>
-        <p:txBody>
-          <a:bodyPr/>
-          <a:lstStyle/>
-          <a:p>
-            <a:r>
-              <a:rPr lang="es-ES" dirty="0" smtClean="0"/>
-              <a:t>Fine </a:t>
+              <a:rPr lang="es-ES" dirty="0" smtClean="0"/>
+              <a:t>Entrenamiento con fine </a:t>
             </a:r>
             <a:r>
               <a:rPr lang="es-ES" dirty="0" err="1" smtClean="0"/>
               <a:t>tuning</a:t>
             </a:r>
-            <a:endParaRPr lang="es-ES" dirty="0" smtClean="0"/>
-          </a:p>
-          <a:p>
-            <a:r>
-              <a:rPr lang="es-ES" dirty="0" smtClean="0"/>
-              <a:t>Usar más datos</a:t>
-            </a:r>
-            <a:endParaRPr lang="es-ES" dirty="0"/>
-          </a:p>
-        </p:txBody>
-      </p:sp>
-    </p:spTree>
-    <p:extLst>
-      <p:ext uri="{BB962C8B-B14F-4D97-AF65-F5344CB8AC3E}">
-        <p14:creationId xmlns:p14="http://schemas.microsoft.com/office/powerpoint/2010/main" val="3334366317"/>
-      </p:ext>
-    </p:extLst>
-  </p:cSld>
-  <p:clrMapOvr>
-    <a:masterClrMapping/>
-  </p:clrMapOvr>
-</p:sld>
-</file>
-
-<file path=ppt/slides/slide32.xml><?xml version="1.0" encoding="utf-8"?>
-<p:sld xmlns:a="http://schemas.openxmlformats.org/drawingml/2006/main" xmlns:r="http://schemas.openxmlformats.org/officeDocument/2006/relationships" xmlns:p="http://schemas.openxmlformats.org/presentationml/2006/main">
-  <p:cSld>
-    <p:spTree>
-      <p:nvGrpSpPr>
-        <p:cNvPr id="1" name=""/>
-        <p:cNvGrpSpPr/>
-        <p:nvPr/>
-      </p:nvGrpSpPr>
-      <p:grpSpPr>
-        <a:xfrm>
-          <a:off x="0" y="0"/>
-          <a:ext cx="0" cy="0"/>
-          <a:chOff x="0" y="0"/>
-          <a:chExt cx="0" cy="0"/>
-        </a:xfrm>
-      </p:grpSpPr>
-      <p:sp>
-        <p:nvSpPr>
-          <p:cNvPr id="2" name="Título 1"/>
-          <p:cNvSpPr>
-            <a:spLocks noGrp="1"/>
-          </p:cNvSpPr>
-          <p:nvPr>
-            <p:ph type="title"/>
-          </p:nvPr>
-        </p:nvSpPr>
-        <p:spPr/>
-        <p:txBody>
-          <a:bodyPr/>
-          <a:lstStyle/>
-          <a:p>
+            <a:r>
+              <a:rPr lang="es-ES" dirty="0" smtClean="0"/>
+              <a:t> y 10CV</a:t>
+            </a:r>
             <a:endParaRPr lang="es-ES" dirty="0"/>
           </a:p>
         </p:txBody>
@@ -6619,7 +6451,7 @@
 </p:sld>
 </file>
 
-<file path=ppt/slides/slide33.xml><?xml version="1.0" encoding="utf-8"?>
+<file path=ppt/slides/slide31.xml><?xml version="1.0" encoding="utf-8"?>
 <p:sld xmlns:a="http://schemas.openxmlformats.org/drawingml/2006/main" xmlns:r="http://schemas.openxmlformats.org/officeDocument/2006/relationships" xmlns:p="http://schemas.openxmlformats.org/presentationml/2006/main">
   <p:cSld>
     <p:spTree>
@@ -6651,33 +6483,114 @@
           <a:bodyPr/>
           <a:lstStyle/>
           <a:p>
-            <a:endParaRPr lang="es-ES"/>
-          </a:p>
-        </p:txBody>
-      </p:sp>
-      <p:sp>
-        <p:nvSpPr>
-          <p:cNvPr id="3" name="Marcador de contenido 2"/>
-          <p:cNvSpPr>
-            <a:spLocks noGrp="1"/>
-          </p:cNvSpPr>
-          <p:nvPr>
-            <p:ph idx="1"/>
-          </p:nvPr>
-        </p:nvSpPr>
-        <p:spPr/>
-        <p:txBody>
-          <a:bodyPr/>
-          <a:lstStyle/>
-          <a:p>
-            <a:r>
-              <a:rPr lang="es-ES" dirty="0" smtClean="0"/>
-              <a:t>F1 = 0.9197</a:t>
-            </a:r>
-            <a:endParaRPr lang="es-ES" dirty="0"/>
-          </a:p>
-        </p:txBody>
-      </p:sp>
+            <a:r>
+              <a:rPr lang="es-ES" dirty="0"/>
+              <a:t>Entrenamiento con fine </a:t>
+            </a:r>
+            <a:r>
+              <a:rPr lang="es-ES" dirty="0" err="1"/>
+              <a:t>tuning</a:t>
+            </a:r>
+            <a:r>
+              <a:rPr lang="es-ES" dirty="0"/>
+              <a:t> y 10CV</a:t>
+            </a:r>
+          </a:p>
+        </p:txBody>
+      </p:sp>
+      <mc:AlternateContent xmlns:mc="http://schemas.openxmlformats.org/markup-compatibility/2006">
+        <mc:Choice xmlns:a14="http://schemas.microsoft.com/office/drawing/2010/main" Requires="a14">
+          <p:sp>
+            <p:nvSpPr>
+              <p:cNvPr id="3" name="Marcador de contenido 2"/>
+              <p:cNvSpPr>
+                <a:spLocks noGrp="1"/>
+              </p:cNvSpPr>
+              <p:nvPr>
+                <p:ph idx="1"/>
+              </p:nvPr>
+            </p:nvSpPr>
+            <p:spPr/>
+            <p:txBody>
+              <a:bodyPr/>
+              <a:lstStyle/>
+              <a:p>
+                <a:r>
+                  <a:rPr lang="es-ES" dirty="0" smtClean="0"/>
+                  <a:t>F1 </a:t>
+                </a:r>
+                <a14:m>
+                  <m:oMath xmlns:m="http://schemas.openxmlformats.org/officeDocument/2006/math">
+                    <m:r>
+                      <a:rPr lang="es-ES" i="1" smtClean="0">
+                        <a:latin typeface="Cambria Math" panose="02040503050406030204" pitchFamily="18" charset="0"/>
+                        <a:ea typeface="Cambria Math" panose="02040503050406030204" pitchFamily="18" charset="0"/>
+                      </a:rPr>
+                      <m:t>≈</m:t>
+                    </m:r>
+                  </m:oMath>
+                </a14:m>
+                <a:r>
+                  <a:rPr lang="es-ES" dirty="0" smtClean="0"/>
+                  <a:t> 0.92</a:t>
+                </a:r>
+              </a:p>
+              <a:p>
+                <a:pPr marL="0" indent="0">
+                  <a:buNone/>
+                </a:pPr>
+                <a:endParaRPr lang="es-ES" dirty="0" smtClean="0"/>
+              </a:p>
+              <a:p>
+                <a:r>
+                  <a:rPr lang="es-ES" dirty="0" smtClean="0"/>
+                  <a:t>Prueba 10CV</a:t>
+                </a:r>
+                <a:endParaRPr lang="es-ES" dirty="0" smtClean="0"/>
+              </a:p>
+              <a:p>
+                <a:endParaRPr lang="es-ES" dirty="0" smtClean="0"/>
+              </a:p>
+              <a:p>
+                <a:endParaRPr lang="es-ES" dirty="0"/>
+              </a:p>
+            </p:txBody>
+          </p:sp>
+        </mc:Choice>
+        <mc:Fallback>
+          <p:sp>
+            <p:nvSpPr>
+              <p:cNvPr id="3" name="Marcador de contenido 2"/>
+              <p:cNvSpPr>
+                <a:spLocks noGrp="1" noRot="1" noChangeAspect="1" noMove="1" noResize="1" noEditPoints="1" noAdjustHandles="1" noChangeArrowheads="1" noChangeShapeType="1" noTextEdit="1"/>
+              </p:cNvSpPr>
+              <p:nvPr>
+                <p:ph idx="1"/>
+              </p:nvPr>
+            </p:nvSpPr>
+            <p:spPr>
+              <a:blipFill rotWithShape="0">
+                <a:blip r:embed="rId2"/>
+                <a:stretch>
+                  <a:fillRect l="-1043" t="-2241"/>
+                </a:stretch>
+              </a:blipFill>
+            </p:spPr>
+            <p:txBody>
+              <a:bodyPr/>
+              <a:lstStyle/>
+              <a:p>
+                <a:r>
+                  <a:rPr lang="es-ES">
+                    <a:noFill/>
+                  </a:rPr>
+                  <a:t> </a:t>
+                </a:r>
+              </a:p>
+            </p:txBody>
+          </p:sp>
+        </mc:Fallback>
+      </mc:AlternateContent>
       <p:pic>
         <p:nvPicPr>
           <p:cNvPr id="4" name="Imagen 3"/>
@@ -6687,7 +6600,7 @@
           <p:nvPr/>
         </p:nvPicPr>
         <p:blipFill>
-          <a:blip r:embed="rId2">
+          <a:blip r:embed="rId3">
             <a:extLst>
               <a:ext uri="{28A0092B-C50C-407E-A947-70E740481C1C}">
                 <a14:useLocalDpi xmlns:a14="http://schemas.microsoft.com/office/drawing/2010/main" val="0"/>
@@ -6721,6 +6634,402 @@
 </p:sld>
 </file>
 
+<file path=ppt/slides/slide32.xml><?xml version="1.0" encoding="utf-8"?>
+<p:sld xmlns:a="http://schemas.openxmlformats.org/drawingml/2006/main" xmlns:r="http://schemas.openxmlformats.org/officeDocument/2006/relationships" xmlns:p="http://schemas.openxmlformats.org/presentationml/2006/main">
+  <p:cSld>
+    <p:spTree>
+      <p:nvGrpSpPr>
+        <p:cNvPr id="1" name=""/>
+        <p:cNvGrpSpPr/>
+        <p:nvPr/>
+      </p:nvGrpSpPr>
+      <p:grpSpPr>
+        <a:xfrm>
+          <a:off x="0" y="0"/>
+          <a:ext cx="0" cy="0"/>
+          <a:chOff x="0" y="0"/>
+          <a:chExt cx="0" cy="0"/>
+        </a:xfrm>
+      </p:grpSpPr>
+      <p:sp>
+        <p:nvSpPr>
+          <p:cNvPr id="2" name="Título 1"/>
+          <p:cNvSpPr>
+            <a:spLocks noGrp="1"/>
+          </p:cNvSpPr>
+          <p:nvPr>
+            <p:ph type="title"/>
+          </p:nvPr>
+        </p:nvSpPr>
+        <p:spPr/>
+        <p:txBody>
+          <a:bodyPr/>
+          <a:lstStyle/>
+          <a:p>
+            <a:r>
+              <a:rPr lang="es-ES" dirty="0"/>
+              <a:t>Modificar el data pipeline para poder albergar más datos</a:t>
+            </a:r>
+          </a:p>
+        </p:txBody>
+      </p:sp>
+      <p:sp>
+        <p:nvSpPr>
+          <p:cNvPr id="3" name="Marcador de contenido 2"/>
+          <p:cNvSpPr>
+            <a:spLocks noGrp="1"/>
+          </p:cNvSpPr>
+          <p:nvPr>
+            <p:ph idx="1"/>
+          </p:nvPr>
+        </p:nvSpPr>
+        <p:spPr/>
+        <p:txBody>
+          <a:bodyPr>
+            <a:normAutofit fontScale="92500" lnSpcReduction="20000"/>
+          </a:bodyPr>
+          <a:lstStyle/>
+          <a:p>
+            <a:pPr>
+              <a:buFontTx/>
+              <a:buChar char="-"/>
+            </a:pPr>
+            <a:endParaRPr lang="es-ES" dirty="0" smtClean="0"/>
+          </a:p>
+          <a:p>
+            <a:pPr>
+              <a:buFontTx/>
+              <a:buChar char="-"/>
+            </a:pPr>
+            <a:r>
+              <a:rPr lang="es-ES" dirty="0" smtClean="0"/>
+              <a:t>90 000 </a:t>
+            </a:r>
+            <a:r>
+              <a:rPr lang="es-ES" dirty="0" err="1" smtClean="0"/>
+              <a:t>Patches</a:t>
+            </a:r>
+            <a:r>
+              <a:rPr lang="es-ES" dirty="0" smtClean="0"/>
+              <a:t> de 300X300 con magnificación </a:t>
+            </a:r>
+            <a:r>
+              <a:rPr lang="es-ES" dirty="0" smtClean="0"/>
+              <a:t>X10 PAAD</a:t>
+            </a:r>
+          </a:p>
+          <a:p>
+            <a:pPr>
+              <a:buFontTx/>
+              <a:buChar char="-"/>
+            </a:pPr>
+            <a:endParaRPr lang="es-ES" dirty="0"/>
+          </a:p>
+          <a:p>
+            <a:pPr>
+              <a:buFontTx/>
+              <a:buChar char="-"/>
+            </a:pPr>
+            <a:r>
+              <a:rPr lang="es-ES" dirty="0" smtClean="0"/>
+              <a:t>70 000 </a:t>
+            </a:r>
+            <a:r>
+              <a:rPr lang="es-ES" dirty="0" err="1" smtClean="0"/>
+              <a:t>Patches</a:t>
+            </a:r>
+            <a:r>
+              <a:rPr lang="es-ES" dirty="0" smtClean="0"/>
+              <a:t> de 512X512 con magnificación X20 PAAD</a:t>
+            </a:r>
+            <a:endParaRPr lang="es-ES" dirty="0" smtClean="0"/>
+          </a:p>
+          <a:p>
+            <a:pPr>
+              <a:buFontTx/>
+              <a:buChar char="-"/>
+            </a:pPr>
+            <a:endParaRPr lang="es-ES" dirty="0"/>
+          </a:p>
+          <a:p>
+            <a:pPr>
+              <a:buFontTx/>
+              <a:buChar char="-"/>
+            </a:pPr>
+            <a:r>
+              <a:rPr lang="es-ES" dirty="0" smtClean="0"/>
+              <a:t>250 000 </a:t>
+            </a:r>
+            <a:r>
+              <a:rPr lang="es-ES" dirty="0" err="1" smtClean="0"/>
+              <a:t>Patches</a:t>
+            </a:r>
+            <a:r>
+              <a:rPr lang="es-ES" dirty="0" smtClean="0"/>
+              <a:t> de 512x512 con magnificación X20 </a:t>
+            </a:r>
+            <a:r>
+              <a:rPr lang="es-ES" dirty="0" smtClean="0"/>
+              <a:t>LUSC-LUAD</a:t>
+            </a:r>
+          </a:p>
+          <a:p>
+            <a:pPr>
+              <a:buFontTx/>
+              <a:buChar char="-"/>
+            </a:pPr>
+            <a:endParaRPr lang="es-ES" dirty="0" smtClean="0"/>
+          </a:p>
+          <a:p>
+            <a:pPr marL="0" indent="0">
+              <a:buNone/>
+            </a:pPr>
+            <a:r>
+              <a:rPr lang="es-ES" dirty="0" smtClean="0"/>
+              <a:t>Máximo actual en RAM</a:t>
+            </a:r>
+            <a:endParaRPr lang="es-ES" dirty="0"/>
+          </a:p>
+          <a:p>
+            <a:pPr>
+              <a:buFontTx/>
+              <a:buChar char="-"/>
+            </a:pPr>
+            <a:r>
+              <a:rPr lang="es-ES" dirty="0" smtClean="0"/>
+              <a:t>50% de 300X300 </a:t>
+            </a:r>
+          </a:p>
+          <a:p>
+            <a:pPr>
+              <a:buFontTx/>
+              <a:buChar char="-"/>
+            </a:pPr>
+            <a:r>
+              <a:rPr lang="es-ES" dirty="0" smtClean="0"/>
+              <a:t>25% de 512x512</a:t>
+            </a:r>
+            <a:endParaRPr lang="es-ES" dirty="0" smtClean="0"/>
+          </a:p>
+          <a:p>
+            <a:pPr>
+              <a:buFontTx/>
+              <a:buChar char="-"/>
+            </a:pPr>
+            <a:endParaRPr lang="es-ES" dirty="0" smtClean="0"/>
+          </a:p>
+          <a:p>
+            <a:pPr>
+              <a:buFontTx/>
+              <a:buChar char="-"/>
+            </a:pPr>
+            <a:endParaRPr lang="es-ES" dirty="0"/>
+          </a:p>
+        </p:txBody>
+      </p:sp>
+    </p:spTree>
+    <p:extLst>
+      <p:ext uri="{BB962C8B-B14F-4D97-AF65-F5344CB8AC3E}">
+        <p14:creationId xmlns:p14="http://schemas.microsoft.com/office/powerpoint/2010/main" val="3204762455"/>
+      </p:ext>
+    </p:extLst>
+  </p:cSld>
+  <p:clrMapOvr>
+    <a:masterClrMapping/>
+  </p:clrMapOvr>
+</p:sld>
+</file>
+
+<file path=ppt/slides/slide33.xml><?xml version="1.0" encoding="utf-8"?>
+<p:sld xmlns:a="http://schemas.openxmlformats.org/drawingml/2006/main" xmlns:r="http://schemas.openxmlformats.org/officeDocument/2006/relationships" xmlns:p="http://schemas.openxmlformats.org/presentationml/2006/main">
+  <p:cSld>
+    <p:spTree>
+      <p:nvGrpSpPr>
+        <p:cNvPr id="1" name=""/>
+        <p:cNvGrpSpPr/>
+        <p:nvPr/>
+      </p:nvGrpSpPr>
+      <p:grpSpPr>
+        <a:xfrm>
+          <a:off x="0" y="0"/>
+          <a:ext cx="0" cy="0"/>
+          <a:chOff x="0" y="0"/>
+          <a:chExt cx="0" cy="0"/>
+        </a:xfrm>
+      </p:grpSpPr>
+      <p:sp>
+        <p:nvSpPr>
+          <p:cNvPr id="2" name="Título 1"/>
+          <p:cNvSpPr>
+            <a:spLocks noGrp="1"/>
+          </p:cNvSpPr>
+          <p:nvPr>
+            <p:ph type="title"/>
+          </p:nvPr>
+        </p:nvSpPr>
+        <p:spPr/>
+        <p:txBody>
+          <a:bodyPr/>
+          <a:lstStyle/>
+          <a:p>
+            <a:r>
+              <a:rPr lang="es-ES" dirty="0" smtClean="0"/>
+              <a:t>Preguntas</a:t>
+            </a:r>
+            <a:endParaRPr lang="es-ES" dirty="0"/>
+          </a:p>
+        </p:txBody>
+      </p:sp>
+      <p:sp>
+        <p:nvSpPr>
+          <p:cNvPr id="3" name="Marcador de contenido 2"/>
+          <p:cNvSpPr>
+            <a:spLocks noGrp="1"/>
+          </p:cNvSpPr>
+          <p:nvPr>
+            <p:ph idx="1"/>
+          </p:nvPr>
+        </p:nvSpPr>
+        <p:spPr/>
+        <p:txBody>
+          <a:bodyPr/>
+          <a:lstStyle/>
+          <a:p>
+            <a:r>
+              <a:rPr lang="es-ES" dirty="0" err="1" smtClean="0"/>
+              <a:t>Cuandos</a:t>
+            </a:r>
+            <a:r>
+              <a:rPr lang="es-ES" dirty="0" smtClean="0"/>
+              <a:t> </a:t>
+            </a:r>
+            <a:r>
+              <a:rPr lang="es-ES" dirty="0" err="1" smtClean="0"/>
+              <a:t>patches</a:t>
+            </a:r>
+            <a:r>
+              <a:rPr lang="es-ES" dirty="0" smtClean="0"/>
+              <a:t> usar para entrenamiento?</a:t>
+            </a:r>
+          </a:p>
+          <a:p>
+            <a:endParaRPr lang="es-ES" dirty="0" smtClean="0"/>
+          </a:p>
+          <a:p>
+            <a:endParaRPr lang="es-ES" dirty="0"/>
+          </a:p>
+          <a:p>
+            <a:endParaRPr lang="es-ES" dirty="0"/>
+          </a:p>
+        </p:txBody>
+      </p:sp>
+    </p:spTree>
+    <p:extLst>
+      <p:ext uri="{BB962C8B-B14F-4D97-AF65-F5344CB8AC3E}">
+        <p14:creationId xmlns:p14="http://schemas.microsoft.com/office/powerpoint/2010/main" val="658870349"/>
+      </p:ext>
+    </p:extLst>
+  </p:cSld>
+  <p:clrMapOvr>
+    <a:masterClrMapping/>
+  </p:clrMapOvr>
+</p:sld>
+</file>
+
+<file path=ppt/slides/slide34.xml><?xml version="1.0" encoding="utf-8"?>
+<p:sld xmlns:a="http://schemas.openxmlformats.org/drawingml/2006/main" xmlns:r="http://schemas.openxmlformats.org/officeDocument/2006/relationships" xmlns:p="http://schemas.openxmlformats.org/presentationml/2006/main">
+  <p:cSld>
+    <p:spTree>
+      <p:nvGrpSpPr>
+        <p:cNvPr id="1" name=""/>
+        <p:cNvGrpSpPr/>
+        <p:nvPr/>
+      </p:nvGrpSpPr>
+      <p:grpSpPr>
+        <a:xfrm>
+          <a:off x="0" y="0"/>
+          <a:ext cx="0" cy="0"/>
+          <a:chOff x="0" y="0"/>
+          <a:chExt cx="0" cy="0"/>
+        </a:xfrm>
+      </p:grpSpPr>
+      <p:sp>
+        <p:nvSpPr>
+          <p:cNvPr id="2" name="Título 1"/>
+          <p:cNvSpPr>
+            <a:spLocks noGrp="1"/>
+          </p:cNvSpPr>
+          <p:nvPr>
+            <p:ph type="title"/>
+          </p:nvPr>
+        </p:nvSpPr>
+        <p:spPr/>
+        <p:txBody>
+          <a:bodyPr/>
+          <a:lstStyle/>
+          <a:p>
+            <a:r>
+              <a:rPr lang="es-ES" dirty="0" err="1" smtClean="0"/>
+              <a:t>Probability</a:t>
+            </a:r>
+            <a:r>
+              <a:rPr lang="es-ES" dirty="0" smtClean="0"/>
+              <a:t> </a:t>
+            </a:r>
+            <a:r>
+              <a:rPr lang="es-ES" dirty="0" err="1" smtClean="0"/>
+              <a:t>fusion</a:t>
+            </a:r>
+            <a:r>
+              <a:rPr lang="es-ES" dirty="0" smtClean="0"/>
+              <a:t> usando F1 para los pesos</a:t>
+            </a:r>
+            <a:endParaRPr lang="es-ES" dirty="0"/>
+          </a:p>
+        </p:txBody>
+      </p:sp>
+      <p:sp>
+        <p:nvSpPr>
+          <p:cNvPr id="3" name="Marcador de contenido 2"/>
+          <p:cNvSpPr>
+            <a:spLocks noGrp="1"/>
+          </p:cNvSpPr>
+          <p:nvPr>
+            <p:ph idx="1"/>
+          </p:nvPr>
+        </p:nvSpPr>
+        <p:spPr/>
+        <p:txBody>
+          <a:bodyPr/>
+          <a:lstStyle/>
+          <a:p>
+            <a:pPr marL="0" indent="0">
+              <a:buNone/>
+            </a:pPr>
+            <a:r>
+              <a:rPr lang="es-ES" u="sng" smtClean="0"/>
+              <a:t>https</a:t>
+            </a:r>
+            <a:r>
+              <a:rPr lang="es-ES" u="sng" dirty="0"/>
+              <a:t>://ieeexplore.ieee.org/stamp/stamp.jsp?tp=&amp;arnumber=7930377</a:t>
+            </a:r>
+          </a:p>
+        </p:txBody>
+      </p:sp>
+    </p:spTree>
+    <p:extLst>
+      <p:ext uri="{BB962C8B-B14F-4D97-AF65-F5344CB8AC3E}">
+        <p14:creationId xmlns:p14="http://schemas.microsoft.com/office/powerpoint/2010/main" val="3658376566"/>
+      </p:ext>
+    </p:extLst>
+  </p:cSld>
+  <p:clrMapOvr>
+    <a:masterClrMapping/>
+  </p:clrMapOvr>
+</p:sld>
+</file>
+
 <file path=ppt/slides/slide4.xml><?xml version="1.0" encoding="utf-8"?>
 <p:sld xmlns:a="http://schemas.openxmlformats.org/drawingml/2006/main" xmlns:r="http://schemas.openxmlformats.org/officeDocument/2006/relationships" xmlns:p="http://schemas.openxmlformats.org/presentationml/2006/main">
   <p:cSld>
@@ -6959,7 +7268,7 @@
     <p:controls>
       <mc:AlternateContent xmlns:mc="http://schemas.openxmlformats.org/markup-compatibility/2006">
         <mc:Choice xmlns:v="urn:schemas-microsoft-com:vml" Requires="v">
-          <p:control spid="1267" name="HTMLCheckbox1" r:id="rId2" imgW="257040" imgH="304920"/>
+          <p:control spid="1287" name="HTMLCheckbox1" r:id="rId2" imgW="257040" imgH="304920"/>
         </mc:Choice>
         <mc:Fallback>
           <p:control name="HTMLCheckbox1" r:id="rId2" imgW="257040" imgH="304920">
@@ -7011,7 +7320,7 @@
       </mc:AlternateContent>
       <mc:AlternateContent xmlns:mc="http://schemas.openxmlformats.org/markup-compatibility/2006">
         <mc:Choice xmlns:v="urn:schemas-microsoft-com:vml" Requires="v">
-          <p:control spid="1268" name="HTMLCheckbox2" r:id="rId3" imgW="257040" imgH="304920"/>
+          <p:control spid="1288" name="HTMLCheckbox2" r:id="rId3" imgW="257040" imgH="304920"/>
         </mc:Choice>
         <mc:Fallback>
           <p:control name="HTMLCheckbox2" r:id="rId3" imgW="257040" imgH="304920">
@@ -7063,7 +7372,7 @@
       </mc:AlternateContent>
       <mc:AlternateContent xmlns:mc="http://schemas.openxmlformats.org/markup-compatibility/2006">
         <mc:Choice xmlns:v="urn:schemas-microsoft-com:vml" Requires="v">
-          <p:control spid="1269" name="HTMLCheckbox3" r:id="rId4" imgW="257040" imgH="304920"/>
+          <p:control spid="1289" name="HTMLCheckbox3" r:id="rId4" imgW="257040" imgH="304920"/>
         </mc:Choice>
         <mc:Fallback>
           <p:control name="HTMLCheckbox3" r:id="rId4" imgW="257040" imgH="304920">
@@ -7115,7 +7424,7 @@
       </mc:AlternateContent>
       <mc:AlternateContent xmlns:mc="http://schemas.openxmlformats.org/markup-compatibility/2006">
         <mc:Choice xmlns:v="urn:schemas-microsoft-com:vml" Requires="v">
-          <p:control spid="1270" name="HTMLCheckbox4" r:id="rId5" imgW="257040" imgH="304920"/>
+          <p:control spid="1290" name="HTMLCheckbox4" r:id="rId5" imgW="257040" imgH="304920"/>
         </mc:Choice>
         <mc:Fallback>
           <p:control name="HTMLCheckbox4" r:id="rId5" imgW="257040" imgH="304920">

</xml_diff>

<commit_message>
Implementing lMDB without normalization of images
</commit_message>
<xml_diff>
--- a/pregunta.pptx
+++ b/pregunta.pptx
@@ -292,7 +292,7 @@
           <a:p>
             <a:fld id="{E816971E-1CC9-4B1B-B84A-56D45306C128}" type="datetimeFigureOut">
               <a:rPr lang="es-ES" smtClean="0"/>
-              <a:t>20/05/2022</a:t>
+              <a:t>23/05/2022</a:t>
             </a:fld>
             <a:endParaRPr lang="es-ES"/>
           </a:p>
@@ -462,7 +462,7 @@
           <a:p>
             <a:fld id="{E816971E-1CC9-4B1B-B84A-56D45306C128}" type="datetimeFigureOut">
               <a:rPr lang="es-ES" smtClean="0"/>
-              <a:t>20/05/2022</a:t>
+              <a:t>23/05/2022</a:t>
             </a:fld>
             <a:endParaRPr lang="es-ES"/>
           </a:p>
@@ -642,7 +642,7 @@
           <a:p>
             <a:fld id="{E816971E-1CC9-4B1B-B84A-56D45306C128}" type="datetimeFigureOut">
               <a:rPr lang="es-ES" smtClean="0"/>
-              <a:t>20/05/2022</a:t>
+              <a:t>23/05/2022</a:t>
             </a:fld>
             <a:endParaRPr lang="es-ES"/>
           </a:p>
@@ -812,7 +812,7 @@
           <a:p>
             <a:fld id="{E816971E-1CC9-4B1B-B84A-56D45306C128}" type="datetimeFigureOut">
               <a:rPr lang="es-ES" smtClean="0"/>
-              <a:t>20/05/2022</a:t>
+              <a:t>23/05/2022</a:t>
             </a:fld>
             <a:endParaRPr lang="es-ES"/>
           </a:p>
@@ -1058,7 +1058,7 @@
           <a:p>
             <a:fld id="{E816971E-1CC9-4B1B-B84A-56D45306C128}" type="datetimeFigureOut">
               <a:rPr lang="es-ES" smtClean="0"/>
-              <a:t>20/05/2022</a:t>
+              <a:t>23/05/2022</a:t>
             </a:fld>
             <a:endParaRPr lang="es-ES"/>
           </a:p>
@@ -1290,7 +1290,7 @@
           <a:p>
             <a:fld id="{E816971E-1CC9-4B1B-B84A-56D45306C128}" type="datetimeFigureOut">
               <a:rPr lang="es-ES" smtClean="0"/>
-              <a:t>20/05/2022</a:t>
+              <a:t>23/05/2022</a:t>
             </a:fld>
             <a:endParaRPr lang="es-ES"/>
           </a:p>
@@ -1657,7 +1657,7 @@
           <a:p>
             <a:fld id="{E816971E-1CC9-4B1B-B84A-56D45306C128}" type="datetimeFigureOut">
               <a:rPr lang="es-ES" smtClean="0"/>
-              <a:t>20/05/2022</a:t>
+              <a:t>23/05/2022</a:t>
             </a:fld>
             <a:endParaRPr lang="es-ES"/>
           </a:p>
@@ -1775,7 +1775,7 @@
           <a:p>
             <a:fld id="{E816971E-1CC9-4B1B-B84A-56D45306C128}" type="datetimeFigureOut">
               <a:rPr lang="es-ES" smtClean="0"/>
-              <a:t>20/05/2022</a:t>
+              <a:t>23/05/2022</a:t>
             </a:fld>
             <a:endParaRPr lang="es-ES"/>
           </a:p>
@@ -1870,7 +1870,7 @@
           <a:p>
             <a:fld id="{E816971E-1CC9-4B1B-B84A-56D45306C128}" type="datetimeFigureOut">
               <a:rPr lang="es-ES" smtClean="0"/>
-              <a:t>20/05/2022</a:t>
+              <a:t>23/05/2022</a:t>
             </a:fld>
             <a:endParaRPr lang="es-ES"/>
           </a:p>
@@ -2147,7 +2147,7 @@
           <a:p>
             <a:fld id="{E816971E-1CC9-4B1B-B84A-56D45306C128}" type="datetimeFigureOut">
               <a:rPr lang="es-ES" smtClean="0"/>
-              <a:t>20/05/2022</a:t>
+              <a:t>23/05/2022</a:t>
             </a:fld>
             <a:endParaRPr lang="es-ES"/>
           </a:p>
@@ -2400,7 +2400,7 @@
           <a:p>
             <a:fld id="{E816971E-1CC9-4B1B-B84A-56D45306C128}" type="datetimeFigureOut">
               <a:rPr lang="es-ES" smtClean="0"/>
-              <a:t>20/05/2022</a:t>
+              <a:t>23/05/2022</a:t>
             </a:fld>
             <a:endParaRPr lang="es-ES"/>
           </a:p>
@@ -2613,7 +2613,7 @@
           <a:p>
             <a:fld id="{E816971E-1CC9-4B1B-B84A-56D45306C128}" type="datetimeFigureOut">
               <a:rPr lang="es-ES" smtClean="0"/>
-              <a:t>20/05/2022</a:t>
+              <a:t>23/05/2022</a:t>
             </a:fld>
             <a:endParaRPr lang="es-ES"/>
           </a:p>
@@ -5374,7 +5374,7 @@
           <a:graphicData uri="http://schemas.openxmlformats.org/presentationml/2006/ole">
             <mc:AlternateContent xmlns:mc="http://schemas.openxmlformats.org/markup-compatibility/2006">
               <mc:Choice xmlns:v="urn:schemas-microsoft-com:vml" Requires="v">
-                <p:oleObj spid="_x0000_s2089" name="Acrobat Document" r:id="rId3" imgW="3428684" imgH="4800600" progId="AcroExch.Document.7">
+                <p:oleObj spid="_x0000_s2090" name="Acrobat Document" r:id="rId3" imgW="3428684" imgH="4800600" progId="AcroExch.Document.7">
                   <p:embed/>
                 </p:oleObj>
               </mc:Choice>
@@ -6498,8 +6498,8 @@
           </a:p>
         </p:txBody>
       </p:sp>
-      <mc:AlternateContent xmlns:mc="http://schemas.openxmlformats.org/markup-compatibility/2006">
-        <mc:Choice xmlns:a14="http://schemas.microsoft.com/office/drawing/2010/main" Requires="a14">
+      <mc:AlternateContent xmlns:mc="http://schemas.openxmlformats.org/markup-compatibility/2006" xmlns:a14="http://schemas.microsoft.com/office/drawing/2010/main">
+        <mc:Choice Requires="a14">
           <p:sp>
             <p:nvSpPr>
               <p:cNvPr id="3" name="Marcador de contenido 2"/>
@@ -6546,7 +6546,6 @@
                   <a:rPr lang="es-ES" dirty="0" smtClean="0"/>
                   <a:t>Prueba 10CV</a:t>
                 </a:r>
-                <a:endParaRPr lang="es-ES" dirty="0" smtClean="0"/>
               </a:p>
               <a:p>
                 <a:endParaRPr lang="es-ES" dirty="0" smtClean="0"/>
@@ -6557,7 +6556,7 @@
             </p:txBody>
           </p:sp>
         </mc:Choice>
-        <mc:Fallback>
+        <mc:Fallback xmlns="">
           <p:sp>
             <p:nvSpPr>
               <p:cNvPr id="3" name="Marcador de contenido 2"/>
@@ -6711,11 +6710,7 @@
             </a:r>
             <a:r>
               <a:rPr lang="es-ES" dirty="0" smtClean="0"/>
-              <a:t> de 300X300 con magnificación </a:t>
-            </a:r>
-            <a:r>
-              <a:rPr lang="es-ES" dirty="0" smtClean="0"/>
-              <a:t>X10 PAAD</a:t>
+              <a:t> de 300X300 con magnificación X10 PAAD</a:t>
             </a:r>
           </a:p>
           <a:p>
@@ -6742,7 +6737,6 @@
               <a:rPr lang="es-ES" dirty="0" smtClean="0"/>
               <a:t> de 512X512 con magnificación X20 PAAD</a:t>
             </a:r>
-            <a:endParaRPr lang="es-ES" dirty="0" smtClean="0"/>
           </a:p>
           <a:p>
             <a:pPr>
@@ -6766,11 +6760,7 @@
             </a:r>
             <a:r>
               <a:rPr lang="es-ES" dirty="0" smtClean="0"/>
-              <a:t> de 512x512 con magnificación X20 </a:t>
-            </a:r>
-            <a:r>
-              <a:rPr lang="es-ES" dirty="0" smtClean="0"/>
-              <a:t>LUSC-LUAD</a:t>
+              <a:t> de 512x512 con magnificación X20 LUSC-LUAD</a:t>
             </a:r>
           </a:p>
           <a:p>
@@ -6809,7 +6799,6 @@
               <a:rPr lang="es-ES" dirty="0" smtClean="0"/>
               <a:t>25% de 512x512</a:t>
             </a:r>
-            <a:endParaRPr lang="es-ES" dirty="0" smtClean="0"/>
           </a:p>
           <a:p>
             <a:pPr>
@@ -7268,7 +7257,7 @@
     <p:controls>
       <mc:AlternateContent xmlns:mc="http://schemas.openxmlformats.org/markup-compatibility/2006">
         <mc:Choice xmlns:v="urn:schemas-microsoft-com:vml" Requires="v">
-          <p:control spid="1287" name="HTMLCheckbox1" r:id="rId2" imgW="257040" imgH="304920"/>
+          <p:control spid="1291" name="HTMLCheckbox1" r:id="rId2" imgW="257040" imgH="304920"/>
         </mc:Choice>
         <mc:Fallback>
           <p:control name="HTMLCheckbox1" r:id="rId2" imgW="257040" imgH="304920">
@@ -7320,7 +7309,7 @@
       </mc:AlternateContent>
       <mc:AlternateContent xmlns:mc="http://schemas.openxmlformats.org/markup-compatibility/2006">
         <mc:Choice xmlns:v="urn:schemas-microsoft-com:vml" Requires="v">
-          <p:control spid="1288" name="HTMLCheckbox2" r:id="rId3" imgW="257040" imgH="304920"/>
+          <p:control spid="1292" name="HTMLCheckbox2" r:id="rId3" imgW="257040" imgH="304920"/>
         </mc:Choice>
         <mc:Fallback>
           <p:control name="HTMLCheckbox2" r:id="rId3" imgW="257040" imgH="304920">
@@ -7372,7 +7361,7 @@
       </mc:AlternateContent>
       <mc:AlternateContent xmlns:mc="http://schemas.openxmlformats.org/markup-compatibility/2006">
         <mc:Choice xmlns:v="urn:schemas-microsoft-com:vml" Requires="v">
-          <p:control spid="1289" name="HTMLCheckbox3" r:id="rId4" imgW="257040" imgH="304920"/>
+          <p:control spid="1293" name="HTMLCheckbox3" r:id="rId4" imgW="257040" imgH="304920"/>
         </mc:Choice>
         <mc:Fallback>
           <p:control name="HTMLCheckbox3" r:id="rId4" imgW="257040" imgH="304920">
@@ -7424,7 +7413,7 @@
       </mc:AlternateContent>
       <mc:AlternateContent xmlns:mc="http://schemas.openxmlformats.org/markup-compatibility/2006">
         <mc:Choice xmlns:v="urn:schemas-microsoft-com:vml" Requires="v">
-          <p:control spid="1290" name="HTMLCheckbox4" r:id="rId5" imgW="257040" imgH="304920"/>
+          <p:control spid="1294" name="HTMLCheckbox4" r:id="rId5" imgW="257040" imgH="304920"/>
         </mc:Choice>
         <mc:Fallback>
           <p:control name="HTMLCheckbox4" r:id="rId5" imgW="257040" imgH="304920">

</xml_diff>

<commit_message>
Manage to setup training for all data
</commit_message>
<xml_diff>
--- a/pregunta.pptx
+++ b/pregunta.pptx
@@ -34,11 +34,12 @@
     <p:sldId id="278" r:id="rId28"/>
     <p:sldId id="284" r:id="rId29"/>
     <p:sldId id="288" r:id="rId30"/>
-    <p:sldId id="292" r:id="rId31"/>
-    <p:sldId id="293" r:id="rId32"/>
-    <p:sldId id="294" r:id="rId33"/>
-    <p:sldId id="295" r:id="rId34"/>
-    <p:sldId id="290" r:id="rId35"/>
+    <p:sldId id="296" r:id="rId31"/>
+    <p:sldId id="292" r:id="rId32"/>
+    <p:sldId id="293" r:id="rId33"/>
+    <p:sldId id="294" r:id="rId34"/>
+    <p:sldId id="295" r:id="rId35"/>
+    <p:sldId id="290" r:id="rId36"/>
   </p:sldIdLst>
   <p:sldSz cx="12192000" cy="6858000"/>
   <p:notesSz cx="6858000" cy="9144000"/>
@@ -292,7 +293,7 @@
           <a:p>
             <a:fld id="{E816971E-1CC9-4B1B-B84A-56D45306C128}" type="datetimeFigureOut">
               <a:rPr lang="es-ES" smtClean="0"/>
-              <a:t>23/05/2022</a:t>
+              <a:t>26/05/2022</a:t>
             </a:fld>
             <a:endParaRPr lang="es-ES"/>
           </a:p>
@@ -462,7 +463,7 @@
           <a:p>
             <a:fld id="{E816971E-1CC9-4B1B-B84A-56D45306C128}" type="datetimeFigureOut">
               <a:rPr lang="es-ES" smtClean="0"/>
-              <a:t>23/05/2022</a:t>
+              <a:t>26/05/2022</a:t>
             </a:fld>
             <a:endParaRPr lang="es-ES"/>
           </a:p>
@@ -642,7 +643,7 @@
           <a:p>
             <a:fld id="{E816971E-1CC9-4B1B-B84A-56D45306C128}" type="datetimeFigureOut">
               <a:rPr lang="es-ES" smtClean="0"/>
-              <a:t>23/05/2022</a:t>
+              <a:t>26/05/2022</a:t>
             </a:fld>
             <a:endParaRPr lang="es-ES"/>
           </a:p>
@@ -812,7 +813,7 @@
           <a:p>
             <a:fld id="{E816971E-1CC9-4B1B-B84A-56D45306C128}" type="datetimeFigureOut">
               <a:rPr lang="es-ES" smtClean="0"/>
-              <a:t>23/05/2022</a:t>
+              <a:t>26/05/2022</a:t>
             </a:fld>
             <a:endParaRPr lang="es-ES"/>
           </a:p>
@@ -1058,7 +1059,7 @@
           <a:p>
             <a:fld id="{E816971E-1CC9-4B1B-B84A-56D45306C128}" type="datetimeFigureOut">
               <a:rPr lang="es-ES" smtClean="0"/>
-              <a:t>23/05/2022</a:t>
+              <a:t>26/05/2022</a:t>
             </a:fld>
             <a:endParaRPr lang="es-ES"/>
           </a:p>
@@ -1290,7 +1291,7 @@
           <a:p>
             <a:fld id="{E816971E-1CC9-4B1B-B84A-56D45306C128}" type="datetimeFigureOut">
               <a:rPr lang="es-ES" smtClean="0"/>
-              <a:t>23/05/2022</a:t>
+              <a:t>26/05/2022</a:t>
             </a:fld>
             <a:endParaRPr lang="es-ES"/>
           </a:p>
@@ -1657,7 +1658,7 @@
           <a:p>
             <a:fld id="{E816971E-1CC9-4B1B-B84A-56D45306C128}" type="datetimeFigureOut">
               <a:rPr lang="es-ES" smtClean="0"/>
-              <a:t>23/05/2022</a:t>
+              <a:t>26/05/2022</a:t>
             </a:fld>
             <a:endParaRPr lang="es-ES"/>
           </a:p>
@@ -1775,7 +1776,7 @@
           <a:p>
             <a:fld id="{E816971E-1CC9-4B1B-B84A-56D45306C128}" type="datetimeFigureOut">
               <a:rPr lang="es-ES" smtClean="0"/>
-              <a:t>23/05/2022</a:t>
+              <a:t>26/05/2022</a:t>
             </a:fld>
             <a:endParaRPr lang="es-ES"/>
           </a:p>
@@ -1870,7 +1871,7 @@
           <a:p>
             <a:fld id="{E816971E-1CC9-4B1B-B84A-56D45306C128}" type="datetimeFigureOut">
               <a:rPr lang="es-ES" smtClean="0"/>
-              <a:t>23/05/2022</a:t>
+              <a:t>26/05/2022</a:t>
             </a:fld>
             <a:endParaRPr lang="es-ES"/>
           </a:p>
@@ -2147,7 +2148,7 @@
           <a:p>
             <a:fld id="{E816971E-1CC9-4B1B-B84A-56D45306C128}" type="datetimeFigureOut">
               <a:rPr lang="es-ES" smtClean="0"/>
-              <a:t>23/05/2022</a:t>
+              <a:t>26/05/2022</a:t>
             </a:fld>
             <a:endParaRPr lang="es-ES"/>
           </a:p>
@@ -2400,7 +2401,7 @@
           <a:p>
             <a:fld id="{E816971E-1CC9-4B1B-B84A-56D45306C128}" type="datetimeFigureOut">
               <a:rPr lang="es-ES" smtClean="0"/>
-              <a:t>23/05/2022</a:t>
+              <a:t>26/05/2022</a:t>
             </a:fld>
             <a:endParaRPr lang="es-ES"/>
           </a:p>
@@ -2613,7 +2614,7 @@
           <a:p>
             <a:fld id="{E816971E-1CC9-4B1B-B84A-56D45306C128}" type="datetimeFigureOut">
               <a:rPr lang="es-ES" smtClean="0"/>
-              <a:t>23/05/2022</a:t>
+              <a:t>26/05/2022</a:t>
             </a:fld>
             <a:endParaRPr lang="es-ES"/>
           </a:p>
@@ -5374,7 +5375,7 @@
           <a:graphicData uri="http://schemas.openxmlformats.org/presentationml/2006/ole">
             <mc:AlternateContent xmlns:mc="http://schemas.openxmlformats.org/markup-compatibility/2006">
               <mc:Choice xmlns:v="urn:schemas-microsoft-com:vml" Requires="v">
-                <p:oleObj spid="_x0000_s2090" name="Acrobat Document" r:id="rId3" imgW="3428684" imgH="4800600" progId="AcroExch.Document.7">
+                <p:oleObj spid="_x0000_s2092" name="Acrobat Document" r:id="rId3" imgW="3428684" imgH="4800600" progId="AcroExch.Document.7">
                   <p:embed/>
                 </p:oleObj>
               </mc:Choice>
@@ -6123,7 +6124,7 @@
           <a:p>
             <a:r>
               <a:rPr lang="es-ES" dirty="0" smtClean="0"/>
-              <a:t>30/05/22</a:t>
+              <a:t>27/05/22</a:t>
             </a:r>
             <a:endParaRPr lang="es-ES" dirty="0"/>
           </a:p>
@@ -6316,6 +6317,94 @@
 </file>
 
 <file path=ppt/slides/slide30.xml><?xml version="1.0" encoding="utf-8"?>
+<p:sld xmlns:a="http://schemas.openxmlformats.org/drawingml/2006/main" xmlns:r="http://schemas.openxmlformats.org/officeDocument/2006/relationships" xmlns:p="http://schemas.openxmlformats.org/presentationml/2006/main">
+  <p:cSld>
+    <p:spTree>
+      <p:nvGrpSpPr>
+        <p:cNvPr id="1" name=""/>
+        <p:cNvGrpSpPr/>
+        <p:nvPr/>
+      </p:nvGrpSpPr>
+      <p:grpSpPr>
+        <a:xfrm>
+          <a:off x="0" y="0"/>
+          <a:ext cx="0" cy="0"/>
+          <a:chOff x="0" y="0"/>
+          <a:chExt cx="0" cy="0"/>
+        </a:xfrm>
+      </p:grpSpPr>
+      <p:sp>
+        <p:nvSpPr>
+          <p:cNvPr id="2" name="Título 1"/>
+          <p:cNvSpPr>
+            <a:spLocks noGrp="1"/>
+          </p:cNvSpPr>
+          <p:nvPr>
+            <p:ph type="title"/>
+          </p:nvPr>
+        </p:nvSpPr>
+        <p:spPr/>
+        <p:txBody>
+          <a:bodyPr/>
+          <a:lstStyle/>
+          <a:p>
+            <a:r>
+              <a:rPr lang="es-ES" dirty="0" smtClean="0"/>
+              <a:t>Cambio del data pipeline</a:t>
+            </a:r>
+            <a:endParaRPr lang="es-ES" dirty="0"/>
+          </a:p>
+        </p:txBody>
+      </p:sp>
+      <p:sp>
+        <p:nvSpPr>
+          <p:cNvPr id="3" name="Marcador de contenido 2"/>
+          <p:cNvSpPr>
+            <a:spLocks noGrp="1"/>
+          </p:cNvSpPr>
+          <p:nvPr>
+            <p:ph idx="1"/>
+          </p:nvPr>
+        </p:nvSpPr>
+        <p:spPr/>
+        <p:txBody>
+          <a:bodyPr/>
+          <a:lstStyle/>
+          <a:p>
+            <a:r>
+              <a:rPr lang="es-ES" smtClean="0"/>
+              <a:t>150 </a:t>
+            </a:r>
+            <a:r>
+              <a:rPr lang="es-ES" dirty="0" smtClean="0"/>
+              <a:t>000 </a:t>
+            </a:r>
+            <a:r>
+              <a:rPr lang="es-ES" dirty="0" err="1" smtClean="0"/>
+              <a:t>Patches</a:t>
+            </a:r>
+            <a:r>
+              <a:rPr lang="es-ES" dirty="0" smtClean="0"/>
+              <a:t> de 512X512 con una magnificación X20</a:t>
+            </a:r>
+            <a:endParaRPr lang="es-ES" dirty="0"/>
+          </a:p>
+        </p:txBody>
+      </p:sp>
+    </p:spTree>
+    <p:extLst>
+      <p:ext uri="{BB962C8B-B14F-4D97-AF65-F5344CB8AC3E}">
+        <p14:creationId xmlns:p14="http://schemas.microsoft.com/office/powerpoint/2010/main" val="1313149992"/>
+      </p:ext>
+    </p:extLst>
+  </p:cSld>
+  <p:clrMapOvr>
+    <a:masterClrMapping/>
+  </p:clrMapOvr>
+</p:sld>
+</file>
+
+<file path=ppt/slides/slide31.xml><?xml version="1.0" encoding="utf-8"?>
 <p:sld xmlns:a="http://schemas.openxmlformats.org/drawingml/2006/main" xmlns:r="http://schemas.openxmlformats.org/officeDocument/2006/relationships" xmlns:p="http://schemas.openxmlformats.org/presentationml/2006/main">
   <p:cSld>
     <p:spTree>
@@ -6451,7 +6540,7 @@
 </p:sld>
 </file>
 
-<file path=ppt/slides/slide31.xml><?xml version="1.0" encoding="utf-8"?>
+<file path=ppt/slides/slide32.xml><?xml version="1.0" encoding="utf-8"?>
 <p:sld xmlns:a="http://schemas.openxmlformats.org/drawingml/2006/main" xmlns:r="http://schemas.openxmlformats.org/officeDocument/2006/relationships" xmlns:p="http://schemas.openxmlformats.org/presentationml/2006/main">
   <p:cSld>
     <p:spTree>
@@ -6633,202 +6722,6 @@
 </p:sld>
 </file>
 
-<file path=ppt/slides/slide32.xml><?xml version="1.0" encoding="utf-8"?>
-<p:sld xmlns:a="http://schemas.openxmlformats.org/drawingml/2006/main" xmlns:r="http://schemas.openxmlformats.org/officeDocument/2006/relationships" xmlns:p="http://schemas.openxmlformats.org/presentationml/2006/main">
-  <p:cSld>
-    <p:spTree>
-      <p:nvGrpSpPr>
-        <p:cNvPr id="1" name=""/>
-        <p:cNvGrpSpPr/>
-        <p:nvPr/>
-      </p:nvGrpSpPr>
-      <p:grpSpPr>
-        <a:xfrm>
-          <a:off x="0" y="0"/>
-          <a:ext cx="0" cy="0"/>
-          <a:chOff x="0" y="0"/>
-          <a:chExt cx="0" cy="0"/>
-        </a:xfrm>
-      </p:grpSpPr>
-      <p:sp>
-        <p:nvSpPr>
-          <p:cNvPr id="2" name="Título 1"/>
-          <p:cNvSpPr>
-            <a:spLocks noGrp="1"/>
-          </p:cNvSpPr>
-          <p:nvPr>
-            <p:ph type="title"/>
-          </p:nvPr>
-        </p:nvSpPr>
-        <p:spPr/>
-        <p:txBody>
-          <a:bodyPr/>
-          <a:lstStyle/>
-          <a:p>
-            <a:r>
-              <a:rPr lang="es-ES" dirty="0"/>
-              <a:t>Modificar el data pipeline para poder albergar más datos</a:t>
-            </a:r>
-          </a:p>
-        </p:txBody>
-      </p:sp>
-      <p:sp>
-        <p:nvSpPr>
-          <p:cNvPr id="3" name="Marcador de contenido 2"/>
-          <p:cNvSpPr>
-            <a:spLocks noGrp="1"/>
-          </p:cNvSpPr>
-          <p:nvPr>
-            <p:ph idx="1"/>
-          </p:nvPr>
-        </p:nvSpPr>
-        <p:spPr/>
-        <p:txBody>
-          <a:bodyPr>
-            <a:normAutofit fontScale="92500" lnSpcReduction="20000"/>
-          </a:bodyPr>
-          <a:lstStyle/>
-          <a:p>
-            <a:pPr>
-              <a:buFontTx/>
-              <a:buChar char="-"/>
-            </a:pPr>
-            <a:endParaRPr lang="es-ES" dirty="0" smtClean="0"/>
-          </a:p>
-          <a:p>
-            <a:pPr>
-              <a:buFontTx/>
-              <a:buChar char="-"/>
-            </a:pPr>
-            <a:r>
-              <a:rPr lang="es-ES" dirty="0" smtClean="0"/>
-              <a:t>90 000 </a:t>
-            </a:r>
-            <a:r>
-              <a:rPr lang="es-ES" dirty="0" err="1" smtClean="0"/>
-              <a:t>Patches</a:t>
-            </a:r>
-            <a:r>
-              <a:rPr lang="es-ES" dirty="0" smtClean="0"/>
-              <a:t> de 300X300 con magnificación X10 PAAD</a:t>
-            </a:r>
-          </a:p>
-          <a:p>
-            <a:pPr>
-              <a:buFontTx/>
-              <a:buChar char="-"/>
-            </a:pPr>
-            <a:endParaRPr lang="es-ES" dirty="0"/>
-          </a:p>
-          <a:p>
-            <a:pPr>
-              <a:buFontTx/>
-              <a:buChar char="-"/>
-            </a:pPr>
-            <a:r>
-              <a:rPr lang="es-ES" dirty="0" smtClean="0"/>
-              <a:t>70 000 </a:t>
-            </a:r>
-            <a:r>
-              <a:rPr lang="es-ES" dirty="0" err="1" smtClean="0"/>
-              <a:t>Patches</a:t>
-            </a:r>
-            <a:r>
-              <a:rPr lang="es-ES" dirty="0" smtClean="0"/>
-              <a:t> de 512X512 con magnificación X20 PAAD</a:t>
-            </a:r>
-          </a:p>
-          <a:p>
-            <a:pPr>
-              <a:buFontTx/>
-              <a:buChar char="-"/>
-            </a:pPr>
-            <a:endParaRPr lang="es-ES" dirty="0"/>
-          </a:p>
-          <a:p>
-            <a:pPr>
-              <a:buFontTx/>
-              <a:buChar char="-"/>
-            </a:pPr>
-            <a:r>
-              <a:rPr lang="es-ES" dirty="0" smtClean="0"/>
-              <a:t>250 000 </a:t>
-            </a:r>
-            <a:r>
-              <a:rPr lang="es-ES" dirty="0" err="1" smtClean="0"/>
-              <a:t>Patches</a:t>
-            </a:r>
-            <a:r>
-              <a:rPr lang="es-ES" dirty="0" smtClean="0"/>
-              <a:t> de 512x512 con magnificación X20 LUSC-LUAD</a:t>
-            </a:r>
-          </a:p>
-          <a:p>
-            <a:pPr>
-              <a:buFontTx/>
-              <a:buChar char="-"/>
-            </a:pPr>
-            <a:endParaRPr lang="es-ES" dirty="0" smtClean="0"/>
-          </a:p>
-          <a:p>
-            <a:pPr marL="0" indent="0">
-              <a:buNone/>
-            </a:pPr>
-            <a:r>
-              <a:rPr lang="es-ES" dirty="0" smtClean="0"/>
-              <a:t>Máximo actual en RAM</a:t>
-            </a:r>
-            <a:endParaRPr lang="es-ES" dirty="0"/>
-          </a:p>
-          <a:p>
-            <a:pPr>
-              <a:buFontTx/>
-              <a:buChar char="-"/>
-            </a:pPr>
-            <a:r>
-              <a:rPr lang="es-ES" dirty="0" smtClean="0"/>
-              <a:t>50% de 300X300 </a:t>
-            </a:r>
-          </a:p>
-          <a:p>
-            <a:pPr>
-              <a:buFontTx/>
-              <a:buChar char="-"/>
-            </a:pPr>
-            <a:r>
-              <a:rPr lang="es-ES" dirty="0" smtClean="0"/>
-              <a:t>25% de 512x512</a:t>
-            </a:r>
-          </a:p>
-          <a:p>
-            <a:pPr>
-              <a:buFontTx/>
-              <a:buChar char="-"/>
-            </a:pPr>
-            <a:endParaRPr lang="es-ES" dirty="0" smtClean="0"/>
-          </a:p>
-          <a:p>
-            <a:pPr>
-              <a:buFontTx/>
-              <a:buChar char="-"/>
-            </a:pPr>
-            <a:endParaRPr lang="es-ES" dirty="0"/>
-          </a:p>
-        </p:txBody>
-      </p:sp>
-    </p:spTree>
-    <p:extLst>
-      <p:ext uri="{BB962C8B-B14F-4D97-AF65-F5344CB8AC3E}">
-        <p14:creationId xmlns:p14="http://schemas.microsoft.com/office/powerpoint/2010/main" val="3204762455"/>
-      </p:ext>
-    </p:extLst>
-  </p:cSld>
-  <p:clrMapOvr>
-    <a:masterClrMapping/>
-  </p:clrMapOvr>
-</p:sld>
-</file>
-
 <file path=ppt/slides/slide33.xml><?xml version="1.0" encoding="utf-8"?>
 <p:sld xmlns:a="http://schemas.openxmlformats.org/drawingml/2006/main" xmlns:r="http://schemas.openxmlformats.org/officeDocument/2006/relationships" xmlns:p="http://schemas.openxmlformats.org/presentationml/2006/main">
   <p:cSld>
@@ -6862,6 +6755,202 @@
           <a:lstStyle/>
           <a:p>
             <a:r>
+              <a:rPr lang="es-ES" dirty="0"/>
+              <a:t>Modificar el data pipeline para poder albergar más datos</a:t>
+            </a:r>
+          </a:p>
+        </p:txBody>
+      </p:sp>
+      <p:sp>
+        <p:nvSpPr>
+          <p:cNvPr id="3" name="Marcador de contenido 2"/>
+          <p:cNvSpPr>
+            <a:spLocks noGrp="1"/>
+          </p:cNvSpPr>
+          <p:nvPr>
+            <p:ph idx="1"/>
+          </p:nvPr>
+        </p:nvSpPr>
+        <p:spPr/>
+        <p:txBody>
+          <a:bodyPr>
+            <a:normAutofit fontScale="92500" lnSpcReduction="20000"/>
+          </a:bodyPr>
+          <a:lstStyle/>
+          <a:p>
+            <a:pPr>
+              <a:buFontTx/>
+              <a:buChar char="-"/>
+            </a:pPr>
+            <a:endParaRPr lang="es-ES" dirty="0" smtClean="0"/>
+          </a:p>
+          <a:p>
+            <a:pPr>
+              <a:buFontTx/>
+              <a:buChar char="-"/>
+            </a:pPr>
+            <a:r>
+              <a:rPr lang="es-ES" dirty="0" smtClean="0"/>
+              <a:t>90 000 </a:t>
+            </a:r>
+            <a:r>
+              <a:rPr lang="es-ES" dirty="0" err="1" smtClean="0"/>
+              <a:t>Patches</a:t>
+            </a:r>
+            <a:r>
+              <a:rPr lang="es-ES" dirty="0" smtClean="0"/>
+              <a:t> de 300X300 con magnificación X10 PAAD</a:t>
+            </a:r>
+          </a:p>
+          <a:p>
+            <a:pPr>
+              <a:buFontTx/>
+              <a:buChar char="-"/>
+            </a:pPr>
+            <a:endParaRPr lang="es-ES" dirty="0"/>
+          </a:p>
+          <a:p>
+            <a:pPr>
+              <a:buFontTx/>
+              <a:buChar char="-"/>
+            </a:pPr>
+            <a:r>
+              <a:rPr lang="es-ES" dirty="0" smtClean="0"/>
+              <a:t>70 000 </a:t>
+            </a:r>
+            <a:r>
+              <a:rPr lang="es-ES" dirty="0" err="1" smtClean="0"/>
+              <a:t>Patches</a:t>
+            </a:r>
+            <a:r>
+              <a:rPr lang="es-ES" dirty="0" smtClean="0"/>
+              <a:t> de 512X512 con magnificación X20 PAAD</a:t>
+            </a:r>
+          </a:p>
+          <a:p>
+            <a:pPr>
+              <a:buFontTx/>
+              <a:buChar char="-"/>
+            </a:pPr>
+            <a:endParaRPr lang="es-ES" dirty="0"/>
+          </a:p>
+          <a:p>
+            <a:pPr>
+              <a:buFontTx/>
+              <a:buChar char="-"/>
+            </a:pPr>
+            <a:r>
+              <a:rPr lang="es-ES" dirty="0" smtClean="0"/>
+              <a:t>250 000 </a:t>
+            </a:r>
+            <a:r>
+              <a:rPr lang="es-ES" dirty="0" err="1" smtClean="0"/>
+              <a:t>Patches</a:t>
+            </a:r>
+            <a:r>
+              <a:rPr lang="es-ES" dirty="0" smtClean="0"/>
+              <a:t> de 512x512 con magnificación X20 LUSC-LUAD</a:t>
+            </a:r>
+          </a:p>
+          <a:p>
+            <a:pPr>
+              <a:buFontTx/>
+              <a:buChar char="-"/>
+            </a:pPr>
+            <a:endParaRPr lang="es-ES" dirty="0" smtClean="0"/>
+          </a:p>
+          <a:p>
+            <a:pPr marL="0" indent="0">
+              <a:buNone/>
+            </a:pPr>
+            <a:r>
+              <a:rPr lang="es-ES" dirty="0" smtClean="0"/>
+              <a:t>Máximo actual en RAM</a:t>
+            </a:r>
+            <a:endParaRPr lang="es-ES" dirty="0"/>
+          </a:p>
+          <a:p>
+            <a:pPr>
+              <a:buFontTx/>
+              <a:buChar char="-"/>
+            </a:pPr>
+            <a:r>
+              <a:rPr lang="es-ES" dirty="0" smtClean="0"/>
+              <a:t>50% de 300X300 </a:t>
+            </a:r>
+          </a:p>
+          <a:p>
+            <a:pPr>
+              <a:buFontTx/>
+              <a:buChar char="-"/>
+            </a:pPr>
+            <a:r>
+              <a:rPr lang="es-ES" dirty="0" smtClean="0"/>
+              <a:t>25% de 512x512</a:t>
+            </a:r>
+          </a:p>
+          <a:p>
+            <a:pPr>
+              <a:buFontTx/>
+              <a:buChar char="-"/>
+            </a:pPr>
+            <a:endParaRPr lang="es-ES" dirty="0" smtClean="0"/>
+          </a:p>
+          <a:p>
+            <a:pPr>
+              <a:buFontTx/>
+              <a:buChar char="-"/>
+            </a:pPr>
+            <a:endParaRPr lang="es-ES" dirty="0"/>
+          </a:p>
+        </p:txBody>
+      </p:sp>
+    </p:spTree>
+    <p:extLst>
+      <p:ext uri="{BB962C8B-B14F-4D97-AF65-F5344CB8AC3E}">
+        <p14:creationId xmlns:p14="http://schemas.microsoft.com/office/powerpoint/2010/main" val="3204762455"/>
+      </p:ext>
+    </p:extLst>
+  </p:cSld>
+  <p:clrMapOvr>
+    <a:masterClrMapping/>
+  </p:clrMapOvr>
+</p:sld>
+</file>
+
+<file path=ppt/slides/slide34.xml><?xml version="1.0" encoding="utf-8"?>
+<p:sld xmlns:a="http://schemas.openxmlformats.org/drawingml/2006/main" xmlns:r="http://schemas.openxmlformats.org/officeDocument/2006/relationships" xmlns:p="http://schemas.openxmlformats.org/presentationml/2006/main">
+  <p:cSld>
+    <p:spTree>
+      <p:nvGrpSpPr>
+        <p:cNvPr id="1" name=""/>
+        <p:cNvGrpSpPr/>
+        <p:nvPr/>
+      </p:nvGrpSpPr>
+      <p:grpSpPr>
+        <a:xfrm>
+          <a:off x="0" y="0"/>
+          <a:ext cx="0" cy="0"/>
+          <a:chOff x="0" y="0"/>
+          <a:chExt cx="0" cy="0"/>
+        </a:xfrm>
+      </p:grpSpPr>
+      <p:sp>
+        <p:nvSpPr>
+          <p:cNvPr id="2" name="Título 1"/>
+          <p:cNvSpPr>
+            <a:spLocks noGrp="1"/>
+          </p:cNvSpPr>
+          <p:nvPr>
+            <p:ph type="title"/>
+          </p:nvPr>
+        </p:nvSpPr>
+        <p:spPr/>
+        <p:txBody>
+          <a:bodyPr/>
+          <a:lstStyle/>
+          <a:p>
+            <a:r>
               <a:rPr lang="es-ES" dirty="0" smtClean="0"/>
               <a:t>Preguntas</a:t>
             </a:r>
@@ -6925,7 +7014,7 @@
 </p:sld>
 </file>
 
-<file path=ppt/slides/slide34.xml><?xml version="1.0" encoding="utf-8"?>
+<file path=ppt/slides/slide35.xml><?xml version="1.0" encoding="utf-8"?>
 <p:sld xmlns:a="http://schemas.openxmlformats.org/drawingml/2006/main" xmlns:r="http://schemas.openxmlformats.org/officeDocument/2006/relationships" xmlns:p="http://schemas.openxmlformats.org/presentationml/2006/main">
   <p:cSld>
     <p:spTree>
@@ -7257,7 +7346,7 @@
     <p:controls>
       <mc:AlternateContent xmlns:mc="http://schemas.openxmlformats.org/markup-compatibility/2006">
         <mc:Choice xmlns:v="urn:schemas-microsoft-com:vml" Requires="v">
-          <p:control spid="1291" name="HTMLCheckbox1" r:id="rId2" imgW="257040" imgH="304920"/>
+          <p:control spid="1299" name="HTMLCheckbox1" r:id="rId2" imgW="257040" imgH="304920"/>
         </mc:Choice>
         <mc:Fallback>
           <p:control name="HTMLCheckbox1" r:id="rId2" imgW="257040" imgH="304920">
@@ -7309,7 +7398,7 @@
       </mc:AlternateContent>
       <mc:AlternateContent xmlns:mc="http://schemas.openxmlformats.org/markup-compatibility/2006">
         <mc:Choice xmlns:v="urn:schemas-microsoft-com:vml" Requires="v">
-          <p:control spid="1292" name="HTMLCheckbox2" r:id="rId3" imgW="257040" imgH="304920"/>
+          <p:control spid="1300" name="HTMLCheckbox2" r:id="rId3" imgW="257040" imgH="304920"/>
         </mc:Choice>
         <mc:Fallback>
           <p:control name="HTMLCheckbox2" r:id="rId3" imgW="257040" imgH="304920">
@@ -7361,7 +7450,7 @@
       </mc:AlternateContent>
       <mc:AlternateContent xmlns:mc="http://schemas.openxmlformats.org/markup-compatibility/2006">
         <mc:Choice xmlns:v="urn:schemas-microsoft-com:vml" Requires="v">
-          <p:control spid="1293" name="HTMLCheckbox3" r:id="rId4" imgW="257040" imgH="304920"/>
+          <p:control spid="1301" name="HTMLCheckbox3" r:id="rId4" imgW="257040" imgH="304920"/>
         </mc:Choice>
         <mc:Fallback>
           <p:control name="HTMLCheckbox3" r:id="rId4" imgW="257040" imgH="304920">
@@ -7413,7 +7502,7 @@
       </mc:AlternateContent>
       <mc:AlternateContent xmlns:mc="http://schemas.openxmlformats.org/markup-compatibility/2006">
         <mc:Choice xmlns:v="urn:schemas-microsoft-com:vml" Requires="v">
-          <p:control spid="1294" name="HTMLCheckbox4" r:id="rId5" imgW="257040" imgH="304920"/>
+          <p:control spid="1302" name="HTMLCheckbox4" r:id="rId5" imgW="257040" imgH="304920"/>
         </mc:Choice>
         <mc:Fallback>
           <p:control name="HTMLCheckbox4" r:id="rId5" imgW="257040" imgH="304920">

</xml_diff>

<commit_message>
Training using all data, bug fixing in labels.
</commit_message>
<xml_diff>
--- a/pregunta.pptx
+++ b/pregunta.pptx
@@ -40,6 +40,14 @@
     <p:sldId id="294" r:id="rId34"/>
     <p:sldId id="295" r:id="rId35"/>
     <p:sldId id="290" r:id="rId36"/>
+    <p:sldId id="298" r:id="rId37"/>
+    <p:sldId id="299" r:id="rId38"/>
+    <p:sldId id="300" r:id="rId39"/>
+    <p:sldId id="302" r:id="rId40"/>
+    <p:sldId id="306" r:id="rId41"/>
+    <p:sldId id="307" r:id="rId42"/>
+    <p:sldId id="308" r:id="rId43"/>
+    <p:sldId id="309" r:id="rId44"/>
   </p:sldIdLst>
   <p:sldSz cx="12192000" cy="6858000"/>
   <p:notesSz cx="6858000" cy="9144000"/>
@@ -293,7 +301,7 @@
           <a:p>
             <a:fld id="{E816971E-1CC9-4B1B-B84A-56D45306C128}" type="datetimeFigureOut">
               <a:rPr lang="es-ES" smtClean="0"/>
-              <a:t>26/05/2022</a:t>
+              <a:t>07/06/2022</a:t>
             </a:fld>
             <a:endParaRPr lang="es-ES"/>
           </a:p>
@@ -463,7 +471,7 @@
           <a:p>
             <a:fld id="{E816971E-1CC9-4B1B-B84A-56D45306C128}" type="datetimeFigureOut">
               <a:rPr lang="es-ES" smtClean="0"/>
-              <a:t>26/05/2022</a:t>
+              <a:t>07/06/2022</a:t>
             </a:fld>
             <a:endParaRPr lang="es-ES"/>
           </a:p>
@@ -643,7 +651,7 @@
           <a:p>
             <a:fld id="{E816971E-1CC9-4B1B-B84A-56D45306C128}" type="datetimeFigureOut">
               <a:rPr lang="es-ES" smtClean="0"/>
-              <a:t>26/05/2022</a:t>
+              <a:t>07/06/2022</a:t>
             </a:fld>
             <a:endParaRPr lang="es-ES"/>
           </a:p>
@@ -813,7 +821,7 @@
           <a:p>
             <a:fld id="{E816971E-1CC9-4B1B-B84A-56D45306C128}" type="datetimeFigureOut">
               <a:rPr lang="es-ES" smtClean="0"/>
-              <a:t>26/05/2022</a:t>
+              <a:t>07/06/2022</a:t>
             </a:fld>
             <a:endParaRPr lang="es-ES"/>
           </a:p>
@@ -1059,7 +1067,7 @@
           <a:p>
             <a:fld id="{E816971E-1CC9-4B1B-B84A-56D45306C128}" type="datetimeFigureOut">
               <a:rPr lang="es-ES" smtClean="0"/>
-              <a:t>26/05/2022</a:t>
+              <a:t>07/06/2022</a:t>
             </a:fld>
             <a:endParaRPr lang="es-ES"/>
           </a:p>
@@ -1291,7 +1299,7 @@
           <a:p>
             <a:fld id="{E816971E-1CC9-4B1B-B84A-56D45306C128}" type="datetimeFigureOut">
               <a:rPr lang="es-ES" smtClean="0"/>
-              <a:t>26/05/2022</a:t>
+              <a:t>07/06/2022</a:t>
             </a:fld>
             <a:endParaRPr lang="es-ES"/>
           </a:p>
@@ -1658,7 +1666,7 @@
           <a:p>
             <a:fld id="{E816971E-1CC9-4B1B-B84A-56D45306C128}" type="datetimeFigureOut">
               <a:rPr lang="es-ES" smtClean="0"/>
-              <a:t>26/05/2022</a:t>
+              <a:t>07/06/2022</a:t>
             </a:fld>
             <a:endParaRPr lang="es-ES"/>
           </a:p>
@@ -1776,7 +1784,7 @@
           <a:p>
             <a:fld id="{E816971E-1CC9-4B1B-B84A-56D45306C128}" type="datetimeFigureOut">
               <a:rPr lang="es-ES" smtClean="0"/>
-              <a:t>26/05/2022</a:t>
+              <a:t>07/06/2022</a:t>
             </a:fld>
             <a:endParaRPr lang="es-ES"/>
           </a:p>
@@ -1871,7 +1879,7 @@
           <a:p>
             <a:fld id="{E816971E-1CC9-4B1B-B84A-56D45306C128}" type="datetimeFigureOut">
               <a:rPr lang="es-ES" smtClean="0"/>
-              <a:t>26/05/2022</a:t>
+              <a:t>07/06/2022</a:t>
             </a:fld>
             <a:endParaRPr lang="es-ES"/>
           </a:p>
@@ -2148,7 +2156,7 @@
           <a:p>
             <a:fld id="{E816971E-1CC9-4B1B-B84A-56D45306C128}" type="datetimeFigureOut">
               <a:rPr lang="es-ES" smtClean="0"/>
-              <a:t>26/05/2022</a:t>
+              <a:t>07/06/2022</a:t>
             </a:fld>
             <a:endParaRPr lang="es-ES"/>
           </a:p>
@@ -2401,7 +2409,7 @@
           <a:p>
             <a:fld id="{E816971E-1CC9-4B1B-B84A-56D45306C128}" type="datetimeFigureOut">
               <a:rPr lang="es-ES" smtClean="0"/>
-              <a:t>26/05/2022</a:t>
+              <a:t>07/06/2022</a:t>
             </a:fld>
             <a:endParaRPr lang="es-ES"/>
           </a:p>
@@ -2614,7 +2622,7 @@
           <a:p>
             <a:fld id="{E816971E-1CC9-4B1B-B84A-56D45306C128}" type="datetimeFigureOut">
               <a:rPr lang="es-ES" smtClean="0"/>
-              <a:t>26/05/2022</a:t>
+              <a:t>07/06/2022</a:t>
             </a:fld>
             <a:endParaRPr lang="es-ES"/>
           </a:p>
@@ -5375,7 +5383,7 @@
           <a:graphicData uri="http://schemas.openxmlformats.org/presentationml/2006/ole">
             <mc:AlternateContent xmlns:mc="http://schemas.openxmlformats.org/markup-compatibility/2006">
               <mc:Choice xmlns:v="urn:schemas-microsoft-com:vml" Requires="v">
-                <p:oleObj spid="_x0000_s2092" name="Acrobat Document" r:id="rId3" imgW="3428684" imgH="4800600" progId="AcroExch.Document.7">
+                <p:oleObj spid="_x0000_s2109" name="Acrobat Document" r:id="rId3" imgW="3428684" imgH="4800600" progId="AcroExch.Document.7">
                   <p:embed/>
                 </p:oleObj>
               </mc:Choice>
@@ -7108,6 +7116,756 @@
 </p:sld>
 </file>
 
+<file path=ppt/slides/slide36.xml><?xml version="1.0" encoding="utf-8"?>
+<p:sld xmlns:a="http://schemas.openxmlformats.org/drawingml/2006/main" xmlns:r="http://schemas.openxmlformats.org/officeDocument/2006/relationships" xmlns:p="http://schemas.openxmlformats.org/presentationml/2006/main">
+  <p:cSld>
+    <p:spTree>
+      <p:nvGrpSpPr>
+        <p:cNvPr id="1" name=""/>
+        <p:cNvGrpSpPr/>
+        <p:nvPr/>
+      </p:nvGrpSpPr>
+      <p:grpSpPr>
+        <a:xfrm>
+          <a:off x="0" y="0"/>
+          <a:ext cx="0" cy="0"/>
+          <a:chOff x="0" y="0"/>
+          <a:chExt cx="0" cy="0"/>
+        </a:xfrm>
+      </p:grpSpPr>
+      <p:sp>
+        <p:nvSpPr>
+          <p:cNvPr id="2" name="Título 1"/>
+          <p:cNvSpPr>
+            <a:spLocks noGrp="1"/>
+          </p:cNvSpPr>
+          <p:nvPr>
+            <p:ph type="ctrTitle"/>
+          </p:nvPr>
+        </p:nvSpPr>
+        <p:spPr>
+          <a:xfrm>
+            <a:off x="1524000" y="1122363"/>
+            <a:ext cx="9144000" cy="496125"/>
+          </a:xfrm>
+        </p:spPr>
+        <p:txBody>
+          <a:bodyPr>
+            <a:normAutofit fontScale="90000"/>
+          </a:bodyPr>
+          <a:lstStyle/>
+          <a:p>
+            <a:r>
+              <a:rPr lang="es-ES" dirty="0"/>
+              <a:t>Fusión de datos </a:t>
+            </a:r>
+            <a:r>
+              <a:rPr lang="es-ES" dirty="0" smtClean="0"/>
+              <a:t>heterogéneos: </a:t>
+            </a:r>
+            <a:endParaRPr lang="es-ES" dirty="0"/>
+          </a:p>
+        </p:txBody>
+      </p:sp>
+      <p:sp>
+        <p:nvSpPr>
+          <p:cNvPr id="3" name="Subtítulo 2"/>
+          <p:cNvSpPr>
+            <a:spLocks noGrp="1"/>
+          </p:cNvSpPr>
+          <p:nvPr>
+            <p:ph type="subTitle" idx="1"/>
+          </p:nvPr>
+        </p:nvSpPr>
+        <p:spPr>
+          <a:xfrm>
+            <a:off x="1524000" y="1755648"/>
+            <a:ext cx="9144000" cy="3502152"/>
+          </a:xfrm>
+        </p:spPr>
+        <p:txBody>
+          <a:bodyPr>
+            <a:normAutofit/>
+          </a:bodyPr>
+          <a:lstStyle/>
+          <a:p>
+            <a:endParaRPr lang="es-ES" dirty="0" smtClean="0"/>
+          </a:p>
+          <a:p>
+            <a:r>
+              <a:rPr lang="es-ES" dirty="0" smtClean="0"/>
+              <a:t>03/06/22</a:t>
+            </a:r>
+            <a:endParaRPr lang="es-ES" dirty="0"/>
+          </a:p>
+        </p:txBody>
+      </p:sp>
+    </p:spTree>
+    <p:extLst>
+      <p:ext uri="{BB962C8B-B14F-4D97-AF65-F5344CB8AC3E}">
+        <p14:creationId xmlns:p14="http://schemas.microsoft.com/office/powerpoint/2010/main" val="1054272608"/>
+      </p:ext>
+    </p:extLst>
+  </p:cSld>
+  <p:clrMapOvr>
+    <a:masterClrMapping/>
+  </p:clrMapOvr>
+</p:sld>
+</file>
+
+<file path=ppt/slides/slide37.xml><?xml version="1.0" encoding="utf-8"?>
+<p:sld xmlns:a="http://schemas.openxmlformats.org/drawingml/2006/main" xmlns:r="http://schemas.openxmlformats.org/officeDocument/2006/relationships" xmlns:p="http://schemas.openxmlformats.org/presentationml/2006/main">
+  <p:cSld>
+    <p:spTree>
+      <p:nvGrpSpPr>
+        <p:cNvPr id="1" name=""/>
+        <p:cNvGrpSpPr/>
+        <p:nvPr/>
+      </p:nvGrpSpPr>
+      <p:grpSpPr>
+        <a:xfrm>
+          <a:off x="0" y="0"/>
+          <a:ext cx="0" cy="0"/>
+          <a:chOff x="0" y="0"/>
+          <a:chExt cx="0" cy="0"/>
+        </a:xfrm>
+      </p:grpSpPr>
+      <p:sp>
+        <p:nvSpPr>
+          <p:cNvPr id="2" name="Título 1"/>
+          <p:cNvSpPr>
+            <a:spLocks noGrp="1"/>
+          </p:cNvSpPr>
+          <p:nvPr>
+            <p:ph type="title"/>
+          </p:nvPr>
+        </p:nvSpPr>
+        <p:spPr/>
+        <p:txBody>
+          <a:bodyPr/>
+          <a:lstStyle/>
+          <a:p>
+            <a:r>
+              <a:rPr lang="es-ES" dirty="0" err="1" smtClean="0"/>
+              <a:t>Preprocesamiento</a:t>
+            </a:r>
+            <a:endParaRPr lang="es-ES" dirty="0"/>
+          </a:p>
+        </p:txBody>
+      </p:sp>
+      <p:sp>
+        <p:nvSpPr>
+          <p:cNvPr id="3" name="Marcador de contenido 2"/>
+          <p:cNvSpPr>
+            <a:spLocks noGrp="1"/>
+          </p:cNvSpPr>
+          <p:nvPr>
+            <p:ph idx="1"/>
+          </p:nvPr>
+        </p:nvSpPr>
+        <p:spPr/>
+        <p:txBody>
+          <a:bodyPr/>
+          <a:lstStyle/>
+          <a:p>
+            <a:r>
+              <a:rPr lang="en-US" dirty="0"/>
+              <a:t>Number of patches: 148815 </a:t>
+            </a:r>
+            <a:endParaRPr lang="en-US" dirty="0" smtClean="0"/>
+          </a:p>
+          <a:p>
+            <a:r>
+              <a:rPr lang="en-US" dirty="0" smtClean="0"/>
+              <a:t>Percentage </a:t>
+            </a:r>
+            <a:r>
+              <a:rPr lang="en-US" dirty="0"/>
+              <a:t>of positive patches: </a:t>
+            </a:r>
+            <a:r>
+              <a:rPr lang="en-US" dirty="0" smtClean="0"/>
+              <a:t>0.8766</a:t>
+            </a:r>
+            <a:endParaRPr lang="es-ES" dirty="0"/>
+          </a:p>
+        </p:txBody>
+      </p:sp>
+      <p:pic>
+        <p:nvPicPr>
+          <p:cNvPr id="4" name="Imagen 3"/>
+          <p:cNvPicPr>
+            <a:picLocks noChangeAspect="1"/>
+          </p:cNvPicPr>
+          <p:nvPr/>
+        </p:nvPicPr>
+        <p:blipFill>
+          <a:blip r:embed="rId2">
+            <a:extLst>
+              <a:ext uri="{28A0092B-C50C-407E-A947-70E740481C1C}">
+                <a14:useLocalDpi xmlns:a14="http://schemas.microsoft.com/office/drawing/2010/main" val="0"/>
+              </a:ext>
+            </a:extLst>
+          </a:blip>
+          <a:stretch>
+            <a:fillRect/>
+          </a:stretch>
+        </p:blipFill>
+        <p:spPr>
+          <a:xfrm>
+            <a:off x="3309214" y="3162694"/>
+            <a:ext cx="4990476" cy="3149206"/>
+          </a:xfrm>
+          <a:prstGeom prst="rect">
+            <a:avLst/>
+          </a:prstGeom>
+        </p:spPr>
+      </p:pic>
+    </p:spTree>
+    <p:extLst>
+      <p:ext uri="{BB962C8B-B14F-4D97-AF65-F5344CB8AC3E}">
+        <p14:creationId xmlns:p14="http://schemas.microsoft.com/office/powerpoint/2010/main" val="3592142040"/>
+      </p:ext>
+    </p:extLst>
+  </p:cSld>
+  <p:clrMapOvr>
+    <a:masterClrMapping/>
+  </p:clrMapOvr>
+</p:sld>
+</file>
+
+<file path=ppt/slides/slide38.xml><?xml version="1.0" encoding="utf-8"?>
+<p:sld xmlns:a="http://schemas.openxmlformats.org/drawingml/2006/main" xmlns:r="http://schemas.openxmlformats.org/officeDocument/2006/relationships" xmlns:p="http://schemas.openxmlformats.org/presentationml/2006/main">
+  <p:cSld>
+    <p:spTree>
+      <p:nvGrpSpPr>
+        <p:cNvPr id="1" name=""/>
+        <p:cNvGrpSpPr/>
+        <p:nvPr/>
+      </p:nvGrpSpPr>
+      <p:grpSpPr>
+        <a:xfrm>
+          <a:off x="0" y="0"/>
+          <a:ext cx="0" cy="0"/>
+          <a:chOff x="0" y="0"/>
+          <a:chExt cx="0" cy="0"/>
+        </a:xfrm>
+      </p:grpSpPr>
+      <p:sp>
+        <p:nvSpPr>
+          <p:cNvPr id="2" name="Título 1"/>
+          <p:cNvSpPr>
+            <a:spLocks noGrp="1"/>
+          </p:cNvSpPr>
+          <p:nvPr>
+            <p:ph type="title"/>
+          </p:nvPr>
+        </p:nvSpPr>
+        <p:spPr>
+          <a:xfrm>
+            <a:off x="838200" y="424070"/>
+            <a:ext cx="10515600" cy="1266618"/>
+          </a:xfrm>
+        </p:spPr>
+        <p:txBody>
+          <a:bodyPr>
+            <a:normAutofit fontScale="90000"/>
+          </a:bodyPr>
+          <a:lstStyle/>
+          <a:p>
+            <a:r>
+              <a:rPr lang="es-ES" dirty="0" smtClean="0"/>
+              <a:t>Curvas de aprendizaje para todos los datos 90% </a:t>
+            </a:r>
+            <a:r>
+              <a:rPr lang="es-ES" dirty="0" err="1" smtClean="0"/>
+              <a:t>train</a:t>
+            </a:r>
+            <a:r>
+              <a:rPr lang="es-ES" dirty="0" smtClean="0"/>
+              <a:t> 10% val</a:t>
+            </a:r>
+            <a:endParaRPr lang="es-ES" dirty="0"/>
+          </a:p>
+        </p:txBody>
+      </p:sp>
+      <p:sp>
+        <p:nvSpPr>
+          <p:cNvPr id="3" name="Marcador de contenido 2"/>
+          <p:cNvSpPr>
+            <a:spLocks noGrp="1"/>
+          </p:cNvSpPr>
+          <p:nvPr>
+            <p:ph idx="1"/>
+          </p:nvPr>
+        </p:nvSpPr>
+        <p:spPr>
+          <a:xfrm>
+            <a:off x="4094922" y="1802296"/>
+            <a:ext cx="7258877" cy="4374667"/>
+          </a:xfrm>
+        </p:spPr>
+        <p:txBody>
+          <a:bodyPr>
+            <a:normAutofit lnSpcReduction="10000"/>
+          </a:bodyPr>
+          <a:lstStyle/>
+          <a:p>
+            <a:r>
+              <a:rPr lang="es-ES" dirty="0" smtClean="0"/>
+              <a:t>VAL </a:t>
+            </a:r>
+            <a:r>
+              <a:rPr lang="es-ES" dirty="0"/>
+              <a:t>ACC: 0.845 VAL LOSS: 1.8769</a:t>
+            </a:r>
+          </a:p>
+          <a:p>
+            <a:r>
+              <a:rPr lang="es-ES" dirty="0"/>
+              <a:t>TRAIN ACC 0.992 TRAIN LOSS: </a:t>
+            </a:r>
+            <a:r>
+              <a:rPr lang="es-ES" dirty="0" smtClean="0"/>
+              <a:t>0.0234</a:t>
+            </a:r>
+          </a:p>
+          <a:p>
+            <a:r>
+              <a:rPr lang="es-ES" dirty="0" smtClean="0"/>
+              <a:t>Últimas dos capas lineales</a:t>
+            </a:r>
+          </a:p>
+          <a:p>
+            <a:endParaRPr lang="es-ES" dirty="0"/>
+          </a:p>
+          <a:p>
+            <a:r>
+              <a:rPr lang="es-ES" dirty="0" smtClean="0"/>
+              <a:t>Algún bug</a:t>
+            </a:r>
+          </a:p>
+          <a:p>
+            <a:r>
+              <a:rPr lang="es-ES" dirty="0" err="1" smtClean="0"/>
+              <a:t>Overfitting</a:t>
+            </a:r>
+            <a:r>
+              <a:rPr lang="es-ES" dirty="0" smtClean="0"/>
+              <a:t> no tiene sentido con tantos datos</a:t>
+            </a:r>
+            <a:r>
+              <a:rPr lang="es-ES" dirty="0"/>
+              <a:t> </a:t>
+            </a:r>
+            <a:r>
+              <a:rPr lang="es-ES" dirty="0" smtClean="0"/>
+              <a:t>desde el primer </a:t>
+            </a:r>
+            <a:r>
+              <a:rPr lang="es-ES" dirty="0" err="1" smtClean="0"/>
+              <a:t>epoch</a:t>
+            </a:r>
+            <a:endParaRPr lang="es-ES" dirty="0" smtClean="0"/>
+          </a:p>
+          <a:p>
+            <a:endParaRPr lang="es-ES" dirty="0"/>
+          </a:p>
+          <a:p>
+            <a:r>
+              <a:rPr lang="es-ES" dirty="0" smtClean="0"/>
+              <a:t>El balance de los datos</a:t>
+            </a:r>
+            <a:endParaRPr lang="es-ES" u="sng" dirty="0" smtClean="0"/>
+          </a:p>
+        </p:txBody>
+      </p:sp>
+      <p:graphicFrame>
+        <p:nvGraphicFramePr>
+          <p:cNvPr id="4" name="Objeto 3"/>
+          <p:cNvGraphicFramePr>
+            <a:graphicFrameLocks noChangeAspect="1"/>
+          </p:cNvGraphicFramePr>
+          <p:nvPr>
+            <p:extLst>
+              <p:ext uri="{D42A27DB-BD31-4B8C-83A1-F6EECF244321}">
+                <p14:modId xmlns:p14="http://schemas.microsoft.com/office/powerpoint/2010/main" val="2521530629"/>
+              </p:ext>
+            </p:extLst>
+          </p:nvPr>
+        </p:nvGraphicFramePr>
+        <p:xfrm>
+          <a:off x="838200" y="1632972"/>
+          <a:ext cx="3383317" cy="4736644"/>
+        </p:xfrm>
+        <a:graphic>
+          <a:graphicData uri="http://schemas.openxmlformats.org/presentationml/2006/ole">
+            <mc:AlternateContent xmlns:mc="http://schemas.openxmlformats.org/markup-compatibility/2006">
+              <mc:Choice xmlns:v="urn:schemas-microsoft-com:vml" Requires="v">
+                <p:oleObj spid="_x0000_s3090" name="Acrobat Document" r:id="rId3" imgW="3428684" imgH="4800600" progId="AcroExch.Document.7">
+                  <p:embed/>
+                </p:oleObj>
+              </mc:Choice>
+              <mc:Fallback>
+                <p:oleObj name="Acrobat Document" r:id="rId3" imgW="3428684" imgH="4800600" progId="AcroExch.Document.7">
+                  <p:embed/>
+                  <p:pic>
+                    <p:nvPicPr>
+                      <p:cNvPr id="0" name=""/>
+                      <p:cNvPicPr/>
+                      <p:nvPr/>
+                    </p:nvPicPr>
+                    <p:blipFill>
+                      <a:blip r:embed="rId4"/>
+                      <a:stretch>
+                        <a:fillRect/>
+                      </a:stretch>
+                    </p:blipFill>
+                    <p:spPr>
+                      <a:xfrm>
+                        <a:off x="838200" y="1632972"/>
+                        <a:ext cx="3383317" cy="4736644"/>
+                      </a:xfrm>
+                      <a:prstGeom prst="rect">
+                        <a:avLst/>
+                      </a:prstGeom>
+                    </p:spPr>
+                  </p:pic>
+                </p:oleObj>
+              </mc:Fallback>
+            </mc:AlternateContent>
+          </a:graphicData>
+        </a:graphic>
+      </p:graphicFrame>
+    </p:spTree>
+    <p:extLst>
+      <p:ext uri="{BB962C8B-B14F-4D97-AF65-F5344CB8AC3E}">
+        <p14:creationId xmlns:p14="http://schemas.microsoft.com/office/powerpoint/2010/main" val="1797401974"/>
+      </p:ext>
+    </p:extLst>
+  </p:cSld>
+  <p:clrMapOvr>
+    <a:masterClrMapping/>
+  </p:clrMapOvr>
+</p:sld>
+</file>
+
+<file path=ppt/slides/slide39.xml><?xml version="1.0" encoding="utf-8"?>
+<p:sld xmlns:a="http://schemas.openxmlformats.org/drawingml/2006/main" xmlns:r="http://schemas.openxmlformats.org/officeDocument/2006/relationships" xmlns:p="http://schemas.openxmlformats.org/presentationml/2006/main">
+  <p:cSld>
+    <p:spTree>
+      <p:nvGrpSpPr>
+        <p:cNvPr id="1" name=""/>
+        <p:cNvGrpSpPr/>
+        <p:nvPr/>
+      </p:nvGrpSpPr>
+      <p:grpSpPr>
+        <a:xfrm>
+          <a:off x="0" y="0"/>
+          <a:ext cx="0" cy="0"/>
+          <a:chOff x="0" y="0"/>
+          <a:chExt cx="0" cy="0"/>
+        </a:xfrm>
+      </p:grpSpPr>
+      <p:sp>
+        <p:nvSpPr>
+          <p:cNvPr id="2" name="Título 1"/>
+          <p:cNvSpPr>
+            <a:spLocks noGrp="1"/>
+          </p:cNvSpPr>
+          <p:nvPr>
+            <p:ph type="title"/>
+          </p:nvPr>
+        </p:nvSpPr>
+        <p:spPr/>
+        <p:txBody>
+          <a:bodyPr>
+            <a:normAutofit/>
+          </a:bodyPr>
+          <a:lstStyle/>
+          <a:p>
+            <a:r>
+              <a:rPr lang="es-ES" dirty="0" smtClean="0"/>
+              <a:t>Balance de los datos</a:t>
+            </a:r>
+            <a:br>
+              <a:rPr lang="es-ES" dirty="0" smtClean="0"/>
+            </a:br>
+            <a:endParaRPr lang="es-ES" dirty="0"/>
+          </a:p>
+        </p:txBody>
+      </p:sp>
+      <p:pic>
+        <p:nvPicPr>
+          <p:cNvPr id="4" name="Marcador de contenido 3"/>
+          <p:cNvPicPr>
+            <a:picLocks noGrp="1" noChangeAspect="1"/>
+          </p:cNvPicPr>
+          <p:nvPr>
+            <p:ph idx="1"/>
+          </p:nvPr>
+        </p:nvPicPr>
+        <p:blipFill>
+          <a:blip r:embed="rId2">
+            <a:extLst>
+              <a:ext uri="{28A0092B-C50C-407E-A947-70E740481C1C}">
+                <a14:useLocalDpi xmlns:a14="http://schemas.microsoft.com/office/drawing/2010/main" val="0"/>
+              </a:ext>
+            </a:extLst>
+          </a:blip>
+          <a:stretch>
+            <a:fillRect/>
+          </a:stretch>
+        </p:blipFill>
+        <p:spPr>
+          <a:xfrm>
+            <a:off x="838200" y="1690688"/>
+            <a:ext cx="3384374" cy="4351338"/>
+          </a:xfrm>
+        </p:spPr>
+      </p:pic>
+      <p:sp>
+        <p:nvSpPr>
+          <p:cNvPr id="6" name="Marcador de contenido 2"/>
+          <p:cNvSpPr txBox="1">
+            <a:spLocks/>
+          </p:cNvSpPr>
+          <p:nvPr/>
+        </p:nvSpPr>
+        <p:spPr>
+          <a:xfrm>
+            <a:off x="4222574" y="1802296"/>
+            <a:ext cx="7131225" cy="4374667"/>
+          </a:xfrm>
+          <a:prstGeom prst="rect">
+            <a:avLst/>
+          </a:prstGeom>
+        </p:spPr>
+        <p:txBody>
+          <a:bodyPr vert="horz" lIns="91440" tIns="45720" rIns="91440" bIns="45720" rtlCol="0">
+            <a:normAutofit/>
+          </a:bodyPr>
+          <a:lstStyle>
+            <a:lvl1pPr marL="228600" indent="-228600" algn="l" defTabSz="914400" rtl="0" eaLnBrk="1" latinLnBrk="0" hangingPunct="1">
+              <a:lnSpc>
+                <a:spcPct val="90000"/>
+              </a:lnSpc>
+              <a:spcBef>
+                <a:spcPts val="1000"/>
+              </a:spcBef>
+              <a:buFont typeface="Arial" panose="020B0604020202020204" pitchFamily="34" charset="0"/>
+              <a:buChar char="•"/>
+              <a:defRPr sz="2800" kern="1200">
+                <a:solidFill>
+                  <a:schemeClr val="tx1"/>
+                </a:solidFill>
+                <a:latin typeface="+mn-lt"/>
+                <a:ea typeface="+mn-ea"/>
+                <a:cs typeface="+mn-cs"/>
+              </a:defRPr>
+            </a:lvl1pPr>
+            <a:lvl2pPr marL="685800" indent="-228600" algn="l" defTabSz="914400" rtl="0" eaLnBrk="1" latinLnBrk="0" hangingPunct="1">
+              <a:lnSpc>
+                <a:spcPct val="90000"/>
+              </a:lnSpc>
+              <a:spcBef>
+                <a:spcPts val="500"/>
+              </a:spcBef>
+              <a:buFont typeface="Arial" panose="020B0604020202020204" pitchFamily="34" charset="0"/>
+              <a:buChar char="•"/>
+              <a:defRPr sz="2400" kern="1200">
+                <a:solidFill>
+                  <a:schemeClr val="tx1"/>
+                </a:solidFill>
+                <a:latin typeface="+mn-lt"/>
+                <a:ea typeface="+mn-ea"/>
+                <a:cs typeface="+mn-cs"/>
+              </a:defRPr>
+            </a:lvl2pPr>
+            <a:lvl3pPr marL="1143000" indent="-228600" algn="l" defTabSz="914400" rtl="0" eaLnBrk="1" latinLnBrk="0" hangingPunct="1">
+              <a:lnSpc>
+                <a:spcPct val="90000"/>
+              </a:lnSpc>
+              <a:spcBef>
+                <a:spcPts val="500"/>
+              </a:spcBef>
+              <a:buFont typeface="Arial" panose="020B0604020202020204" pitchFamily="34" charset="0"/>
+              <a:buChar char="•"/>
+              <a:defRPr sz="2000" kern="1200">
+                <a:solidFill>
+                  <a:schemeClr val="tx1"/>
+                </a:solidFill>
+                <a:latin typeface="+mn-lt"/>
+                <a:ea typeface="+mn-ea"/>
+                <a:cs typeface="+mn-cs"/>
+              </a:defRPr>
+            </a:lvl3pPr>
+            <a:lvl4pPr marL="1600200" indent="-228600" algn="l" defTabSz="914400" rtl="0" eaLnBrk="1" latinLnBrk="0" hangingPunct="1">
+              <a:lnSpc>
+                <a:spcPct val="90000"/>
+              </a:lnSpc>
+              <a:spcBef>
+                <a:spcPts val="500"/>
+              </a:spcBef>
+              <a:buFont typeface="Arial" panose="020B0604020202020204" pitchFamily="34" charset="0"/>
+              <a:buChar char="•"/>
+              <a:defRPr sz="1800" kern="1200">
+                <a:solidFill>
+                  <a:schemeClr val="tx1"/>
+                </a:solidFill>
+                <a:latin typeface="+mn-lt"/>
+                <a:ea typeface="+mn-ea"/>
+                <a:cs typeface="+mn-cs"/>
+              </a:defRPr>
+            </a:lvl4pPr>
+            <a:lvl5pPr marL="2057400" indent="-228600" algn="l" defTabSz="914400" rtl="0" eaLnBrk="1" latinLnBrk="0" hangingPunct="1">
+              <a:lnSpc>
+                <a:spcPct val="90000"/>
+              </a:lnSpc>
+              <a:spcBef>
+                <a:spcPts val="500"/>
+              </a:spcBef>
+              <a:buFont typeface="Arial" panose="020B0604020202020204" pitchFamily="34" charset="0"/>
+              <a:buChar char="•"/>
+              <a:defRPr sz="1800" kern="1200">
+                <a:solidFill>
+                  <a:schemeClr val="tx1"/>
+                </a:solidFill>
+                <a:latin typeface="+mn-lt"/>
+                <a:ea typeface="+mn-ea"/>
+                <a:cs typeface="+mn-cs"/>
+              </a:defRPr>
+            </a:lvl5pPr>
+            <a:lvl6pPr marL="2514600" indent="-228600" algn="l" defTabSz="914400" rtl="0" eaLnBrk="1" latinLnBrk="0" hangingPunct="1">
+              <a:lnSpc>
+                <a:spcPct val="90000"/>
+              </a:lnSpc>
+              <a:spcBef>
+                <a:spcPts val="500"/>
+              </a:spcBef>
+              <a:buFont typeface="Arial" panose="020B0604020202020204" pitchFamily="34" charset="0"/>
+              <a:buChar char="•"/>
+              <a:defRPr sz="1800" kern="1200">
+                <a:solidFill>
+                  <a:schemeClr val="tx1"/>
+                </a:solidFill>
+                <a:latin typeface="+mn-lt"/>
+                <a:ea typeface="+mn-ea"/>
+                <a:cs typeface="+mn-cs"/>
+              </a:defRPr>
+            </a:lvl6pPr>
+            <a:lvl7pPr marL="2971800" indent="-228600" algn="l" defTabSz="914400" rtl="0" eaLnBrk="1" latinLnBrk="0" hangingPunct="1">
+              <a:lnSpc>
+                <a:spcPct val="90000"/>
+              </a:lnSpc>
+              <a:spcBef>
+                <a:spcPts val="500"/>
+              </a:spcBef>
+              <a:buFont typeface="Arial" panose="020B0604020202020204" pitchFamily="34" charset="0"/>
+              <a:buChar char="•"/>
+              <a:defRPr sz="1800" kern="1200">
+                <a:solidFill>
+                  <a:schemeClr val="tx1"/>
+                </a:solidFill>
+                <a:latin typeface="+mn-lt"/>
+                <a:ea typeface="+mn-ea"/>
+                <a:cs typeface="+mn-cs"/>
+              </a:defRPr>
+            </a:lvl7pPr>
+            <a:lvl8pPr marL="3429000" indent="-228600" algn="l" defTabSz="914400" rtl="0" eaLnBrk="1" latinLnBrk="0" hangingPunct="1">
+              <a:lnSpc>
+                <a:spcPct val="90000"/>
+              </a:lnSpc>
+              <a:spcBef>
+                <a:spcPts val="500"/>
+              </a:spcBef>
+              <a:buFont typeface="Arial" panose="020B0604020202020204" pitchFamily="34" charset="0"/>
+              <a:buChar char="•"/>
+              <a:defRPr sz="1800" kern="1200">
+                <a:solidFill>
+                  <a:schemeClr val="tx1"/>
+                </a:solidFill>
+                <a:latin typeface="+mn-lt"/>
+                <a:ea typeface="+mn-ea"/>
+                <a:cs typeface="+mn-cs"/>
+              </a:defRPr>
+            </a:lvl8pPr>
+            <a:lvl9pPr marL="3886200" indent="-228600" algn="l" defTabSz="914400" rtl="0" eaLnBrk="1" latinLnBrk="0" hangingPunct="1">
+              <a:lnSpc>
+                <a:spcPct val="90000"/>
+              </a:lnSpc>
+              <a:spcBef>
+                <a:spcPts val="500"/>
+              </a:spcBef>
+              <a:buFont typeface="Arial" panose="020B0604020202020204" pitchFamily="34" charset="0"/>
+              <a:buChar char="•"/>
+              <a:defRPr sz="1800" kern="1200">
+                <a:solidFill>
+                  <a:schemeClr val="tx1"/>
+                </a:solidFill>
+                <a:latin typeface="+mn-lt"/>
+                <a:ea typeface="+mn-ea"/>
+                <a:cs typeface="+mn-cs"/>
+              </a:defRPr>
+            </a:lvl9pPr>
+          </a:lstStyle>
+          <a:p>
+            <a:r>
+              <a:rPr lang="es-ES" dirty="0"/>
+              <a:t>U</a:t>
+            </a:r>
+            <a:r>
+              <a:rPr lang="es-ES" dirty="0" smtClean="0"/>
+              <a:t>sando </a:t>
+            </a:r>
+            <a:r>
+              <a:rPr lang="es-ES" dirty="0" err="1" smtClean="0"/>
+              <a:t>oversampling</a:t>
+            </a:r>
+            <a:r>
+              <a:rPr lang="es-ES" dirty="0" smtClean="0"/>
+              <a:t>, mismos resultados</a:t>
+            </a:r>
+          </a:p>
+          <a:p>
+            <a:endParaRPr lang="es-ES" u="sng" dirty="0"/>
+          </a:p>
+          <a:p>
+            <a:r>
+              <a:rPr lang="es-ES" dirty="0" smtClean="0"/>
+              <a:t>100% de los datos</a:t>
+            </a:r>
+          </a:p>
+          <a:p>
+            <a:endParaRPr lang="es-ES" dirty="0"/>
+          </a:p>
+          <a:p>
+            <a:pPr marL="0" indent="0">
+              <a:buNone/>
+            </a:pPr>
+            <a:endParaRPr lang="es-ES" dirty="0" smtClean="0"/>
+          </a:p>
+          <a:p>
+            <a:pPr marL="0" indent="0">
+              <a:buNone/>
+            </a:pPr>
+            <a:endParaRPr lang="es-ES" dirty="0" smtClean="0"/>
+          </a:p>
+        </p:txBody>
+      </p:sp>
+    </p:spTree>
+    <p:extLst>
+      <p:ext uri="{BB962C8B-B14F-4D97-AF65-F5344CB8AC3E}">
+        <p14:creationId xmlns:p14="http://schemas.microsoft.com/office/powerpoint/2010/main" val="3340134062"/>
+      </p:ext>
+    </p:extLst>
+  </p:cSld>
+  <p:clrMapOvr>
+    <a:masterClrMapping/>
+  </p:clrMapOvr>
+</p:sld>
+</file>
+
 <file path=ppt/slides/slide4.xml><?xml version="1.0" encoding="utf-8"?>
 <p:sld xmlns:a="http://schemas.openxmlformats.org/drawingml/2006/main" xmlns:r="http://schemas.openxmlformats.org/officeDocument/2006/relationships" xmlns:p="http://schemas.openxmlformats.org/presentationml/2006/main">
   <p:cSld>
@@ -7346,7 +8104,7 @@
     <p:controls>
       <mc:AlternateContent xmlns:mc="http://schemas.openxmlformats.org/markup-compatibility/2006">
         <mc:Choice xmlns:v="urn:schemas-microsoft-com:vml" Requires="v">
-          <p:control spid="1299" name="HTMLCheckbox1" r:id="rId2" imgW="257040" imgH="304920"/>
+          <p:control spid="1367" name="HTMLCheckbox1" r:id="rId2" imgW="257040" imgH="304920"/>
         </mc:Choice>
         <mc:Fallback>
           <p:control name="HTMLCheckbox1" r:id="rId2" imgW="257040" imgH="304920">
@@ -7398,7 +8156,7 @@
       </mc:AlternateContent>
       <mc:AlternateContent xmlns:mc="http://schemas.openxmlformats.org/markup-compatibility/2006">
         <mc:Choice xmlns:v="urn:schemas-microsoft-com:vml" Requires="v">
-          <p:control spid="1300" name="HTMLCheckbox2" r:id="rId3" imgW="257040" imgH="304920"/>
+          <p:control spid="1368" name="HTMLCheckbox2" r:id="rId3" imgW="257040" imgH="304920"/>
         </mc:Choice>
         <mc:Fallback>
           <p:control name="HTMLCheckbox2" r:id="rId3" imgW="257040" imgH="304920">
@@ -7450,7 +8208,7 @@
       </mc:AlternateContent>
       <mc:AlternateContent xmlns:mc="http://schemas.openxmlformats.org/markup-compatibility/2006">
         <mc:Choice xmlns:v="urn:schemas-microsoft-com:vml" Requires="v">
-          <p:control spid="1301" name="HTMLCheckbox3" r:id="rId4" imgW="257040" imgH="304920"/>
+          <p:control spid="1369" name="HTMLCheckbox3" r:id="rId4" imgW="257040" imgH="304920"/>
         </mc:Choice>
         <mc:Fallback>
           <p:control name="HTMLCheckbox3" r:id="rId4" imgW="257040" imgH="304920">
@@ -7502,7 +8260,7 @@
       </mc:AlternateContent>
       <mc:AlternateContent xmlns:mc="http://schemas.openxmlformats.org/markup-compatibility/2006">
         <mc:Choice xmlns:v="urn:schemas-microsoft-com:vml" Requires="v">
-          <p:control spid="1302" name="HTMLCheckbox4" r:id="rId5" imgW="257040" imgH="304920"/>
+          <p:control spid="1370" name="HTMLCheckbox4" r:id="rId5" imgW="257040" imgH="304920"/>
         </mc:Choice>
         <mc:Fallback>
           <p:control name="HTMLCheckbox4" r:id="rId5" imgW="257040" imgH="304920">
@@ -7556,6 +8314,702 @@
     <p:extLst>
       <p:ext uri="{BB962C8B-B14F-4D97-AF65-F5344CB8AC3E}">
         <p14:creationId xmlns:p14="http://schemas.microsoft.com/office/powerpoint/2010/main" val="3125508109"/>
+      </p:ext>
+    </p:extLst>
+  </p:cSld>
+  <p:clrMapOvr>
+    <a:masterClrMapping/>
+  </p:clrMapOvr>
+</p:sld>
+</file>
+
+<file path=ppt/slides/slide40.xml><?xml version="1.0" encoding="utf-8"?>
+<p:sld xmlns:a="http://schemas.openxmlformats.org/drawingml/2006/main" xmlns:r="http://schemas.openxmlformats.org/officeDocument/2006/relationships" xmlns:p="http://schemas.openxmlformats.org/presentationml/2006/main">
+  <p:cSld>
+    <p:spTree>
+      <p:nvGrpSpPr>
+        <p:cNvPr id="1" name=""/>
+        <p:cNvGrpSpPr/>
+        <p:nvPr/>
+      </p:nvGrpSpPr>
+      <p:grpSpPr>
+        <a:xfrm>
+          <a:off x="0" y="0"/>
+          <a:ext cx="0" cy="0"/>
+          <a:chOff x="0" y="0"/>
+          <a:chExt cx="0" cy="0"/>
+        </a:xfrm>
+      </p:grpSpPr>
+      <p:sp>
+        <p:nvSpPr>
+          <p:cNvPr id="2" name="Título 1"/>
+          <p:cNvSpPr>
+            <a:spLocks noGrp="1"/>
+          </p:cNvSpPr>
+          <p:nvPr>
+            <p:ph type="title"/>
+          </p:nvPr>
+        </p:nvSpPr>
+        <p:spPr/>
+        <p:txBody>
+          <a:bodyPr/>
+          <a:lstStyle/>
+          <a:p>
+            <a:r>
+              <a:rPr lang="es-ES" dirty="0" err="1" smtClean="0"/>
+              <a:t>Overfitting</a:t>
+            </a:r>
+            <a:endParaRPr lang="es-ES" dirty="0"/>
+          </a:p>
+        </p:txBody>
+      </p:sp>
+      <p:pic>
+        <p:nvPicPr>
+          <p:cNvPr id="5" name="Marcador de contenido 4"/>
+          <p:cNvPicPr>
+            <a:picLocks noGrp="1" noChangeAspect="1"/>
+          </p:cNvPicPr>
+          <p:nvPr>
+            <p:ph idx="1"/>
+          </p:nvPr>
+        </p:nvPicPr>
+        <p:blipFill>
+          <a:blip r:embed="rId2">
+            <a:extLst>
+              <a:ext uri="{28A0092B-C50C-407E-A947-70E740481C1C}">
+                <a14:useLocalDpi xmlns:a14="http://schemas.microsoft.com/office/drawing/2010/main" val="0"/>
+              </a:ext>
+            </a:extLst>
+          </a:blip>
+          <a:stretch>
+            <a:fillRect/>
+          </a:stretch>
+        </p:blipFill>
+        <p:spPr>
+          <a:xfrm>
+            <a:off x="838200" y="1690688"/>
+            <a:ext cx="3409077" cy="4351338"/>
+          </a:xfrm>
+        </p:spPr>
+      </p:pic>
+      <p:sp>
+        <p:nvSpPr>
+          <p:cNvPr id="7" name="Marcador de contenido 2"/>
+          <p:cNvSpPr txBox="1">
+            <a:spLocks/>
+          </p:cNvSpPr>
+          <p:nvPr/>
+        </p:nvSpPr>
+        <p:spPr>
+          <a:xfrm>
+            <a:off x="5049078" y="1825625"/>
+            <a:ext cx="6304722" cy="4351338"/>
+          </a:xfrm>
+          <a:prstGeom prst="rect">
+            <a:avLst/>
+          </a:prstGeom>
+        </p:spPr>
+        <p:txBody>
+          <a:bodyPr vert="horz" lIns="91440" tIns="45720" rIns="91440" bIns="45720" rtlCol="0">
+            <a:normAutofit/>
+          </a:bodyPr>
+          <a:lstStyle>
+            <a:lvl1pPr marL="228600" indent="-228600" algn="l" defTabSz="914400" rtl="0" eaLnBrk="1" latinLnBrk="0" hangingPunct="1">
+              <a:lnSpc>
+                <a:spcPct val="90000"/>
+              </a:lnSpc>
+              <a:spcBef>
+                <a:spcPts val="1000"/>
+              </a:spcBef>
+              <a:buFont typeface="Arial" panose="020B0604020202020204" pitchFamily="34" charset="0"/>
+              <a:buChar char="•"/>
+              <a:defRPr sz="2800" kern="1200">
+                <a:solidFill>
+                  <a:schemeClr val="tx1"/>
+                </a:solidFill>
+                <a:latin typeface="+mn-lt"/>
+                <a:ea typeface="+mn-ea"/>
+                <a:cs typeface="+mn-cs"/>
+              </a:defRPr>
+            </a:lvl1pPr>
+            <a:lvl2pPr marL="685800" indent="-228600" algn="l" defTabSz="914400" rtl="0" eaLnBrk="1" latinLnBrk="0" hangingPunct="1">
+              <a:lnSpc>
+                <a:spcPct val="90000"/>
+              </a:lnSpc>
+              <a:spcBef>
+                <a:spcPts val="500"/>
+              </a:spcBef>
+              <a:buFont typeface="Arial" panose="020B0604020202020204" pitchFamily="34" charset="0"/>
+              <a:buChar char="•"/>
+              <a:defRPr sz="2400" kern="1200">
+                <a:solidFill>
+                  <a:schemeClr val="tx1"/>
+                </a:solidFill>
+                <a:latin typeface="+mn-lt"/>
+                <a:ea typeface="+mn-ea"/>
+                <a:cs typeface="+mn-cs"/>
+              </a:defRPr>
+            </a:lvl2pPr>
+            <a:lvl3pPr marL="1143000" indent="-228600" algn="l" defTabSz="914400" rtl="0" eaLnBrk="1" latinLnBrk="0" hangingPunct="1">
+              <a:lnSpc>
+                <a:spcPct val="90000"/>
+              </a:lnSpc>
+              <a:spcBef>
+                <a:spcPts val="500"/>
+              </a:spcBef>
+              <a:buFont typeface="Arial" panose="020B0604020202020204" pitchFamily="34" charset="0"/>
+              <a:buChar char="•"/>
+              <a:defRPr sz="2000" kern="1200">
+                <a:solidFill>
+                  <a:schemeClr val="tx1"/>
+                </a:solidFill>
+                <a:latin typeface="+mn-lt"/>
+                <a:ea typeface="+mn-ea"/>
+                <a:cs typeface="+mn-cs"/>
+              </a:defRPr>
+            </a:lvl3pPr>
+            <a:lvl4pPr marL="1600200" indent="-228600" algn="l" defTabSz="914400" rtl="0" eaLnBrk="1" latinLnBrk="0" hangingPunct="1">
+              <a:lnSpc>
+                <a:spcPct val="90000"/>
+              </a:lnSpc>
+              <a:spcBef>
+                <a:spcPts val="500"/>
+              </a:spcBef>
+              <a:buFont typeface="Arial" panose="020B0604020202020204" pitchFamily="34" charset="0"/>
+              <a:buChar char="•"/>
+              <a:defRPr sz="1800" kern="1200">
+                <a:solidFill>
+                  <a:schemeClr val="tx1"/>
+                </a:solidFill>
+                <a:latin typeface="+mn-lt"/>
+                <a:ea typeface="+mn-ea"/>
+                <a:cs typeface="+mn-cs"/>
+              </a:defRPr>
+            </a:lvl4pPr>
+            <a:lvl5pPr marL="2057400" indent="-228600" algn="l" defTabSz="914400" rtl="0" eaLnBrk="1" latinLnBrk="0" hangingPunct="1">
+              <a:lnSpc>
+                <a:spcPct val="90000"/>
+              </a:lnSpc>
+              <a:spcBef>
+                <a:spcPts val="500"/>
+              </a:spcBef>
+              <a:buFont typeface="Arial" panose="020B0604020202020204" pitchFamily="34" charset="0"/>
+              <a:buChar char="•"/>
+              <a:defRPr sz="1800" kern="1200">
+                <a:solidFill>
+                  <a:schemeClr val="tx1"/>
+                </a:solidFill>
+                <a:latin typeface="+mn-lt"/>
+                <a:ea typeface="+mn-ea"/>
+                <a:cs typeface="+mn-cs"/>
+              </a:defRPr>
+            </a:lvl5pPr>
+            <a:lvl6pPr marL="2514600" indent="-228600" algn="l" defTabSz="914400" rtl="0" eaLnBrk="1" latinLnBrk="0" hangingPunct="1">
+              <a:lnSpc>
+                <a:spcPct val="90000"/>
+              </a:lnSpc>
+              <a:spcBef>
+                <a:spcPts val="500"/>
+              </a:spcBef>
+              <a:buFont typeface="Arial" panose="020B0604020202020204" pitchFamily="34" charset="0"/>
+              <a:buChar char="•"/>
+              <a:defRPr sz="1800" kern="1200">
+                <a:solidFill>
+                  <a:schemeClr val="tx1"/>
+                </a:solidFill>
+                <a:latin typeface="+mn-lt"/>
+                <a:ea typeface="+mn-ea"/>
+                <a:cs typeface="+mn-cs"/>
+              </a:defRPr>
+            </a:lvl6pPr>
+            <a:lvl7pPr marL="2971800" indent="-228600" algn="l" defTabSz="914400" rtl="0" eaLnBrk="1" latinLnBrk="0" hangingPunct="1">
+              <a:lnSpc>
+                <a:spcPct val="90000"/>
+              </a:lnSpc>
+              <a:spcBef>
+                <a:spcPts val="500"/>
+              </a:spcBef>
+              <a:buFont typeface="Arial" panose="020B0604020202020204" pitchFamily="34" charset="0"/>
+              <a:buChar char="•"/>
+              <a:defRPr sz="1800" kern="1200">
+                <a:solidFill>
+                  <a:schemeClr val="tx1"/>
+                </a:solidFill>
+                <a:latin typeface="+mn-lt"/>
+                <a:ea typeface="+mn-ea"/>
+                <a:cs typeface="+mn-cs"/>
+              </a:defRPr>
+            </a:lvl7pPr>
+            <a:lvl8pPr marL="3429000" indent="-228600" algn="l" defTabSz="914400" rtl="0" eaLnBrk="1" latinLnBrk="0" hangingPunct="1">
+              <a:lnSpc>
+                <a:spcPct val="90000"/>
+              </a:lnSpc>
+              <a:spcBef>
+                <a:spcPts val="500"/>
+              </a:spcBef>
+              <a:buFont typeface="Arial" panose="020B0604020202020204" pitchFamily="34" charset="0"/>
+              <a:buChar char="•"/>
+              <a:defRPr sz="1800" kern="1200">
+                <a:solidFill>
+                  <a:schemeClr val="tx1"/>
+                </a:solidFill>
+                <a:latin typeface="+mn-lt"/>
+                <a:ea typeface="+mn-ea"/>
+                <a:cs typeface="+mn-cs"/>
+              </a:defRPr>
+            </a:lvl8pPr>
+            <a:lvl9pPr marL="3886200" indent="-228600" algn="l" defTabSz="914400" rtl="0" eaLnBrk="1" latinLnBrk="0" hangingPunct="1">
+              <a:lnSpc>
+                <a:spcPct val="90000"/>
+              </a:lnSpc>
+              <a:spcBef>
+                <a:spcPts val="500"/>
+              </a:spcBef>
+              <a:buFont typeface="Arial" panose="020B0604020202020204" pitchFamily="34" charset="0"/>
+              <a:buChar char="•"/>
+              <a:defRPr sz="1800" kern="1200">
+                <a:solidFill>
+                  <a:schemeClr val="tx1"/>
+                </a:solidFill>
+                <a:latin typeface="+mn-lt"/>
+                <a:ea typeface="+mn-ea"/>
+                <a:cs typeface="+mn-cs"/>
+              </a:defRPr>
+            </a:lvl9pPr>
+          </a:lstStyle>
+          <a:p>
+            <a:r>
+              <a:rPr lang="es-ES" dirty="0" smtClean="0"/>
+              <a:t>Entrenar solo las ultimas capas y el último residual block</a:t>
+            </a:r>
+          </a:p>
+          <a:p>
+            <a:endParaRPr lang="es-ES" dirty="0" smtClean="0"/>
+          </a:p>
+          <a:p>
+            <a:r>
+              <a:rPr lang="es-ES" dirty="0" smtClean="0"/>
+              <a:t>Lr = 1E-5 para no desajustar los pesos</a:t>
+            </a:r>
+            <a:endParaRPr lang="es-ES" dirty="0"/>
+          </a:p>
+        </p:txBody>
+      </p:sp>
+    </p:spTree>
+    <p:extLst>
+      <p:ext uri="{BB962C8B-B14F-4D97-AF65-F5344CB8AC3E}">
+        <p14:creationId xmlns:p14="http://schemas.microsoft.com/office/powerpoint/2010/main" val="2775814932"/>
+      </p:ext>
+    </p:extLst>
+  </p:cSld>
+  <p:clrMapOvr>
+    <a:masterClrMapping/>
+  </p:clrMapOvr>
+</p:sld>
+</file>
+
+<file path=ppt/slides/slide41.xml><?xml version="1.0" encoding="utf-8"?>
+<p:sld xmlns:a="http://schemas.openxmlformats.org/drawingml/2006/main" xmlns:r="http://schemas.openxmlformats.org/officeDocument/2006/relationships" xmlns:p="http://schemas.openxmlformats.org/presentationml/2006/main">
+  <p:cSld>
+    <p:spTree>
+      <p:nvGrpSpPr>
+        <p:cNvPr id="1" name=""/>
+        <p:cNvGrpSpPr/>
+        <p:nvPr/>
+      </p:nvGrpSpPr>
+      <p:grpSpPr>
+        <a:xfrm>
+          <a:off x="0" y="0"/>
+          <a:ext cx="0" cy="0"/>
+          <a:chOff x="0" y="0"/>
+          <a:chExt cx="0" cy="0"/>
+        </a:xfrm>
+      </p:grpSpPr>
+      <p:sp>
+        <p:nvSpPr>
+          <p:cNvPr id="2" name="Título 1"/>
+          <p:cNvSpPr>
+            <a:spLocks noGrp="1"/>
+          </p:cNvSpPr>
+          <p:nvPr>
+            <p:ph type="title"/>
+          </p:nvPr>
+        </p:nvSpPr>
+        <p:spPr/>
+        <p:txBody>
+          <a:bodyPr/>
+          <a:lstStyle/>
+          <a:p>
+            <a:r>
+              <a:rPr lang="es-ES" dirty="0" err="1" smtClean="0"/>
+              <a:t>Validation</a:t>
+            </a:r>
+            <a:r>
+              <a:rPr lang="es-ES" dirty="0" smtClean="0"/>
+              <a:t> set no representativo</a:t>
+            </a:r>
+            <a:endParaRPr lang="es-ES" dirty="0"/>
+          </a:p>
+        </p:txBody>
+      </p:sp>
+      <p:sp>
+        <p:nvSpPr>
+          <p:cNvPr id="3" name="Marcador de contenido 2"/>
+          <p:cNvSpPr>
+            <a:spLocks noGrp="1"/>
+          </p:cNvSpPr>
+          <p:nvPr>
+            <p:ph idx="1"/>
+          </p:nvPr>
+        </p:nvSpPr>
+        <p:spPr>
+          <a:xfrm>
+            <a:off x="4691920" y="1825625"/>
+            <a:ext cx="6661879" cy="4351338"/>
+          </a:xfrm>
+        </p:spPr>
+        <p:txBody>
+          <a:bodyPr/>
+          <a:lstStyle/>
+          <a:p>
+            <a:r>
+              <a:rPr lang="es-ES" dirty="0" smtClean="0"/>
+              <a:t>Probar con otro Split para </a:t>
+            </a:r>
+            <a:r>
+              <a:rPr lang="es-ES" dirty="0" err="1" smtClean="0"/>
+              <a:t>validation</a:t>
+            </a:r>
+            <a:r>
+              <a:rPr lang="es-ES" dirty="0" smtClean="0"/>
+              <a:t>. Cada Split tiene 25 casos, aunque sean muchas imágenes no son muchos datos</a:t>
+            </a:r>
+          </a:p>
+          <a:p>
+            <a:endParaRPr lang="es-ES" dirty="0"/>
+          </a:p>
+          <a:p>
+            <a:r>
+              <a:rPr lang="es-ES" dirty="0" smtClean="0"/>
+              <a:t>Seguir buscando bug. Quizá las </a:t>
+            </a:r>
+            <a:r>
+              <a:rPr lang="es-ES" dirty="0" err="1" smtClean="0"/>
+              <a:t>labels</a:t>
+            </a:r>
+            <a:r>
+              <a:rPr lang="es-ES" dirty="0"/>
+              <a:t> </a:t>
+            </a:r>
+            <a:r>
+              <a:rPr lang="es-ES" dirty="0" smtClean="0"/>
+              <a:t>por haber cambiado el pipeline</a:t>
+            </a:r>
+          </a:p>
+          <a:p>
+            <a:endParaRPr lang="es-ES" dirty="0"/>
+          </a:p>
+          <a:p>
+            <a:r>
+              <a:rPr lang="es-ES" dirty="0" smtClean="0"/>
+              <a:t>Los </a:t>
+            </a:r>
+            <a:r>
+              <a:rPr lang="es-ES" dirty="0" err="1" smtClean="0"/>
+              <a:t>labels</a:t>
+            </a:r>
+            <a:r>
+              <a:rPr lang="es-ES" dirty="0" smtClean="0"/>
+              <a:t> parecen estar bien</a:t>
+            </a:r>
+          </a:p>
+          <a:p>
+            <a:endParaRPr lang="es-ES" dirty="0"/>
+          </a:p>
+        </p:txBody>
+      </p:sp>
+      <p:pic>
+        <p:nvPicPr>
+          <p:cNvPr id="4" name="Imagen 3"/>
+          <p:cNvPicPr>
+            <a:picLocks noChangeAspect="1"/>
+          </p:cNvPicPr>
+          <p:nvPr/>
+        </p:nvPicPr>
+        <p:blipFill>
+          <a:blip r:embed="rId2"/>
+          <a:stretch>
+            <a:fillRect/>
+          </a:stretch>
+        </p:blipFill>
+        <p:spPr>
+          <a:xfrm>
+            <a:off x="626222" y="1825625"/>
+            <a:ext cx="3640898" cy="3450938"/>
+          </a:xfrm>
+          <a:prstGeom prst="rect">
+            <a:avLst/>
+          </a:prstGeom>
+        </p:spPr>
+      </p:pic>
+    </p:spTree>
+    <p:extLst>
+      <p:ext uri="{BB962C8B-B14F-4D97-AF65-F5344CB8AC3E}">
+        <p14:creationId xmlns:p14="http://schemas.microsoft.com/office/powerpoint/2010/main" val="3332534823"/>
+      </p:ext>
+    </p:extLst>
+  </p:cSld>
+  <p:clrMapOvr>
+    <a:masterClrMapping/>
+  </p:clrMapOvr>
+</p:sld>
+</file>
+
+<file path=ppt/slides/slide42.xml><?xml version="1.0" encoding="utf-8"?>
+<p:sld xmlns:a="http://schemas.openxmlformats.org/drawingml/2006/main" xmlns:r="http://schemas.openxmlformats.org/officeDocument/2006/relationships" xmlns:p="http://schemas.openxmlformats.org/presentationml/2006/main">
+  <p:cSld>
+    <p:spTree>
+      <p:nvGrpSpPr>
+        <p:cNvPr id="1" name=""/>
+        <p:cNvGrpSpPr/>
+        <p:nvPr/>
+      </p:nvGrpSpPr>
+      <p:grpSpPr>
+        <a:xfrm>
+          <a:off x="0" y="0"/>
+          <a:ext cx="0" cy="0"/>
+          <a:chOff x="0" y="0"/>
+          <a:chExt cx="0" cy="0"/>
+        </a:xfrm>
+      </p:grpSpPr>
+      <p:sp>
+        <p:nvSpPr>
+          <p:cNvPr id="2" name="Título 1"/>
+          <p:cNvSpPr>
+            <a:spLocks noGrp="1"/>
+          </p:cNvSpPr>
+          <p:nvPr>
+            <p:ph type="title"/>
+          </p:nvPr>
+        </p:nvSpPr>
+        <p:spPr/>
+        <p:txBody>
+          <a:bodyPr/>
+          <a:lstStyle/>
+          <a:p>
+            <a:r>
+              <a:rPr lang="es-ES" dirty="0" smtClean="0"/>
+              <a:t>Val set no representativo</a:t>
+            </a:r>
+            <a:endParaRPr lang="es-ES" dirty="0"/>
+          </a:p>
+        </p:txBody>
+      </p:sp>
+      <p:sp>
+        <p:nvSpPr>
+          <p:cNvPr id="3" name="Marcador de contenido 2"/>
+          <p:cNvSpPr>
+            <a:spLocks noGrp="1"/>
+          </p:cNvSpPr>
+          <p:nvPr>
+            <p:ph idx="1"/>
+          </p:nvPr>
+        </p:nvSpPr>
+        <p:spPr/>
+        <p:txBody>
+          <a:bodyPr/>
+          <a:lstStyle/>
+          <a:p>
+            <a:r>
+              <a:rPr lang="es-ES" dirty="0" smtClean="0"/>
+              <a:t>Distinto val set</a:t>
+            </a:r>
+          </a:p>
+          <a:p>
+            <a:endParaRPr lang="es-ES" dirty="0"/>
+          </a:p>
+          <a:p>
+            <a:r>
+              <a:rPr lang="es-ES" dirty="0" smtClean="0"/>
+              <a:t>Últimas dos capas</a:t>
+            </a:r>
+          </a:p>
+          <a:p>
+            <a:endParaRPr lang="es-ES" dirty="0"/>
+          </a:p>
+          <a:p>
+            <a:r>
+              <a:rPr lang="es-ES" dirty="0" smtClean="0"/>
+              <a:t>LR = 10E-3</a:t>
+            </a:r>
+          </a:p>
+          <a:p>
+            <a:endParaRPr lang="es-ES" dirty="0"/>
+          </a:p>
+          <a:p>
+            <a:r>
+              <a:rPr lang="es-ES" dirty="0" smtClean="0"/>
+              <a:t>Mismo resultado</a:t>
+            </a:r>
+            <a:endParaRPr lang="es-ES" dirty="0"/>
+          </a:p>
+        </p:txBody>
+      </p:sp>
+      <p:pic>
+        <p:nvPicPr>
+          <p:cNvPr id="4" name="Imagen 3"/>
+          <p:cNvPicPr>
+            <a:picLocks noChangeAspect="1"/>
+          </p:cNvPicPr>
+          <p:nvPr/>
+        </p:nvPicPr>
+        <p:blipFill>
+          <a:blip r:embed="rId2"/>
+          <a:stretch>
+            <a:fillRect/>
+          </a:stretch>
+        </p:blipFill>
+        <p:spPr>
+          <a:xfrm>
+            <a:off x="5897753" y="3620261"/>
+            <a:ext cx="4793395" cy="762066"/>
+          </a:xfrm>
+          <a:prstGeom prst="rect">
+            <a:avLst/>
+          </a:prstGeom>
+        </p:spPr>
+      </p:pic>
+      <p:pic>
+        <p:nvPicPr>
+          <p:cNvPr id="5" name="Imagen 4"/>
+          <p:cNvPicPr>
+            <a:picLocks noChangeAspect="1"/>
+          </p:cNvPicPr>
+          <p:nvPr/>
+        </p:nvPicPr>
+        <p:blipFill>
+          <a:blip r:embed="rId3"/>
+          <a:stretch>
+            <a:fillRect/>
+          </a:stretch>
+        </p:blipFill>
+        <p:spPr>
+          <a:xfrm>
+            <a:off x="5897753" y="2229835"/>
+            <a:ext cx="4762913" cy="716342"/>
+          </a:xfrm>
+          <a:prstGeom prst="rect">
+            <a:avLst/>
+          </a:prstGeom>
+        </p:spPr>
+      </p:pic>
+    </p:spTree>
+    <p:extLst>
+      <p:ext uri="{BB962C8B-B14F-4D97-AF65-F5344CB8AC3E}">
+        <p14:creationId xmlns:p14="http://schemas.microsoft.com/office/powerpoint/2010/main" val="622836831"/>
+      </p:ext>
+    </p:extLst>
+  </p:cSld>
+  <p:clrMapOvr>
+    <a:masterClrMapping/>
+  </p:clrMapOvr>
+</p:sld>
+</file>
+
+<file path=ppt/slides/slide43.xml><?xml version="1.0" encoding="utf-8"?>
+<p:sld xmlns:a="http://schemas.openxmlformats.org/drawingml/2006/main" xmlns:r="http://schemas.openxmlformats.org/officeDocument/2006/relationships" xmlns:p="http://schemas.openxmlformats.org/presentationml/2006/main">
+  <p:cSld>
+    <p:spTree>
+      <p:nvGrpSpPr>
+        <p:cNvPr id="1" name=""/>
+        <p:cNvGrpSpPr/>
+        <p:nvPr/>
+      </p:nvGrpSpPr>
+      <p:grpSpPr>
+        <a:xfrm>
+          <a:off x="0" y="0"/>
+          <a:ext cx="0" cy="0"/>
+          <a:chOff x="0" y="0"/>
+          <a:chExt cx="0" cy="0"/>
+        </a:xfrm>
+      </p:grpSpPr>
+      <p:sp>
+        <p:nvSpPr>
+          <p:cNvPr id="2" name="Título 1"/>
+          <p:cNvSpPr>
+            <a:spLocks noGrp="1"/>
+          </p:cNvSpPr>
+          <p:nvPr>
+            <p:ph type="title"/>
+          </p:nvPr>
+        </p:nvSpPr>
+        <p:spPr/>
+        <p:txBody>
+          <a:bodyPr/>
+          <a:lstStyle/>
+          <a:p>
+            <a:r>
+              <a:rPr lang="es-ES" dirty="0" smtClean="0"/>
+              <a:t>Primer resultado: ultimo bloque y ultima capa</a:t>
+            </a:r>
+            <a:endParaRPr lang="es-ES" dirty="0"/>
+          </a:p>
+        </p:txBody>
+      </p:sp>
+      <p:pic>
+        <p:nvPicPr>
+          <p:cNvPr id="4" name="Marcador de contenido 3"/>
+          <p:cNvPicPr>
+            <a:picLocks noGrp="1" noChangeAspect="1"/>
+          </p:cNvPicPr>
+          <p:nvPr>
+            <p:ph idx="1"/>
+          </p:nvPr>
+        </p:nvPicPr>
+        <p:blipFill>
+          <a:blip r:embed="rId2"/>
+          <a:stretch>
+            <a:fillRect/>
+          </a:stretch>
+        </p:blipFill>
+        <p:spPr>
+          <a:xfrm>
+            <a:off x="913951" y="2095332"/>
+            <a:ext cx="5182049" cy="3452159"/>
+          </a:xfrm>
+          <a:prstGeom prst="rect">
+            <a:avLst/>
+          </a:prstGeom>
+        </p:spPr>
+      </p:pic>
+      <p:pic>
+        <p:nvPicPr>
+          <p:cNvPr id="5" name="Imagen 4"/>
+          <p:cNvPicPr>
+            <a:picLocks noChangeAspect="1"/>
+          </p:cNvPicPr>
+          <p:nvPr/>
+        </p:nvPicPr>
+        <p:blipFill>
+          <a:blip r:embed="rId3"/>
+          <a:stretch>
+            <a:fillRect/>
+          </a:stretch>
+        </p:blipFill>
+        <p:spPr>
+          <a:xfrm>
+            <a:off x="7374526" y="1885763"/>
+            <a:ext cx="3109229" cy="3871295"/>
+          </a:xfrm>
+          <a:prstGeom prst="rect">
+            <a:avLst/>
+          </a:prstGeom>
+        </p:spPr>
+      </p:pic>
+    </p:spTree>
+    <p:extLst>
+      <p:ext uri="{BB962C8B-B14F-4D97-AF65-F5344CB8AC3E}">
+        <p14:creationId xmlns:p14="http://schemas.microsoft.com/office/powerpoint/2010/main" val="3766013428"/>
       </p:ext>
     </p:extLst>
   </p:cSld>

</xml_diff>